<commit_message>
Help system, data migrator, etc.
</commit_message>
<xml_diff>
--- a/Specs.pptx
+++ b/Specs.pptx
@@ -4,6 +4,9 @@
   <p:sldMasterIdLst>
     <p:sldMasterId id="2147483648" r:id="rId1"/>
   </p:sldMasterIdLst>
+  <p:notesMasterIdLst>
+    <p:notesMasterId r:id="rId17"/>
+  </p:notesMasterIdLst>
   <p:sldIdLst>
     <p:sldId id="256" r:id="rId2"/>
     <p:sldId id="257" r:id="rId3"/>
@@ -15,6 +18,11 @@
     <p:sldId id="261" r:id="rId9"/>
     <p:sldId id="262" r:id="rId10"/>
     <p:sldId id="263" r:id="rId11"/>
+    <p:sldId id="270" r:id="rId12"/>
+    <p:sldId id="266" r:id="rId13"/>
+    <p:sldId id="267" r:id="rId14"/>
+    <p:sldId id="268" r:id="rId15"/>
+    <p:sldId id="269" r:id="rId16"/>
   </p:sldIdLst>
   <p:sldSz cx="12192000" cy="6858000"/>
   <p:notesSz cx="6858000" cy="9144000"/>
@@ -121,6 +129,356 @@
 </p:presentation>
 </file>
 
+<file path=ppt/notesMasters/notesMaster1.xml><?xml version="1.0" encoding="utf-8"?>
+<p:notesMaster xmlns:a="http://schemas.openxmlformats.org/drawingml/2006/main" xmlns:r="http://schemas.openxmlformats.org/officeDocument/2006/relationships" xmlns:p="http://schemas.openxmlformats.org/presentationml/2006/main">
+  <p:cSld>
+    <p:bg>
+      <p:bgRef idx="1001">
+        <a:schemeClr val="bg1"/>
+      </p:bgRef>
+    </p:bg>
+    <p:spTree>
+      <p:nvGrpSpPr>
+        <p:cNvPr id="1" name=""/>
+        <p:cNvGrpSpPr/>
+        <p:nvPr/>
+      </p:nvGrpSpPr>
+      <p:grpSpPr>
+        <a:xfrm>
+          <a:off x="0" y="0"/>
+          <a:ext cx="0" cy="0"/>
+          <a:chOff x="0" y="0"/>
+          <a:chExt cx="0" cy="0"/>
+        </a:xfrm>
+      </p:grpSpPr>
+      <p:sp>
+        <p:nvSpPr>
+          <p:cNvPr id="2" name="Header Placeholder 1"/>
+          <p:cNvSpPr>
+            <a:spLocks noGrp="1"/>
+          </p:cNvSpPr>
+          <p:nvPr>
+            <p:ph type="hdr" sz="quarter"/>
+          </p:nvPr>
+        </p:nvSpPr>
+        <p:spPr>
+          <a:xfrm>
+            <a:off x="0" y="0"/>
+            <a:ext cx="2971800" cy="458788"/>
+          </a:xfrm>
+          <a:prstGeom prst="rect">
+            <a:avLst/>
+          </a:prstGeom>
+        </p:spPr>
+        <p:txBody>
+          <a:bodyPr vert="horz" lIns="91440" tIns="45720" rIns="91440" bIns="45720" rtlCol="0"/>
+          <a:lstStyle>
+            <a:lvl1pPr algn="l">
+              <a:defRPr sz="1200"/>
+            </a:lvl1pPr>
+          </a:lstStyle>
+          <a:p>
+            <a:endParaRPr lang="ru-RU"/>
+          </a:p>
+        </p:txBody>
+      </p:sp>
+      <p:sp>
+        <p:nvSpPr>
+          <p:cNvPr id="3" name="Date Placeholder 2"/>
+          <p:cNvSpPr>
+            <a:spLocks noGrp="1"/>
+          </p:cNvSpPr>
+          <p:nvPr>
+            <p:ph type="dt" idx="1"/>
+          </p:nvPr>
+        </p:nvSpPr>
+        <p:spPr>
+          <a:xfrm>
+            <a:off x="3884613" y="0"/>
+            <a:ext cx="2971800" cy="458788"/>
+          </a:xfrm>
+          <a:prstGeom prst="rect">
+            <a:avLst/>
+          </a:prstGeom>
+        </p:spPr>
+        <p:txBody>
+          <a:bodyPr vert="horz" lIns="91440" tIns="45720" rIns="91440" bIns="45720" rtlCol="0"/>
+          <a:lstStyle>
+            <a:lvl1pPr algn="r">
+              <a:defRPr sz="1200"/>
+            </a:lvl1pPr>
+          </a:lstStyle>
+          <a:p>
+            <a:fld id="{5A49B920-2512-410B-B58F-4F9F15F8D3A5}" type="datetimeFigureOut">
+              <a:rPr lang="ru-RU" smtClean="0"/>
+              <a:t>29.09.2020</a:t>
+            </a:fld>
+            <a:endParaRPr lang="ru-RU"/>
+          </a:p>
+        </p:txBody>
+      </p:sp>
+      <p:sp>
+        <p:nvSpPr>
+          <p:cNvPr id="4" name="Slide Image Placeholder 3"/>
+          <p:cNvSpPr>
+            <a:spLocks noGrp="1" noRot="1" noChangeAspect="1"/>
+          </p:cNvSpPr>
+          <p:nvPr>
+            <p:ph type="sldImg" idx="2"/>
+          </p:nvPr>
+        </p:nvSpPr>
+        <p:spPr>
+          <a:xfrm>
+            <a:off x="685800" y="1143000"/>
+            <a:ext cx="5486400" cy="3086100"/>
+          </a:xfrm>
+          <a:prstGeom prst="rect">
+            <a:avLst/>
+          </a:prstGeom>
+          <a:noFill/>
+          <a:ln w="12700">
+            <a:solidFill>
+              <a:prstClr val="black"/>
+            </a:solidFill>
+          </a:ln>
+        </p:spPr>
+        <p:txBody>
+          <a:bodyPr vert="horz" lIns="91440" tIns="45720" rIns="91440" bIns="45720" rtlCol="0" anchor="ctr"/>
+          <a:lstStyle/>
+          <a:p>
+            <a:endParaRPr lang="ru-RU"/>
+          </a:p>
+        </p:txBody>
+      </p:sp>
+      <p:sp>
+        <p:nvSpPr>
+          <p:cNvPr id="5" name="Notes Placeholder 4"/>
+          <p:cNvSpPr>
+            <a:spLocks noGrp="1"/>
+          </p:cNvSpPr>
+          <p:nvPr>
+            <p:ph type="body" sz="quarter" idx="3"/>
+          </p:nvPr>
+        </p:nvSpPr>
+        <p:spPr>
+          <a:xfrm>
+            <a:off x="685800" y="4400550"/>
+            <a:ext cx="5486400" cy="3600450"/>
+          </a:xfrm>
+          <a:prstGeom prst="rect">
+            <a:avLst/>
+          </a:prstGeom>
+        </p:spPr>
+        <p:txBody>
+          <a:bodyPr vert="horz" lIns="91440" tIns="45720" rIns="91440" bIns="45720" rtlCol="0"/>
+          <a:lstStyle/>
+          <a:p>
+            <a:pPr lvl="0"/>
+            <a:r>
+              <a:rPr lang="en-US" smtClean="0"/>
+              <a:t>Edit Master text styles</a:t>
+            </a:r>
+          </a:p>
+          <a:p>
+            <a:pPr lvl="1"/>
+            <a:r>
+              <a:rPr lang="en-US" smtClean="0"/>
+              <a:t>Second level</a:t>
+            </a:r>
+          </a:p>
+          <a:p>
+            <a:pPr lvl="2"/>
+            <a:r>
+              <a:rPr lang="en-US" smtClean="0"/>
+              <a:t>Third level</a:t>
+            </a:r>
+          </a:p>
+          <a:p>
+            <a:pPr lvl="3"/>
+            <a:r>
+              <a:rPr lang="en-US" smtClean="0"/>
+              <a:t>Fourth level</a:t>
+            </a:r>
+          </a:p>
+          <a:p>
+            <a:pPr lvl="4"/>
+            <a:r>
+              <a:rPr lang="en-US" smtClean="0"/>
+              <a:t>Fifth level</a:t>
+            </a:r>
+            <a:endParaRPr lang="ru-RU"/>
+          </a:p>
+        </p:txBody>
+      </p:sp>
+      <p:sp>
+        <p:nvSpPr>
+          <p:cNvPr id="6" name="Footer Placeholder 5"/>
+          <p:cNvSpPr>
+            <a:spLocks noGrp="1"/>
+          </p:cNvSpPr>
+          <p:nvPr>
+            <p:ph type="ftr" sz="quarter" idx="4"/>
+          </p:nvPr>
+        </p:nvSpPr>
+        <p:spPr>
+          <a:xfrm>
+            <a:off x="0" y="8685213"/>
+            <a:ext cx="2971800" cy="458787"/>
+          </a:xfrm>
+          <a:prstGeom prst="rect">
+            <a:avLst/>
+          </a:prstGeom>
+        </p:spPr>
+        <p:txBody>
+          <a:bodyPr vert="horz" lIns="91440" tIns="45720" rIns="91440" bIns="45720" rtlCol="0" anchor="b"/>
+          <a:lstStyle>
+            <a:lvl1pPr algn="l">
+              <a:defRPr sz="1200"/>
+            </a:lvl1pPr>
+          </a:lstStyle>
+          <a:p>
+            <a:endParaRPr lang="ru-RU"/>
+          </a:p>
+        </p:txBody>
+      </p:sp>
+      <p:sp>
+        <p:nvSpPr>
+          <p:cNvPr id="7" name="Slide Number Placeholder 6"/>
+          <p:cNvSpPr>
+            <a:spLocks noGrp="1"/>
+          </p:cNvSpPr>
+          <p:nvPr>
+            <p:ph type="sldNum" sz="quarter" idx="5"/>
+          </p:nvPr>
+        </p:nvSpPr>
+        <p:spPr>
+          <a:xfrm>
+            <a:off x="3884613" y="8685213"/>
+            <a:ext cx="2971800" cy="458787"/>
+          </a:xfrm>
+          <a:prstGeom prst="rect">
+            <a:avLst/>
+          </a:prstGeom>
+        </p:spPr>
+        <p:txBody>
+          <a:bodyPr vert="horz" lIns="91440" tIns="45720" rIns="91440" bIns="45720" rtlCol="0" anchor="b"/>
+          <a:lstStyle>
+            <a:lvl1pPr algn="r">
+              <a:defRPr sz="1200"/>
+            </a:lvl1pPr>
+          </a:lstStyle>
+          <a:p>
+            <a:fld id="{E52DB3BC-32AD-4666-8762-D7A2AF9C59D3}" type="slidenum">
+              <a:rPr lang="ru-RU" smtClean="0"/>
+              <a:t>‹#›</a:t>
+            </a:fld>
+            <a:endParaRPr lang="ru-RU"/>
+          </a:p>
+        </p:txBody>
+      </p:sp>
+    </p:spTree>
+    <p:extLst>
+      <p:ext uri="{BB962C8B-B14F-4D97-AF65-F5344CB8AC3E}">
+        <p14:creationId xmlns:p14="http://schemas.microsoft.com/office/powerpoint/2010/main" val="1999100082"/>
+      </p:ext>
+    </p:extLst>
+  </p:cSld>
+  <p:clrMap bg1="lt1" tx1="dk1" bg2="lt2" tx2="dk2" accent1="accent1" accent2="accent2" accent3="accent3" accent4="accent4" accent5="accent5" accent6="accent6" hlink="hlink" folHlink="folHlink"/>
+  <p:notesStyle>
+    <a:lvl1pPr marL="0" algn="l" defTabSz="914400" rtl="0" eaLnBrk="1" latinLnBrk="0" hangingPunct="1">
+      <a:defRPr sz="1200" kern="1200">
+        <a:solidFill>
+          <a:schemeClr val="tx1"/>
+        </a:solidFill>
+        <a:latin typeface="+mn-lt"/>
+        <a:ea typeface="+mn-ea"/>
+        <a:cs typeface="+mn-cs"/>
+      </a:defRPr>
+    </a:lvl1pPr>
+    <a:lvl2pPr marL="457200" algn="l" defTabSz="914400" rtl="0" eaLnBrk="1" latinLnBrk="0" hangingPunct="1">
+      <a:defRPr sz="1200" kern="1200">
+        <a:solidFill>
+          <a:schemeClr val="tx1"/>
+        </a:solidFill>
+        <a:latin typeface="+mn-lt"/>
+        <a:ea typeface="+mn-ea"/>
+        <a:cs typeface="+mn-cs"/>
+      </a:defRPr>
+    </a:lvl2pPr>
+    <a:lvl3pPr marL="914400" algn="l" defTabSz="914400" rtl="0" eaLnBrk="1" latinLnBrk="0" hangingPunct="1">
+      <a:defRPr sz="1200" kern="1200">
+        <a:solidFill>
+          <a:schemeClr val="tx1"/>
+        </a:solidFill>
+        <a:latin typeface="+mn-lt"/>
+        <a:ea typeface="+mn-ea"/>
+        <a:cs typeface="+mn-cs"/>
+      </a:defRPr>
+    </a:lvl3pPr>
+    <a:lvl4pPr marL="1371600" algn="l" defTabSz="914400" rtl="0" eaLnBrk="1" latinLnBrk="0" hangingPunct="1">
+      <a:defRPr sz="1200" kern="1200">
+        <a:solidFill>
+          <a:schemeClr val="tx1"/>
+        </a:solidFill>
+        <a:latin typeface="+mn-lt"/>
+        <a:ea typeface="+mn-ea"/>
+        <a:cs typeface="+mn-cs"/>
+      </a:defRPr>
+    </a:lvl4pPr>
+    <a:lvl5pPr marL="1828800" algn="l" defTabSz="914400" rtl="0" eaLnBrk="1" latinLnBrk="0" hangingPunct="1">
+      <a:defRPr sz="1200" kern="1200">
+        <a:solidFill>
+          <a:schemeClr val="tx1"/>
+        </a:solidFill>
+        <a:latin typeface="+mn-lt"/>
+        <a:ea typeface="+mn-ea"/>
+        <a:cs typeface="+mn-cs"/>
+      </a:defRPr>
+    </a:lvl5pPr>
+    <a:lvl6pPr marL="2286000" algn="l" defTabSz="914400" rtl="0" eaLnBrk="1" latinLnBrk="0" hangingPunct="1">
+      <a:defRPr sz="1200" kern="1200">
+        <a:solidFill>
+          <a:schemeClr val="tx1"/>
+        </a:solidFill>
+        <a:latin typeface="+mn-lt"/>
+        <a:ea typeface="+mn-ea"/>
+        <a:cs typeface="+mn-cs"/>
+      </a:defRPr>
+    </a:lvl6pPr>
+    <a:lvl7pPr marL="2743200" algn="l" defTabSz="914400" rtl="0" eaLnBrk="1" latinLnBrk="0" hangingPunct="1">
+      <a:defRPr sz="1200" kern="1200">
+        <a:solidFill>
+          <a:schemeClr val="tx1"/>
+        </a:solidFill>
+        <a:latin typeface="+mn-lt"/>
+        <a:ea typeface="+mn-ea"/>
+        <a:cs typeface="+mn-cs"/>
+      </a:defRPr>
+    </a:lvl7pPr>
+    <a:lvl8pPr marL="3200400" algn="l" defTabSz="914400" rtl="0" eaLnBrk="1" latinLnBrk="0" hangingPunct="1">
+      <a:defRPr sz="1200" kern="1200">
+        <a:solidFill>
+          <a:schemeClr val="tx1"/>
+        </a:solidFill>
+        <a:latin typeface="+mn-lt"/>
+        <a:ea typeface="+mn-ea"/>
+        <a:cs typeface="+mn-cs"/>
+      </a:defRPr>
+    </a:lvl8pPr>
+    <a:lvl9pPr marL="3657600" algn="l" defTabSz="914400" rtl="0" eaLnBrk="1" latinLnBrk="0" hangingPunct="1">
+      <a:defRPr sz="1200" kern="1200">
+        <a:solidFill>
+          <a:schemeClr val="tx1"/>
+        </a:solidFill>
+        <a:latin typeface="+mn-lt"/>
+        <a:ea typeface="+mn-ea"/>
+        <a:cs typeface="+mn-cs"/>
+      </a:defRPr>
+    </a:lvl9pPr>
+  </p:notesStyle>
+</p:notesMaster>
+</file>
+
 <file path=ppt/slideLayouts/slideLayout1.xml><?xml version="1.0" encoding="utf-8"?>
 <p:sldLayout xmlns:a="http://schemas.openxmlformats.org/drawingml/2006/main" xmlns:r="http://schemas.openxmlformats.org/officeDocument/2006/relationships" xmlns:p="http://schemas.openxmlformats.org/presentationml/2006/main" type="title" preserve="1">
   <p:cSld name="Титульный слайд">
@@ -252,7 +610,7 @@
           <a:p>
             <a:fld id="{A2EC0EAC-ECEF-44E1-B933-C13F370113F6}" type="datetimeFigureOut">
               <a:rPr lang="ru-RU" smtClean="0"/>
-              <a:t>27.08.2020</a:t>
+              <a:t>29.09.2020</a:t>
             </a:fld>
             <a:endParaRPr lang="ru-RU"/>
           </a:p>
@@ -422,7 +780,7 @@
           <a:p>
             <a:fld id="{A2EC0EAC-ECEF-44E1-B933-C13F370113F6}" type="datetimeFigureOut">
               <a:rPr lang="ru-RU" smtClean="0"/>
-              <a:t>27.08.2020</a:t>
+              <a:t>29.09.2020</a:t>
             </a:fld>
             <a:endParaRPr lang="ru-RU"/>
           </a:p>
@@ -602,7 +960,7 @@
           <a:p>
             <a:fld id="{A2EC0EAC-ECEF-44E1-B933-C13F370113F6}" type="datetimeFigureOut">
               <a:rPr lang="ru-RU" smtClean="0"/>
-              <a:t>27.08.2020</a:t>
+              <a:t>29.09.2020</a:t>
             </a:fld>
             <a:endParaRPr lang="ru-RU"/>
           </a:p>
@@ -772,7 +1130,7 @@
           <a:p>
             <a:fld id="{A2EC0EAC-ECEF-44E1-B933-C13F370113F6}" type="datetimeFigureOut">
               <a:rPr lang="ru-RU" smtClean="0"/>
-              <a:t>27.08.2020</a:t>
+              <a:t>29.09.2020</a:t>
             </a:fld>
             <a:endParaRPr lang="ru-RU"/>
           </a:p>
@@ -1018,7 +1376,7 @@
           <a:p>
             <a:fld id="{A2EC0EAC-ECEF-44E1-B933-C13F370113F6}" type="datetimeFigureOut">
               <a:rPr lang="ru-RU" smtClean="0"/>
-              <a:t>27.08.2020</a:t>
+              <a:t>29.09.2020</a:t>
             </a:fld>
             <a:endParaRPr lang="ru-RU"/>
           </a:p>
@@ -1250,7 +1608,7 @@
           <a:p>
             <a:fld id="{A2EC0EAC-ECEF-44E1-B933-C13F370113F6}" type="datetimeFigureOut">
               <a:rPr lang="ru-RU" smtClean="0"/>
-              <a:t>27.08.2020</a:t>
+              <a:t>29.09.2020</a:t>
             </a:fld>
             <a:endParaRPr lang="ru-RU"/>
           </a:p>
@@ -1617,7 +1975,7 @@
           <a:p>
             <a:fld id="{A2EC0EAC-ECEF-44E1-B933-C13F370113F6}" type="datetimeFigureOut">
               <a:rPr lang="ru-RU" smtClean="0"/>
-              <a:t>27.08.2020</a:t>
+              <a:t>29.09.2020</a:t>
             </a:fld>
             <a:endParaRPr lang="ru-RU"/>
           </a:p>
@@ -1735,7 +2093,7 @@
           <a:p>
             <a:fld id="{A2EC0EAC-ECEF-44E1-B933-C13F370113F6}" type="datetimeFigureOut">
               <a:rPr lang="ru-RU" smtClean="0"/>
-              <a:t>27.08.2020</a:t>
+              <a:t>29.09.2020</a:t>
             </a:fld>
             <a:endParaRPr lang="ru-RU"/>
           </a:p>
@@ -1830,7 +2188,7 @@
           <a:p>
             <a:fld id="{A2EC0EAC-ECEF-44E1-B933-C13F370113F6}" type="datetimeFigureOut">
               <a:rPr lang="ru-RU" smtClean="0"/>
-              <a:t>27.08.2020</a:t>
+              <a:t>29.09.2020</a:t>
             </a:fld>
             <a:endParaRPr lang="ru-RU"/>
           </a:p>
@@ -2107,7 +2465,7 @@
           <a:p>
             <a:fld id="{A2EC0EAC-ECEF-44E1-B933-C13F370113F6}" type="datetimeFigureOut">
               <a:rPr lang="ru-RU" smtClean="0"/>
-              <a:t>27.08.2020</a:t>
+              <a:t>29.09.2020</a:t>
             </a:fld>
             <a:endParaRPr lang="ru-RU"/>
           </a:p>
@@ -2360,7 +2718,7 @@
           <a:p>
             <a:fld id="{A2EC0EAC-ECEF-44E1-B933-C13F370113F6}" type="datetimeFigureOut">
               <a:rPr lang="ru-RU" smtClean="0"/>
-              <a:t>27.08.2020</a:t>
+              <a:t>29.09.2020</a:t>
             </a:fld>
             <a:endParaRPr lang="ru-RU"/>
           </a:p>
@@ -2573,7 +2931,7 @@
           <a:p>
             <a:fld id="{A2EC0EAC-ECEF-44E1-B933-C13F370113F6}" type="datetimeFigureOut">
               <a:rPr lang="ru-RU" smtClean="0"/>
-              <a:t>27.08.2020</a:t>
+              <a:t>29.09.2020</a:t>
             </a:fld>
             <a:endParaRPr lang="ru-RU"/>
           </a:p>
@@ -5708,6 +6066,2071 @@
 </p:sld>
 </file>
 
+<file path=ppt/slides/slide11.xml><?xml version="1.0" encoding="utf-8"?>
+<p:sld xmlns:a="http://schemas.openxmlformats.org/drawingml/2006/main" xmlns:r="http://schemas.openxmlformats.org/officeDocument/2006/relationships" xmlns:p="http://schemas.openxmlformats.org/presentationml/2006/main">
+  <p:cSld>
+    <p:spTree>
+      <p:nvGrpSpPr>
+        <p:cNvPr id="1" name=""/>
+        <p:cNvGrpSpPr/>
+        <p:nvPr/>
+      </p:nvGrpSpPr>
+      <p:grpSpPr>
+        <a:xfrm>
+          <a:off x="0" y="0"/>
+          <a:ext cx="0" cy="0"/>
+          <a:chOff x="0" y="0"/>
+          <a:chExt cx="0" cy="0"/>
+        </a:xfrm>
+      </p:grpSpPr>
+      <p:sp>
+        <p:nvSpPr>
+          <p:cNvPr id="4" name="TextBox 3"/>
+          <p:cNvSpPr txBox="1"/>
+          <p:nvPr/>
+        </p:nvSpPr>
+        <p:spPr>
+          <a:xfrm>
+            <a:off x="222584" y="174458"/>
+            <a:ext cx="6647447" cy="523220"/>
+          </a:xfrm>
+          <a:prstGeom prst="rect">
+            <a:avLst/>
+          </a:prstGeom>
+          <a:noFill/>
+        </p:spPr>
+        <p:txBody>
+          <a:bodyPr wrap="square" rtlCol="0">
+            <a:spAutoFit/>
+          </a:bodyPr>
+          <a:lstStyle/>
+          <a:p>
+            <a:r>
+              <a:rPr lang="en-US" sz="2800" dirty="0" smtClean="0"/>
+              <a:t>Help Subsystem</a:t>
+            </a:r>
+            <a:endParaRPr lang="ru-RU" sz="2800" dirty="0"/>
+          </a:p>
+        </p:txBody>
+      </p:sp>
+      <p:sp>
+        <p:nvSpPr>
+          <p:cNvPr id="5" name="Rectangle 4"/>
+          <p:cNvSpPr/>
+          <p:nvPr/>
+        </p:nvSpPr>
+        <p:spPr>
+          <a:xfrm>
+            <a:off x="385010" y="866274"/>
+            <a:ext cx="2160297" cy="1501613"/>
+          </a:xfrm>
+          <a:prstGeom prst="rect">
+            <a:avLst/>
+          </a:prstGeom>
+          <a:noFill/>
+        </p:spPr>
+        <p:style>
+          <a:lnRef idx="2">
+            <a:schemeClr val="accent1">
+              <a:shade val="50000"/>
+            </a:schemeClr>
+          </a:lnRef>
+          <a:fillRef idx="1">
+            <a:schemeClr val="accent1"/>
+          </a:fillRef>
+          <a:effectRef idx="0">
+            <a:schemeClr val="accent1"/>
+          </a:effectRef>
+          <a:fontRef idx="minor">
+            <a:schemeClr val="lt1"/>
+          </a:fontRef>
+        </p:style>
+        <p:txBody>
+          <a:bodyPr rtlCol="0" anchor="ctr"/>
+          <a:lstStyle/>
+          <a:p>
+            <a:pPr algn="ctr"/>
+            <a:endParaRPr lang="ru-RU"/>
+          </a:p>
+        </p:txBody>
+      </p:sp>
+      <p:sp>
+        <p:nvSpPr>
+          <p:cNvPr id="6" name="TextBox 5"/>
+          <p:cNvSpPr txBox="1"/>
+          <p:nvPr/>
+        </p:nvSpPr>
+        <p:spPr>
+          <a:xfrm>
+            <a:off x="385010" y="866274"/>
+            <a:ext cx="1944806" cy="369332"/>
+          </a:xfrm>
+          <a:prstGeom prst="rect">
+            <a:avLst/>
+          </a:prstGeom>
+          <a:noFill/>
+        </p:spPr>
+        <p:txBody>
+          <a:bodyPr wrap="square" rtlCol="0">
+            <a:spAutoFit/>
+          </a:bodyPr>
+          <a:lstStyle/>
+          <a:p>
+            <a:r>
+              <a:rPr lang="en-US" dirty="0" smtClean="0"/>
+              <a:t>Help Section</a:t>
+            </a:r>
+            <a:endParaRPr lang="ru-RU" dirty="0"/>
+          </a:p>
+        </p:txBody>
+      </p:sp>
+      <p:sp>
+        <p:nvSpPr>
+          <p:cNvPr id="7" name="TextBox 6"/>
+          <p:cNvSpPr txBox="1"/>
+          <p:nvPr/>
+        </p:nvSpPr>
+        <p:spPr>
+          <a:xfrm>
+            <a:off x="566382" y="1344304"/>
+            <a:ext cx="2129051" cy="923330"/>
+          </a:xfrm>
+          <a:prstGeom prst="rect">
+            <a:avLst/>
+          </a:prstGeom>
+          <a:noFill/>
+        </p:spPr>
+        <p:txBody>
+          <a:bodyPr wrap="square" rtlCol="0">
+            <a:spAutoFit/>
+          </a:bodyPr>
+          <a:lstStyle/>
+          <a:p>
+            <a:pPr marL="285750" indent="-285750">
+              <a:buFont typeface="Arial" panose="020B0604020202020204" pitchFamily="34" charset="0"/>
+              <a:buChar char="•"/>
+            </a:pPr>
+            <a:r>
+              <a:rPr lang="en-US" dirty="0" smtClean="0"/>
+              <a:t>Id</a:t>
+            </a:r>
+          </a:p>
+          <a:p>
+            <a:pPr marL="285750" indent="-285750">
+              <a:buFont typeface="Arial" panose="020B0604020202020204" pitchFamily="34" charset="0"/>
+              <a:buChar char="•"/>
+            </a:pPr>
+            <a:r>
+              <a:rPr lang="en-US" dirty="0" smtClean="0"/>
+              <a:t>Name</a:t>
+            </a:r>
+          </a:p>
+          <a:p>
+            <a:pPr marL="285750" indent="-285750">
+              <a:buFont typeface="Arial" panose="020B0604020202020204" pitchFamily="34" charset="0"/>
+              <a:buChar char="•"/>
+            </a:pPr>
+            <a:r>
+              <a:rPr lang="en-US" dirty="0" smtClean="0"/>
+              <a:t>Parent Section</a:t>
+            </a:r>
+            <a:endParaRPr lang="ru-RU" dirty="0"/>
+          </a:p>
+        </p:txBody>
+      </p:sp>
+      <p:sp>
+        <p:nvSpPr>
+          <p:cNvPr id="8" name="Rectangle 7"/>
+          <p:cNvSpPr/>
+          <p:nvPr/>
+        </p:nvSpPr>
+        <p:spPr>
+          <a:xfrm>
+            <a:off x="3227696" y="866274"/>
+            <a:ext cx="1705970" cy="1788216"/>
+          </a:xfrm>
+          <a:prstGeom prst="rect">
+            <a:avLst/>
+          </a:prstGeom>
+          <a:noFill/>
+        </p:spPr>
+        <p:style>
+          <a:lnRef idx="2">
+            <a:schemeClr val="accent1">
+              <a:shade val="50000"/>
+            </a:schemeClr>
+          </a:lnRef>
+          <a:fillRef idx="1">
+            <a:schemeClr val="accent1"/>
+          </a:fillRef>
+          <a:effectRef idx="0">
+            <a:schemeClr val="accent1"/>
+          </a:effectRef>
+          <a:fontRef idx="minor">
+            <a:schemeClr val="lt1"/>
+          </a:fontRef>
+        </p:style>
+        <p:txBody>
+          <a:bodyPr rtlCol="0" anchor="ctr"/>
+          <a:lstStyle/>
+          <a:p>
+            <a:pPr algn="ctr"/>
+            <a:endParaRPr lang="ru-RU"/>
+          </a:p>
+        </p:txBody>
+      </p:sp>
+      <p:sp>
+        <p:nvSpPr>
+          <p:cNvPr id="9" name="TextBox 8"/>
+          <p:cNvSpPr txBox="1"/>
+          <p:nvPr/>
+        </p:nvSpPr>
+        <p:spPr>
+          <a:xfrm>
+            <a:off x="3295935" y="866274"/>
+            <a:ext cx="2470244" cy="369332"/>
+          </a:xfrm>
+          <a:prstGeom prst="rect">
+            <a:avLst/>
+          </a:prstGeom>
+          <a:noFill/>
+        </p:spPr>
+        <p:txBody>
+          <a:bodyPr wrap="square" rtlCol="0">
+            <a:spAutoFit/>
+          </a:bodyPr>
+          <a:lstStyle/>
+          <a:p>
+            <a:r>
+              <a:rPr lang="en-US" dirty="0" smtClean="0"/>
+              <a:t>Help Topic</a:t>
+            </a:r>
+            <a:endParaRPr lang="ru-RU" dirty="0"/>
+          </a:p>
+        </p:txBody>
+      </p:sp>
+      <p:sp>
+        <p:nvSpPr>
+          <p:cNvPr id="10" name="TextBox 9"/>
+          <p:cNvSpPr txBox="1"/>
+          <p:nvPr/>
+        </p:nvSpPr>
+        <p:spPr>
+          <a:xfrm>
+            <a:off x="3377822" y="1344304"/>
+            <a:ext cx="1453485" cy="1200329"/>
+          </a:xfrm>
+          <a:prstGeom prst="rect">
+            <a:avLst/>
+          </a:prstGeom>
+          <a:noFill/>
+        </p:spPr>
+        <p:txBody>
+          <a:bodyPr wrap="square" rtlCol="0">
+            <a:spAutoFit/>
+          </a:bodyPr>
+          <a:lstStyle/>
+          <a:p>
+            <a:pPr marL="285750" indent="-285750">
+              <a:buFont typeface="Arial" panose="020B0604020202020204" pitchFamily="34" charset="0"/>
+              <a:buChar char="•"/>
+            </a:pPr>
+            <a:r>
+              <a:rPr lang="en-US" dirty="0" smtClean="0"/>
+              <a:t>Id</a:t>
+            </a:r>
+          </a:p>
+          <a:p>
+            <a:pPr marL="285750" indent="-285750">
+              <a:buFont typeface="Arial" panose="020B0604020202020204" pitchFamily="34" charset="0"/>
+              <a:buChar char="•"/>
+            </a:pPr>
+            <a:r>
+              <a:rPr lang="en-US" dirty="0" smtClean="0"/>
+              <a:t>Name</a:t>
+            </a:r>
+          </a:p>
+          <a:p>
+            <a:pPr marL="285750" indent="-285750">
+              <a:buFont typeface="Arial" panose="020B0604020202020204" pitchFamily="34" charset="0"/>
+              <a:buChar char="•"/>
+            </a:pPr>
+            <a:r>
+              <a:rPr lang="en-US" dirty="0" smtClean="0"/>
+              <a:t>Section</a:t>
+            </a:r>
+          </a:p>
+          <a:p>
+            <a:pPr marL="285750" indent="-285750">
+              <a:buFont typeface="Arial" panose="020B0604020202020204" pitchFamily="34" charset="0"/>
+              <a:buChar char="•"/>
+            </a:pPr>
+            <a:r>
+              <a:rPr lang="en-US" dirty="0" err="1" smtClean="0"/>
+              <a:t>OrdinalNo</a:t>
+            </a:r>
+            <a:endParaRPr lang="en-US" dirty="0" smtClean="0"/>
+          </a:p>
+        </p:txBody>
+      </p:sp>
+      <p:cxnSp>
+        <p:nvCxnSpPr>
+          <p:cNvPr id="14" name="Elbow Connector 13"/>
+          <p:cNvCxnSpPr/>
+          <p:nvPr/>
+        </p:nvCxnSpPr>
+        <p:spPr>
+          <a:xfrm rot="10800000">
+            <a:off x="2545308" y="1542197"/>
+            <a:ext cx="682389" cy="516256"/>
+          </a:xfrm>
+          <a:prstGeom prst="bentConnector3">
+            <a:avLst>
+              <a:gd name="adj1" fmla="val 50000"/>
+            </a:avLst>
+          </a:prstGeom>
+          <a:ln>
+            <a:tailEnd type="triangle"/>
+          </a:ln>
+        </p:spPr>
+        <p:style>
+          <a:lnRef idx="1">
+            <a:schemeClr val="accent1"/>
+          </a:lnRef>
+          <a:fillRef idx="0">
+            <a:schemeClr val="accent1"/>
+          </a:fillRef>
+          <a:effectRef idx="0">
+            <a:schemeClr val="accent1"/>
+          </a:effectRef>
+          <a:fontRef idx="minor">
+            <a:schemeClr val="tx1"/>
+          </a:fontRef>
+        </p:style>
+      </p:cxnSp>
+      <p:sp>
+        <p:nvSpPr>
+          <p:cNvPr id="2" name="Rectangle 1"/>
+          <p:cNvSpPr/>
+          <p:nvPr/>
+        </p:nvSpPr>
+        <p:spPr>
+          <a:xfrm>
+            <a:off x="5616055" y="866274"/>
+            <a:ext cx="2117558" cy="1788216"/>
+          </a:xfrm>
+          <a:prstGeom prst="rect">
+            <a:avLst/>
+          </a:prstGeom>
+          <a:noFill/>
+        </p:spPr>
+        <p:style>
+          <a:lnRef idx="2">
+            <a:schemeClr val="accent1">
+              <a:shade val="50000"/>
+            </a:schemeClr>
+          </a:lnRef>
+          <a:fillRef idx="1">
+            <a:schemeClr val="accent1"/>
+          </a:fillRef>
+          <a:effectRef idx="0">
+            <a:schemeClr val="accent1"/>
+          </a:effectRef>
+          <a:fontRef idx="minor">
+            <a:schemeClr val="lt1"/>
+          </a:fontRef>
+        </p:style>
+        <p:txBody>
+          <a:bodyPr rtlCol="0" anchor="ctr"/>
+          <a:lstStyle/>
+          <a:p>
+            <a:pPr algn="ctr"/>
+            <a:endParaRPr lang="ru-RU"/>
+          </a:p>
+        </p:txBody>
+      </p:sp>
+      <p:sp>
+        <p:nvSpPr>
+          <p:cNvPr id="3" name="TextBox 2"/>
+          <p:cNvSpPr txBox="1"/>
+          <p:nvPr/>
+        </p:nvSpPr>
+        <p:spPr>
+          <a:xfrm>
+            <a:off x="5780905" y="939335"/>
+            <a:ext cx="1787857" cy="369332"/>
+          </a:xfrm>
+          <a:prstGeom prst="rect">
+            <a:avLst/>
+          </a:prstGeom>
+          <a:noFill/>
+        </p:spPr>
+        <p:txBody>
+          <a:bodyPr wrap="square" rtlCol="0">
+            <a:spAutoFit/>
+          </a:bodyPr>
+          <a:lstStyle/>
+          <a:p>
+            <a:r>
+              <a:rPr lang="en-US" dirty="0" smtClean="0"/>
+              <a:t>Topic Paragraph</a:t>
+            </a:r>
+            <a:endParaRPr lang="ru-RU" dirty="0"/>
+          </a:p>
+        </p:txBody>
+      </p:sp>
+      <p:sp>
+        <p:nvSpPr>
+          <p:cNvPr id="12" name="TextBox 11"/>
+          <p:cNvSpPr txBox="1"/>
+          <p:nvPr/>
+        </p:nvSpPr>
+        <p:spPr>
+          <a:xfrm>
+            <a:off x="5875362" y="1323752"/>
+            <a:ext cx="1248769" cy="1200329"/>
+          </a:xfrm>
+          <a:prstGeom prst="rect">
+            <a:avLst/>
+          </a:prstGeom>
+          <a:noFill/>
+        </p:spPr>
+        <p:txBody>
+          <a:bodyPr wrap="square" rtlCol="0">
+            <a:spAutoFit/>
+          </a:bodyPr>
+          <a:lstStyle/>
+          <a:p>
+            <a:pPr marL="285750" indent="-285750">
+              <a:buFont typeface="Arial" panose="020B0604020202020204" pitchFamily="34" charset="0"/>
+              <a:buChar char="•"/>
+            </a:pPr>
+            <a:r>
+              <a:rPr lang="en-US" dirty="0" smtClean="0"/>
+              <a:t>Id</a:t>
+            </a:r>
+          </a:p>
+          <a:p>
+            <a:pPr marL="285750" indent="-285750">
+              <a:buFont typeface="Arial" panose="020B0604020202020204" pitchFamily="34" charset="0"/>
+              <a:buChar char="•"/>
+            </a:pPr>
+            <a:r>
+              <a:rPr lang="en-US" dirty="0" smtClean="0"/>
+              <a:t>Name</a:t>
+            </a:r>
+          </a:p>
+          <a:p>
+            <a:pPr marL="285750" indent="-285750">
+              <a:buFont typeface="Arial" panose="020B0604020202020204" pitchFamily="34" charset="0"/>
+              <a:buChar char="•"/>
+            </a:pPr>
+            <a:r>
+              <a:rPr lang="en-US" dirty="0" smtClean="0"/>
+              <a:t>Topic</a:t>
+            </a:r>
+          </a:p>
+          <a:p>
+            <a:pPr marL="285750" indent="-285750">
+              <a:buFont typeface="Arial" panose="020B0604020202020204" pitchFamily="34" charset="0"/>
+              <a:buChar char="•"/>
+            </a:pPr>
+            <a:r>
+              <a:rPr lang="en-US" dirty="0" smtClean="0"/>
+              <a:t>Content</a:t>
+            </a:r>
+          </a:p>
+        </p:txBody>
+      </p:sp>
+      <p:cxnSp>
+        <p:nvCxnSpPr>
+          <p:cNvPr id="13" name="Elbow Connector 12"/>
+          <p:cNvCxnSpPr/>
+          <p:nvPr/>
+        </p:nvCxnSpPr>
+        <p:spPr>
+          <a:xfrm rot="10800000">
+            <a:off x="4935945" y="1530821"/>
+            <a:ext cx="682389" cy="516256"/>
+          </a:xfrm>
+          <a:prstGeom prst="bentConnector3">
+            <a:avLst>
+              <a:gd name="adj1" fmla="val 50000"/>
+            </a:avLst>
+          </a:prstGeom>
+          <a:ln>
+            <a:tailEnd type="triangle"/>
+          </a:ln>
+        </p:spPr>
+        <p:style>
+          <a:lnRef idx="1">
+            <a:schemeClr val="accent1"/>
+          </a:lnRef>
+          <a:fillRef idx="0">
+            <a:schemeClr val="accent1"/>
+          </a:fillRef>
+          <a:effectRef idx="0">
+            <a:schemeClr val="accent1"/>
+          </a:effectRef>
+          <a:fontRef idx="minor">
+            <a:schemeClr val="tx1"/>
+          </a:fontRef>
+        </p:style>
+      </p:cxnSp>
+    </p:spTree>
+    <p:extLst>
+      <p:ext uri="{BB962C8B-B14F-4D97-AF65-F5344CB8AC3E}">
+        <p14:creationId xmlns:p14="http://schemas.microsoft.com/office/powerpoint/2010/main" val="1228147777"/>
+      </p:ext>
+    </p:extLst>
+  </p:cSld>
+  <p:clrMapOvr>
+    <a:masterClrMapping/>
+  </p:clrMapOvr>
+</p:sld>
+</file>
+
+<file path=ppt/slides/slide12.xml><?xml version="1.0" encoding="utf-8"?>
+<p:sld xmlns:a="http://schemas.openxmlformats.org/drawingml/2006/main" xmlns:r="http://schemas.openxmlformats.org/officeDocument/2006/relationships" xmlns:p="http://schemas.openxmlformats.org/presentationml/2006/main">
+  <p:cSld>
+    <p:spTree>
+      <p:nvGrpSpPr>
+        <p:cNvPr id="1" name=""/>
+        <p:cNvGrpSpPr/>
+        <p:nvPr/>
+      </p:nvGrpSpPr>
+      <p:grpSpPr>
+        <a:xfrm>
+          <a:off x="0" y="0"/>
+          <a:ext cx="0" cy="0"/>
+          <a:chOff x="0" y="0"/>
+          <a:chExt cx="0" cy="0"/>
+        </a:xfrm>
+      </p:grpSpPr>
+      <p:sp>
+        <p:nvSpPr>
+          <p:cNvPr id="2" name="Title 1"/>
+          <p:cNvSpPr>
+            <a:spLocks noGrp="1"/>
+          </p:cNvSpPr>
+          <p:nvPr>
+            <p:ph type="title"/>
+          </p:nvPr>
+        </p:nvSpPr>
+        <p:spPr>
+          <a:xfrm>
+            <a:off x="374984" y="0"/>
+            <a:ext cx="10515600" cy="1325563"/>
+          </a:xfrm>
+        </p:spPr>
+        <p:txBody>
+          <a:bodyPr/>
+          <a:lstStyle/>
+          <a:p>
+            <a:r>
+              <a:rPr lang="en-US" dirty="0" smtClean="0"/>
+              <a:t>Help – Getting Started</a:t>
+            </a:r>
+            <a:endParaRPr lang="ru-RU" dirty="0"/>
+          </a:p>
+        </p:txBody>
+      </p:sp>
+      <p:sp>
+        <p:nvSpPr>
+          <p:cNvPr id="4" name="Rectangle 3"/>
+          <p:cNvSpPr/>
+          <p:nvPr/>
+        </p:nvSpPr>
+        <p:spPr>
+          <a:xfrm>
+            <a:off x="306805" y="1052763"/>
+            <a:ext cx="2497810" cy="5654842"/>
+          </a:xfrm>
+          <a:prstGeom prst="rect">
+            <a:avLst/>
+          </a:prstGeom>
+          <a:noFill/>
+        </p:spPr>
+        <p:style>
+          <a:lnRef idx="2">
+            <a:schemeClr val="accent1">
+              <a:shade val="50000"/>
+            </a:schemeClr>
+          </a:lnRef>
+          <a:fillRef idx="1">
+            <a:schemeClr val="accent1"/>
+          </a:fillRef>
+          <a:effectRef idx="0">
+            <a:schemeClr val="accent1"/>
+          </a:effectRef>
+          <a:fontRef idx="minor">
+            <a:schemeClr val="lt1"/>
+          </a:fontRef>
+        </p:style>
+        <p:txBody>
+          <a:bodyPr rtlCol="0" anchor="ctr"/>
+          <a:lstStyle/>
+          <a:p>
+            <a:pPr algn="ctr"/>
+            <a:endParaRPr lang="ru-RU"/>
+          </a:p>
+        </p:txBody>
+      </p:sp>
+      <p:sp>
+        <p:nvSpPr>
+          <p:cNvPr id="5" name="TextBox 4"/>
+          <p:cNvSpPr txBox="1"/>
+          <p:nvPr/>
+        </p:nvSpPr>
+        <p:spPr>
+          <a:xfrm>
+            <a:off x="374984" y="1189085"/>
+            <a:ext cx="2313296" cy="369332"/>
+          </a:xfrm>
+          <a:prstGeom prst="rect">
+            <a:avLst/>
+          </a:prstGeom>
+          <a:noFill/>
+        </p:spPr>
+        <p:txBody>
+          <a:bodyPr wrap="square" rtlCol="0">
+            <a:spAutoFit/>
+          </a:bodyPr>
+          <a:lstStyle/>
+          <a:p>
+            <a:r>
+              <a:rPr lang="en-US" dirty="0" smtClean="0"/>
+              <a:t>General</a:t>
+            </a:r>
+            <a:endParaRPr lang="ru-RU" dirty="0"/>
+          </a:p>
+        </p:txBody>
+      </p:sp>
+      <p:sp>
+        <p:nvSpPr>
+          <p:cNvPr id="6" name="TextBox 5"/>
+          <p:cNvSpPr txBox="1"/>
+          <p:nvPr/>
+        </p:nvSpPr>
+        <p:spPr>
+          <a:xfrm>
+            <a:off x="729766" y="1554010"/>
+            <a:ext cx="2026693" cy="1200329"/>
+          </a:xfrm>
+          <a:prstGeom prst="rect">
+            <a:avLst/>
+          </a:prstGeom>
+          <a:noFill/>
+        </p:spPr>
+        <p:txBody>
+          <a:bodyPr wrap="square" rtlCol="0">
+            <a:spAutoFit/>
+          </a:bodyPr>
+          <a:lstStyle/>
+          <a:p>
+            <a:r>
+              <a:rPr lang="en-US" b="1" dirty="0" smtClean="0"/>
+              <a:t>Getting started</a:t>
+            </a:r>
+          </a:p>
+          <a:p>
+            <a:r>
+              <a:rPr lang="en-US" dirty="0" smtClean="0"/>
+              <a:t>Dashboard</a:t>
+            </a:r>
+          </a:p>
+          <a:p>
+            <a:r>
+              <a:rPr lang="en-US" dirty="0" smtClean="0"/>
+              <a:t>Create site</a:t>
+            </a:r>
+          </a:p>
+          <a:p>
+            <a:r>
+              <a:rPr lang="en-US" dirty="0" smtClean="0"/>
+              <a:t>Site management</a:t>
+            </a:r>
+            <a:endParaRPr lang="ru-RU" dirty="0"/>
+          </a:p>
+        </p:txBody>
+      </p:sp>
+      <p:sp>
+        <p:nvSpPr>
+          <p:cNvPr id="7" name="Rectangle 6"/>
+          <p:cNvSpPr/>
+          <p:nvPr/>
+        </p:nvSpPr>
+        <p:spPr>
+          <a:xfrm>
+            <a:off x="2954740" y="1052763"/>
+            <a:ext cx="9096233" cy="5654842"/>
+          </a:xfrm>
+          <a:prstGeom prst="rect">
+            <a:avLst/>
+          </a:prstGeom>
+          <a:noFill/>
+        </p:spPr>
+        <p:style>
+          <a:lnRef idx="2">
+            <a:schemeClr val="accent1">
+              <a:shade val="50000"/>
+            </a:schemeClr>
+          </a:lnRef>
+          <a:fillRef idx="1">
+            <a:schemeClr val="accent1"/>
+          </a:fillRef>
+          <a:effectRef idx="0">
+            <a:schemeClr val="accent1"/>
+          </a:effectRef>
+          <a:fontRef idx="minor">
+            <a:schemeClr val="lt1"/>
+          </a:fontRef>
+        </p:style>
+        <p:txBody>
+          <a:bodyPr rtlCol="0" anchor="ctr"/>
+          <a:lstStyle/>
+          <a:p>
+            <a:pPr algn="ctr"/>
+            <a:endParaRPr lang="ru-RU"/>
+          </a:p>
+        </p:txBody>
+      </p:sp>
+      <p:sp>
+        <p:nvSpPr>
+          <p:cNvPr id="8" name="TextBox 7"/>
+          <p:cNvSpPr txBox="1"/>
+          <p:nvPr/>
+        </p:nvSpPr>
+        <p:spPr>
+          <a:xfrm>
+            <a:off x="3043062" y="1189085"/>
+            <a:ext cx="8598090" cy="3693319"/>
+          </a:xfrm>
+          <a:prstGeom prst="rect">
+            <a:avLst/>
+          </a:prstGeom>
+          <a:noFill/>
+        </p:spPr>
+        <p:txBody>
+          <a:bodyPr wrap="square" rtlCol="0">
+            <a:spAutoFit/>
+          </a:bodyPr>
+          <a:lstStyle/>
+          <a:p>
+            <a:r>
+              <a:rPr lang="en-US" b="1" dirty="0" smtClean="0"/>
+              <a:t>AVS </a:t>
+            </a:r>
+            <a:r>
+              <a:rPr lang="en-US" b="1" dirty="0" err="1" smtClean="0"/>
+              <a:t>StaticSite</a:t>
+            </a:r>
+            <a:r>
+              <a:rPr lang="en-US" b="1" dirty="0" smtClean="0"/>
+              <a:t> Hosting</a:t>
+            </a:r>
+            <a:r>
+              <a:rPr lang="en-US" dirty="0" smtClean="0"/>
+              <a:t> allows a user to host simple static site and manage it. The user can turn site on or off, upload different types of content, remove some content, or delete site at all. </a:t>
+            </a:r>
+            <a:endParaRPr lang="ru-RU" dirty="0" smtClean="0"/>
+          </a:p>
+          <a:p>
+            <a:endParaRPr lang="en-US" dirty="0" smtClean="0"/>
+          </a:p>
+          <a:p>
+            <a:r>
+              <a:rPr lang="en-US" dirty="0" smtClean="0"/>
+              <a:t>Currently the project consists of 2 different modules – specific static site middleware and dashboard UI with REST API.</a:t>
+            </a:r>
+          </a:p>
+          <a:p>
+            <a:endParaRPr lang="en-US" dirty="0" smtClean="0"/>
+          </a:p>
+          <a:p>
+            <a:r>
+              <a:rPr lang="en-US" dirty="0" smtClean="0"/>
+              <a:t>All you need is to choose your site name &amp; upload site content (*.html, *.</a:t>
+            </a:r>
+            <a:r>
+              <a:rPr lang="en-US" dirty="0" err="1" smtClean="0"/>
+              <a:t>js</a:t>
+            </a:r>
+            <a:r>
+              <a:rPr lang="en-US" dirty="0" smtClean="0"/>
+              <a:t>. *.</a:t>
+            </a:r>
+            <a:r>
+              <a:rPr lang="en-US" dirty="0" err="1" smtClean="0"/>
+              <a:t>css</a:t>
+            </a:r>
+            <a:r>
+              <a:rPr lang="en-US" dirty="0" smtClean="0"/>
+              <a:t>).  You also may choose the landing page for your site. After it your site will be able on the route</a:t>
+            </a:r>
+          </a:p>
+          <a:p>
+            <a:r>
+              <a:rPr lang="en-US" b="1" dirty="0" smtClean="0"/>
+              <a:t>http://{Your site name}/{landing page}</a:t>
+            </a:r>
+            <a:r>
+              <a:rPr lang="en-US" dirty="0" smtClean="0"/>
+              <a:t>.</a:t>
+            </a:r>
+          </a:p>
+          <a:p>
+            <a:endParaRPr lang="en-US" dirty="0" smtClean="0"/>
+          </a:p>
+          <a:p>
+            <a:r>
+              <a:rPr lang="en-US" dirty="0" smtClean="0"/>
+              <a:t>To host your sites, the account registration is required. After registration you have a possibility to view your sites and manage them using our </a:t>
+            </a:r>
+            <a:r>
+              <a:rPr lang="en-US" b="1" dirty="0" smtClean="0"/>
+              <a:t>Dashboard</a:t>
+            </a:r>
+            <a:r>
+              <a:rPr lang="en-US" dirty="0" smtClean="0"/>
+              <a:t>. </a:t>
+            </a:r>
+            <a:endParaRPr lang="ru-RU" dirty="0"/>
+          </a:p>
+        </p:txBody>
+      </p:sp>
+    </p:spTree>
+    <p:extLst>
+      <p:ext uri="{BB962C8B-B14F-4D97-AF65-F5344CB8AC3E}">
+        <p14:creationId xmlns:p14="http://schemas.microsoft.com/office/powerpoint/2010/main" val="1927936537"/>
+      </p:ext>
+    </p:extLst>
+  </p:cSld>
+  <p:clrMapOvr>
+    <a:masterClrMapping/>
+  </p:clrMapOvr>
+</p:sld>
+</file>
+
+<file path=ppt/slides/slide13.xml><?xml version="1.0" encoding="utf-8"?>
+<p:sld xmlns:a="http://schemas.openxmlformats.org/drawingml/2006/main" xmlns:r="http://schemas.openxmlformats.org/officeDocument/2006/relationships" xmlns:p="http://schemas.openxmlformats.org/presentationml/2006/main">
+  <p:cSld>
+    <p:spTree>
+      <p:nvGrpSpPr>
+        <p:cNvPr id="1" name=""/>
+        <p:cNvGrpSpPr/>
+        <p:nvPr/>
+      </p:nvGrpSpPr>
+      <p:grpSpPr>
+        <a:xfrm>
+          <a:off x="0" y="0"/>
+          <a:ext cx="0" cy="0"/>
+          <a:chOff x="0" y="0"/>
+          <a:chExt cx="0" cy="0"/>
+        </a:xfrm>
+      </p:grpSpPr>
+      <p:sp>
+        <p:nvSpPr>
+          <p:cNvPr id="2" name="Title 1"/>
+          <p:cNvSpPr>
+            <a:spLocks noGrp="1"/>
+          </p:cNvSpPr>
+          <p:nvPr>
+            <p:ph type="title"/>
+          </p:nvPr>
+        </p:nvSpPr>
+        <p:spPr>
+          <a:xfrm>
+            <a:off x="374984" y="0"/>
+            <a:ext cx="10515600" cy="1325563"/>
+          </a:xfrm>
+        </p:spPr>
+        <p:txBody>
+          <a:bodyPr/>
+          <a:lstStyle/>
+          <a:p>
+            <a:r>
+              <a:rPr lang="en-US" dirty="0" smtClean="0"/>
+              <a:t>Help – Dashboard</a:t>
+            </a:r>
+            <a:endParaRPr lang="ru-RU" dirty="0"/>
+          </a:p>
+        </p:txBody>
+      </p:sp>
+      <p:sp>
+        <p:nvSpPr>
+          <p:cNvPr id="4" name="Rectangle 3"/>
+          <p:cNvSpPr/>
+          <p:nvPr/>
+        </p:nvSpPr>
+        <p:spPr>
+          <a:xfrm>
+            <a:off x="306805" y="1052763"/>
+            <a:ext cx="2497810" cy="5654842"/>
+          </a:xfrm>
+          <a:prstGeom prst="rect">
+            <a:avLst/>
+          </a:prstGeom>
+          <a:noFill/>
+        </p:spPr>
+        <p:style>
+          <a:lnRef idx="2">
+            <a:schemeClr val="accent1">
+              <a:shade val="50000"/>
+            </a:schemeClr>
+          </a:lnRef>
+          <a:fillRef idx="1">
+            <a:schemeClr val="accent1"/>
+          </a:fillRef>
+          <a:effectRef idx="0">
+            <a:schemeClr val="accent1"/>
+          </a:effectRef>
+          <a:fontRef idx="minor">
+            <a:schemeClr val="lt1"/>
+          </a:fontRef>
+        </p:style>
+        <p:txBody>
+          <a:bodyPr rtlCol="0" anchor="ctr"/>
+          <a:lstStyle/>
+          <a:p>
+            <a:pPr algn="ctr"/>
+            <a:endParaRPr lang="ru-RU"/>
+          </a:p>
+        </p:txBody>
+      </p:sp>
+      <p:sp>
+        <p:nvSpPr>
+          <p:cNvPr id="5" name="TextBox 4"/>
+          <p:cNvSpPr txBox="1"/>
+          <p:nvPr/>
+        </p:nvSpPr>
+        <p:spPr>
+          <a:xfrm>
+            <a:off x="374984" y="1189085"/>
+            <a:ext cx="2313296" cy="369332"/>
+          </a:xfrm>
+          <a:prstGeom prst="rect">
+            <a:avLst/>
+          </a:prstGeom>
+          <a:noFill/>
+        </p:spPr>
+        <p:txBody>
+          <a:bodyPr wrap="square" rtlCol="0">
+            <a:spAutoFit/>
+          </a:bodyPr>
+          <a:lstStyle/>
+          <a:p>
+            <a:r>
+              <a:rPr lang="en-US" dirty="0" smtClean="0"/>
+              <a:t>General</a:t>
+            </a:r>
+            <a:endParaRPr lang="ru-RU" dirty="0"/>
+          </a:p>
+        </p:txBody>
+      </p:sp>
+      <p:sp>
+        <p:nvSpPr>
+          <p:cNvPr id="6" name="TextBox 5"/>
+          <p:cNvSpPr txBox="1"/>
+          <p:nvPr/>
+        </p:nvSpPr>
+        <p:spPr>
+          <a:xfrm>
+            <a:off x="729766" y="1554010"/>
+            <a:ext cx="2026693" cy="1200329"/>
+          </a:xfrm>
+          <a:prstGeom prst="rect">
+            <a:avLst/>
+          </a:prstGeom>
+          <a:noFill/>
+        </p:spPr>
+        <p:txBody>
+          <a:bodyPr wrap="square" rtlCol="0">
+            <a:spAutoFit/>
+          </a:bodyPr>
+          <a:lstStyle/>
+          <a:p>
+            <a:r>
+              <a:rPr lang="en-US" dirty="0" smtClean="0"/>
+              <a:t>Getting started</a:t>
+            </a:r>
+          </a:p>
+          <a:p>
+            <a:r>
+              <a:rPr lang="en-US" b="1" dirty="0" smtClean="0"/>
+              <a:t>Dashboard</a:t>
+            </a:r>
+          </a:p>
+          <a:p>
+            <a:r>
+              <a:rPr lang="en-US" dirty="0" smtClean="0"/>
+              <a:t>Create site</a:t>
+            </a:r>
+          </a:p>
+          <a:p>
+            <a:r>
+              <a:rPr lang="en-US" dirty="0" smtClean="0"/>
+              <a:t>Site management</a:t>
+            </a:r>
+            <a:endParaRPr lang="ru-RU" dirty="0"/>
+          </a:p>
+        </p:txBody>
+      </p:sp>
+      <p:sp>
+        <p:nvSpPr>
+          <p:cNvPr id="7" name="Rectangle 6"/>
+          <p:cNvSpPr/>
+          <p:nvPr/>
+        </p:nvSpPr>
+        <p:spPr>
+          <a:xfrm>
+            <a:off x="2954740" y="1052763"/>
+            <a:ext cx="9096233" cy="5654842"/>
+          </a:xfrm>
+          <a:prstGeom prst="rect">
+            <a:avLst/>
+          </a:prstGeom>
+          <a:noFill/>
+        </p:spPr>
+        <p:style>
+          <a:lnRef idx="2">
+            <a:schemeClr val="accent1">
+              <a:shade val="50000"/>
+            </a:schemeClr>
+          </a:lnRef>
+          <a:fillRef idx="1">
+            <a:schemeClr val="accent1"/>
+          </a:fillRef>
+          <a:effectRef idx="0">
+            <a:schemeClr val="accent1"/>
+          </a:effectRef>
+          <a:fontRef idx="minor">
+            <a:schemeClr val="lt1"/>
+          </a:fontRef>
+        </p:style>
+        <p:txBody>
+          <a:bodyPr rtlCol="0" anchor="ctr"/>
+          <a:lstStyle/>
+          <a:p>
+            <a:pPr algn="ctr"/>
+            <a:endParaRPr lang="ru-RU"/>
+          </a:p>
+        </p:txBody>
+      </p:sp>
+      <p:sp>
+        <p:nvSpPr>
+          <p:cNvPr id="8" name="TextBox 7"/>
+          <p:cNvSpPr txBox="1"/>
+          <p:nvPr/>
+        </p:nvSpPr>
+        <p:spPr>
+          <a:xfrm>
+            <a:off x="3043062" y="1189085"/>
+            <a:ext cx="8598090" cy="3970318"/>
+          </a:xfrm>
+          <a:prstGeom prst="rect">
+            <a:avLst/>
+          </a:prstGeom>
+          <a:noFill/>
+        </p:spPr>
+        <p:txBody>
+          <a:bodyPr wrap="square" rtlCol="0">
+            <a:spAutoFit/>
+          </a:bodyPr>
+          <a:lstStyle/>
+          <a:p>
+            <a:r>
+              <a:rPr lang="en-US" b="1" dirty="0" smtClean="0"/>
+              <a:t>Dashboard</a:t>
+            </a:r>
+            <a:r>
+              <a:rPr lang="en-US" dirty="0" smtClean="0"/>
+              <a:t> page shows all your sites and allows to manage them. Each site must have a name required for site routing, but you can also provide a site description which can be displayed in the dashboard grid. The dashboard also provide additional information about sites including site creation date.  </a:t>
+            </a:r>
+          </a:p>
+          <a:p>
+            <a:endParaRPr lang="en-US" dirty="0"/>
+          </a:p>
+          <a:p>
+            <a:endParaRPr lang="en-US" dirty="0" smtClean="0"/>
+          </a:p>
+          <a:p>
+            <a:endParaRPr lang="en-US" dirty="0" smtClean="0"/>
+          </a:p>
+          <a:p>
+            <a:r>
+              <a:rPr lang="en-US" dirty="0" smtClean="0"/>
+              <a:t>Use </a:t>
+            </a:r>
+            <a:r>
+              <a:rPr lang="en-US" b="1" dirty="0" smtClean="0"/>
+              <a:t>action column</a:t>
+            </a:r>
+            <a:r>
+              <a:rPr lang="en-US" dirty="0" smtClean="0"/>
+              <a:t> buttons to manage the site selected. You can </a:t>
+            </a:r>
+            <a:r>
+              <a:rPr lang="en-US" b="1" dirty="0" smtClean="0"/>
+              <a:t>turn</a:t>
+            </a:r>
+            <a:r>
+              <a:rPr lang="en-US" dirty="0" smtClean="0"/>
+              <a:t> it </a:t>
+            </a:r>
+            <a:r>
+              <a:rPr lang="en-US" b="1" dirty="0" smtClean="0"/>
+              <a:t>on/off</a:t>
+            </a:r>
+            <a:r>
+              <a:rPr lang="en-US" dirty="0" smtClean="0"/>
+              <a:t>, edit (</a:t>
+            </a:r>
+            <a:r>
+              <a:rPr lang="en-US" b="1" dirty="0" smtClean="0"/>
+              <a:t>update</a:t>
+            </a:r>
+            <a:r>
+              <a:rPr lang="en-US" dirty="0" smtClean="0"/>
+              <a:t>), </a:t>
+            </a:r>
+            <a:r>
+              <a:rPr lang="en-US" b="1" dirty="0" smtClean="0"/>
+              <a:t>delete</a:t>
+            </a:r>
+            <a:r>
+              <a:rPr lang="en-US" dirty="0" smtClean="0"/>
+              <a:t> site, or </a:t>
+            </a:r>
+            <a:r>
+              <a:rPr lang="en-US" b="1" dirty="0" smtClean="0"/>
+              <a:t>browse</a:t>
+            </a:r>
+            <a:r>
+              <a:rPr lang="en-US" dirty="0" smtClean="0"/>
+              <a:t> it. If you select </a:t>
+            </a:r>
+            <a:r>
+              <a:rPr lang="en-US" b="1" dirty="0" smtClean="0"/>
+              <a:t>Update</a:t>
+            </a:r>
+            <a:r>
+              <a:rPr lang="en-US" dirty="0" smtClean="0"/>
+              <a:t>, the </a:t>
+            </a:r>
+            <a:r>
+              <a:rPr lang="en-US" b="1" dirty="0" smtClean="0"/>
+              <a:t>Edit Site </a:t>
+            </a:r>
+            <a:r>
+              <a:rPr lang="en-US" dirty="0" smtClean="0"/>
+              <a:t>page will open.</a:t>
+            </a:r>
+          </a:p>
+          <a:p>
+            <a:r>
+              <a:rPr lang="en-US" dirty="0" smtClean="0"/>
+              <a:t>Please note that selecting </a:t>
+            </a:r>
+            <a:r>
+              <a:rPr lang="en-US" b="1" dirty="0" smtClean="0"/>
+              <a:t>Delete</a:t>
+            </a:r>
+            <a:r>
+              <a:rPr lang="en-US" dirty="0" smtClean="0"/>
+              <a:t> and confirming your operation will remove all site data with the site content. Use this option very carefully.</a:t>
+            </a:r>
+          </a:p>
+          <a:p>
+            <a:endParaRPr lang="en-US" dirty="0"/>
+          </a:p>
+          <a:p>
+            <a:r>
+              <a:rPr lang="en-US" dirty="0" smtClean="0"/>
+              <a:t>The link </a:t>
+            </a:r>
+            <a:r>
+              <a:rPr lang="en-US" b="1" dirty="0" smtClean="0"/>
+              <a:t>Browse</a:t>
+            </a:r>
+            <a:r>
+              <a:rPr lang="en-US" dirty="0" smtClean="0"/>
+              <a:t> appears </a:t>
+            </a:r>
+            <a:r>
+              <a:rPr lang="en-US" b="1" dirty="0" smtClean="0"/>
+              <a:t>only</a:t>
+            </a:r>
+            <a:r>
+              <a:rPr lang="en-US" dirty="0" smtClean="0"/>
+              <a:t> if you have provided the landing page for site. You can do it using the </a:t>
+            </a:r>
+            <a:r>
+              <a:rPr lang="en-US" b="1" dirty="0" smtClean="0"/>
+              <a:t>Edit Site</a:t>
+            </a:r>
+            <a:r>
+              <a:rPr lang="en-US" dirty="0" smtClean="0"/>
+              <a:t> page.</a:t>
+            </a:r>
+            <a:endParaRPr lang="ru-RU" dirty="0"/>
+          </a:p>
+        </p:txBody>
+      </p:sp>
+      <p:pic>
+        <p:nvPicPr>
+          <p:cNvPr id="3" name="Picture 2"/>
+          <p:cNvPicPr>
+            <a:picLocks noChangeAspect="1"/>
+          </p:cNvPicPr>
+          <p:nvPr/>
+        </p:nvPicPr>
+        <p:blipFill>
+          <a:blip r:embed="rId2"/>
+          <a:stretch>
+            <a:fillRect/>
+          </a:stretch>
+        </p:blipFill>
+        <p:spPr>
+          <a:xfrm>
+            <a:off x="3144835" y="2407104"/>
+            <a:ext cx="8701227" cy="665264"/>
+          </a:xfrm>
+          <a:prstGeom prst="rect">
+            <a:avLst/>
+          </a:prstGeom>
+        </p:spPr>
+      </p:pic>
+    </p:spTree>
+    <p:extLst>
+      <p:ext uri="{BB962C8B-B14F-4D97-AF65-F5344CB8AC3E}">
+        <p14:creationId xmlns:p14="http://schemas.microsoft.com/office/powerpoint/2010/main" val="214815498"/>
+      </p:ext>
+    </p:extLst>
+  </p:cSld>
+  <p:clrMapOvr>
+    <a:masterClrMapping/>
+  </p:clrMapOvr>
+</p:sld>
+</file>
+
+<file path=ppt/slides/slide14.xml><?xml version="1.0" encoding="utf-8"?>
+<p:sld xmlns:a="http://schemas.openxmlformats.org/drawingml/2006/main" xmlns:r="http://schemas.openxmlformats.org/officeDocument/2006/relationships" xmlns:p="http://schemas.openxmlformats.org/presentationml/2006/main">
+  <p:cSld>
+    <p:spTree>
+      <p:nvGrpSpPr>
+        <p:cNvPr id="1" name=""/>
+        <p:cNvGrpSpPr/>
+        <p:nvPr/>
+      </p:nvGrpSpPr>
+      <p:grpSpPr>
+        <a:xfrm>
+          <a:off x="0" y="0"/>
+          <a:ext cx="0" cy="0"/>
+          <a:chOff x="0" y="0"/>
+          <a:chExt cx="0" cy="0"/>
+        </a:xfrm>
+      </p:grpSpPr>
+      <p:sp>
+        <p:nvSpPr>
+          <p:cNvPr id="2" name="Title 1"/>
+          <p:cNvSpPr>
+            <a:spLocks noGrp="1"/>
+          </p:cNvSpPr>
+          <p:nvPr>
+            <p:ph type="title"/>
+          </p:nvPr>
+        </p:nvSpPr>
+        <p:spPr>
+          <a:xfrm>
+            <a:off x="374984" y="0"/>
+            <a:ext cx="10515600" cy="1325563"/>
+          </a:xfrm>
+        </p:spPr>
+        <p:txBody>
+          <a:bodyPr/>
+          <a:lstStyle/>
+          <a:p>
+            <a:r>
+              <a:rPr lang="en-US" dirty="0" smtClean="0"/>
+              <a:t>Help – Create Site</a:t>
+            </a:r>
+            <a:endParaRPr lang="ru-RU" dirty="0"/>
+          </a:p>
+        </p:txBody>
+      </p:sp>
+      <p:sp>
+        <p:nvSpPr>
+          <p:cNvPr id="4" name="Rectangle 3"/>
+          <p:cNvSpPr/>
+          <p:nvPr/>
+        </p:nvSpPr>
+        <p:spPr>
+          <a:xfrm>
+            <a:off x="306805" y="1052763"/>
+            <a:ext cx="2497810" cy="5654842"/>
+          </a:xfrm>
+          <a:prstGeom prst="rect">
+            <a:avLst/>
+          </a:prstGeom>
+          <a:noFill/>
+        </p:spPr>
+        <p:style>
+          <a:lnRef idx="2">
+            <a:schemeClr val="accent1">
+              <a:shade val="50000"/>
+            </a:schemeClr>
+          </a:lnRef>
+          <a:fillRef idx="1">
+            <a:schemeClr val="accent1"/>
+          </a:fillRef>
+          <a:effectRef idx="0">
+            <a:schemeClr val="accent1"/>
+          </a:effectRef>
+          <a:fontRef idx="minor">
+            <a:schemeClr val="lt1"/>
+          </a:fontRef>
+        </p:style>
+        <p:txBody>
+          <a:bodyPr rtlCol="0" anchor="ctr"/>
+          <a:lstStyle/>
+          <a:p>
+            <a:pPr algn="ctr"/>
+            <a:endParaRPr lang="ru-RU"/>
+          </a:p>
+        </p:txBody>
+      </p:sp>
+      <p:sp>
+        <p:nvSpPr>
+          <p:cNvPr id="5" name="TextBox 4"/>
+          <p:cNvSpPr txBox="1"/>
+          <p:nvPr/>
+        </p:nvSpPr>
+        <p:spPr>
+          <a:xfrm>
+            <a:off x="374984" y="1189085"/>
+            <a:ext cx="2313296" cy="369332"/>
+          </a:xfrm>
+          <a:prstGeom prst="rect">
+            <a:avLst/>
+          </a:prstGeom>
+          <a:noFill/>
+        </p:spPr>
+        <p:txBody>
+          <a:bodyPr wrap="square" rtlCol="0">
+            <a:spAutoFit/>
+          </a:bodyPr>
+          <a:lstStyle/>
+          <a:p>
+            <a:r>
+              <a:rPr lang="en-US" dirty="0" smtClean="0"/>
+              <a:t>General</a:t>
+            </a:r>
+            <a:endParaRPr lang="ru-RU" dirty="0"/>
+          </a:p>
+        </p:txBody>
+      </p:sp>
+      <p:sp>
+        <p:nvSpPr>
+          <p:cNvPr id="6" name="TextBox 5"/>
+          <p:cNvSpPr txBox="1"/>
+          <p:nvPr/>
+        </p:nvSpPr>
+        <p:spPr>
+          <a:xfrm>
+            <a:off x="729766" y="1554010"/>
+            <a:ext cx="2026693" cy="1200329"/>
+          </a:xfrm>
+          <a:prstGeom prst="rect">
+            <a:avLst/>
+          </a:prstGeom>
+          <a:noFill/>
+        </p:spPr>
+        <p:txBody>
+          <a:bodyPr wrap="square" rtlCol="0">
+            <a:spAutoFit/>
+          </a:bodyPr>
+          <a:lstStyle/>
+          <a:p>
+            <a:r>
+              <a:rPr lang="en-US" dirty="0" smtClean="0"/>
+              <a:t>Getting started</a:t>
+            </a:r>
+          </a:p>
+          <a:p>
+            <a:r>
+              <a:rPr lang="en-US" dirty="0" smtClean="0"/>
+              <a:t>Dashboard</a:t>
+            </a:r>
+          </a:p>
+          <a:p>
+            <a:r>
+              <a:rPr lang="en-US" b="1" dirty="0" smtClean="0"/>
+              <a:t>Create site</a:t>
+            </a:r>
+          </a:p>
+          <a:p>
+            <a:r>
+              <a:rPr lang="en-US" dirty="0" smtClean="0"/>
+              <a:t>Site management</a:t>
+            </a:r>
+            <a:endParaRPr lang="ru-RU" dirty="0"/>
+          </a:p>
+        </p:txBody>
+      </p:sp>
+      <p:sp>
+        <p:nvSpPr>
+          <p:cNvPr id="7" name="Rectangle 6"/>
+          <p:cNvSpPr/>
+          <p:nvPr/>
+        </p:nvSpPr>
+        <p:spPr>
+          <a:xfrm>
+            <a:off x="2954740" y="1052763"/>
+            <a:ext cx="9096233" cy="5654842"/>
+          </a:xfrm>
+          <a:prstGeom prst="rect">
+            <a:avLst/>
+          </a:prstGeom>
+          <a:noFill/>
+        </p:spPr>
+        <p:style>
+          <a:lnRef idx="2">
+            <a:schemeClr val="accent1">
+              <a:shade val="50000"/>
+            </a:schemeClr>
+          </a:lnRef>
+          <a:fillRef idx="1">
+            <a:schemeClr val="accent1"/>
+          </a:fillRef>
+          <a:effectRef idx="0">
+            <a:schemeClr val="accent1"/>
+          </a:effectRef>
+          <a:fontRef idx="minor">
+            <a:schemeClr val="lt1"/>
+          </a:fontRef>
+        </p:style>
+        <p:txBody>
+          <a:bodyPr rtlCol="0" anchor="ctr"/>
+          <a:lstStyle/>
+          <a:p>
+            <a:pPr algn="ctr"/>
+            <a:endParaRPr lang="ru-RU"/>
+          </a:p>
+        </p:txBody>
+      </p:sp>
+      <p:sp>
+        <p:nvSpPr>
+          <p:cNvPr id="9" name="TextBox 8"/>
+          <p:cNvSpPr txBox="1"/>
+          <p:nvPr/>
+        </p:nvSpPr>
+        <p:spPr>
+          <a:xfrm>
+            <a:off x="3104147" y="1245268"/>
+            <a:ext cx="8692816" cy="646331"/>
+          </a:xfrm>
+          <a:prstGeom prst="rect">
+            <a:avLst/>
+          </a:prstGeom>
+          <a:noFill/>
+        </p:spPr>
+        <p:txBody>
+          <a:bodyPr wrap="square" rtlCol="0">
+            <a:spAutoFit/>
+          </a:bodyPr>
+          <a:lstStyle/>
+          <a:p>
+            <a:r>
+              <a:rPr lang="en-US" dirty="0" smtClean="0"/>
+              <a:t>To create new site installation, click the link </a:t>
+            </a:r>
+            <a:r>
+              <a:rPr lang="en-US" b="1" dirty="0" smtClean="0"/>
+              <a:t>“Add new site…” </a:t>
+            </a:r>
+            <a:r>
+              <a:rPr lang="en-US" dirty="0" smtClean="0"/>
+              <a:t>in the Dashboard page. The Create Site page will open:</a:t>
+            </a:r>
+            <a:endParaRPr lang="ru-RU" dirty="0"/>
+          </a:p>
+        </p:txBody>
+      </p:sp>
+      <p:pic>
+        <p:nvPicPr>
+          <p:cNvPr id="10" name="Picture 9"/>
+          <p:cNvPicPr>
+            <a:picLocks noChangeAspect="1"/>
+          </p:cNvPicPr>
+          <p:nvPr/>
+        </p:nvPicPr>
+        <p:blipFill>
+          <a:blip r:embed="rId2"/>
+          <a:stretch>
+            <a:fillRect/>
+          </a:stretch>
+        </p:blipFill>
+        <p:spPr>
+          <a:xfrm>
+            <a:off x="3227576" y="1891599"/>
+            <a:ext cx="5501335" cy="2457488"/>
+          </a:xfrm>
+          <a:prstGeom prst="rect">
+            <a:avLst/>
+          </a:prstGeom>
+        </p:spPr>
+      </p:pic>
+      <p:sp>
+        <p:nvSpPr>
+          <p:cNvPr id="11" name="TextBox 10"/>
+          <p:cNvSpPr txBox="1"/>
+          <p:nvPr/>
+        </p:nvSpPr>
+        <p:spPr>
+          <a:xfrm>
+            <a:off x="8728911" y="1800592"/>
+            <a:ext cx="2989847" cy="2031325"/>
+          </a:xfrm>
+          <a:prstGeom prst="rect">
+            <a:avLst/>
+          </a:prstGeom>
+          <a:noFill/>
+        </p:spPr>
+        <p:txBody>
+          <a:bodyPr wrap="square" rtlCol="0">
+            <a:spAutoFit/>
+          </a:bodyPr>
+          <a:lstStyle/>
+          <a:p>
+            <a:r>
+              <a:rPr lang="en-US" dirty="0" smtClean="0"/>
+              <a:t>Enter a site name (required), description (optional), and landing page (e.g. index.html).</a:t>
+            </a:r>
+          </a:p>
+          <a:p>
+            <a:r>
+              <a:rPr lang="en-US" dirty="0" smtClean="0"/>
+              <a:t>Check </a:t>
+            </a:r>
+            <a:r>
+              <a:rPr lang="en-US" b="1" dirty="0" smtClean="0"/>
+              <a:t>“Is Active”</a:t>
+            </a:r>
+            <a:r>
+              <a:rPr lang="en-US" dirty="0" smtClean="0"/>
+              <a:t> if you want the new site to be accessible for routing.</a:t>
+            </a:r>
+            <a:endParaRPr lang="ru-RU" dirty="0"/>
+          </a:p>
+        </p:txBody>
+      </p:sp>
+      <p:sp>
+        <p:nvSpPr>
+          <p:cNvPr id="12" name="TextBox 11"/>
+          <p:cNvSpPr txBox="1"/>
+          <p:nvPr/>
+        </p:nvSpPr>
+        <p:spPr>
+          <a:xfrm>
+            <a:off x="8750072" y="3792853"/>
+            <a:ext cx="2737184" cy="646331"/>
+          </a:xfrm>
+          <a:prstGeom prst="rect">
+            <a:avLst/>
+          </a:prstGeom>
+          <a:noFill/>
+        </p:spPr>
+        <p:txBody>
+          <a:bodyPr wrap="square" rtlCol="0">
+            <a:spAutoFit/>
+          </a:bodyPr>
+          <a:lstStyle/>
+          <a:p>
+            <a:r>
+              <a:rPr lang="en-US" dirty="0" smtClean="0"/>
+              <a:t>Upload site content using </a:t>
+            </a:r>
+            <a:r>
+              <a:rPr lang="en-US" b="1" dirty="0" smtClean="0"/>
+              <a:t>Upload Files</a:t>
+            </a:r>
+            <a:r>
+              <a:rPr lang="en-US" dirty="0" smtClean="0"/>
+              <a:t> section</a:t>
+            </a:r>
+            <a:endParaRPr lang="ru-RU" dirty="0"/>
+          </a:p>
+        </p:txBody>
+      </p:sp>
+      <p:sp>
+        <p:nvSpPr>
+          <p:cNvPr id="14" name="TextBox 13"/>
+          <p:cNvSpPr txBox="1"/>
+          <p:nvPr/>
+        </p:nvSpPr>
+        <p:spPr>
+          <a:xfrm>
+            <a:off x="3123751" y="4426704"/>
+            <a:ext cx="8653608" cy="923330"/>
+          </a:xfrm>
+          <a:prstGeom prst="rect">
+            <a:avLst/>
+          </a:prstGeom>
+          <a:noFill/>
+        </p:spPr>
+        <p:txBody>
+          <a:bodyPr wrap="square" rtlCol="0">
+            <a:spAutoFit/>
+          </a:bodyPr>
+          <a:lstStyle/>
+          <a:p>
+            <a:r>
+              <a:rPr lang="en-US" dirty="0" smtClean="0"/>
+              <a:t>For upload you can specify </a:t>
+            </a:r>
+            <a:r>
+              <a:rPr lang="en-US" b="1" dirty="0" smtClean="0"/>
+              <a:t>destination path</a:t>
+            </a:r>
+            <a:r>
+              <a:rPr lang="en-US" dirty="0" smtClean="0"/>
+              <a:t>. For example, if you have a reference like </a:t>
+            </a:r>
+            <a:r>
+              <a:rPr lang="en-US" dirty="0" err="1" smtClean="0"/>
+              <a:t>js</a:t>
+            </a:r>
+            <a:r>
+              <a:rPr lang="en-US" dirty="0" smtClean="0"/>
+              <a:t>/my-site.js in your index.html, you should upload my-site.js and specify destination path as </a:t>
+            </a:r>
+            <a:r>
+              <a:rPr lang="en-US" dirty="0" err="1" smtClean="0"/>
+              <a:t>js</a:t>
+            </a:r>
+            <a:r>
+              <a:rPr lang="en-US" dirty="0" smtClean="0"/>
+              <a:t>. Files without destination path are placed in the site root directory.</a:t>
+            </a:r>
+            <a:endParaRPr lang="ru-RU" dirty="0"/>
+          </a:p>
+        </p:txBody>
+      </p:sp>
+      <p:sp>
+        <p:nvSpPr>
+          <p:cNvPr id="15" name="TextBox 14"/>
+          <p:cNvSpPr txBox="1"/>
+          <p:nvPr/>
+        </p:nvSpPr>
+        <p:spPr>
+          <a:xfrm>
+            <a:off x="3123751" y="5327011"/>
+            <a:ext cx="8404058" cy="923330"/>
+          </a:xfrm>
+          <a:prstGeom prst="rect">
+            <a:avLst/>
+          </a:prstGeom>
+          <a:noFill/>
+        </p:spPr>
+        <p:txBody>
+          <a:bodyPr wrap="square" rtlCol="0">
+            <a:spAutoFit/>
+          </a:bodyPr>
+          <a:lstStyle/>
+          <a:p>
+            <a:r>
+              <a:rPr lang="en-US" dirty="0" smtClean="0"/>
+              <a:t>You can provide resource mappings for the content files uploaded. For example, if there is a file like about.html and you have provided the resource mapping for it as “about”, the file will be available through the route http://{your site}/about.</a:t>
+            </a:r>
+            <a:endParaRPr lang="ru-RU" dirty="0"/>
+          </a:p>
+        </p:txBody>
+      </p:sp>
+      <p:sp>
+        <p:nvSpPr>
+          <p:cNvPr id="16" name="TextBox 15"/>
+          <p:cNvSpPr txBox="1"/>
+          <p:nvPr/>
+        </p:nvSpPr>
+        <p:spPr>
+          <a:xfrm>
+            <a:off x="3123751" y="6294307"/>
+            <a:ext cx="8208440" cy="369332"/>
+          </a:xfrm>
+          <a:prstGeom prst="rect">
+            <a:avLst/>
+          </a:prstGeom>
+          <a:noFill/>
+        </p:spPr>
+        <p:txBody>
+          <a:bodyPr wrap="square" rtlCol="0">
+            <a:spAutoFit/>
+          </a:bodyPr>
+          <a:lstStyle/>
+          <a:p>
+            <a:r>
+              <a:rPr lang="en-US" dirty="0" smtClean="0"/>
+              <a:t>To create a site, you have to upload some content and set the site name.</a:t>
+            </a:r>
+            <a:endParaRPr lang="ru-RU" dirty="0"/>
+          </a:p>
+        </p:txBody>
+      </p:sp>
+    </p:spTree>
+    <p:extLst>
+      <p:ext uri="{BB962C8B-B14F-4D97-AF65-F5344CB8AC3E}">
+        <p14:creationId xmlns:p14="http://schemas.microsoft.com/office/powerpoint/2010/main" val="757399734"/>
+      </p:ext>
+    </p:extLst>
+  </p:cSld>
+  <p:clrMapOvr>
+    <a:masterClrMapping/>
+  </p:clrMapOvr>
+</p:sld>
+</file>
+
+<file path=ppt/slides/slide15.xml><?xml version="1.0" encoding="utf-8"?>
+<p:sld xmlns:a="http://schemas.openxmlformats.org/drawingml/2006/main" xmlns:r="http://schemas.openxmlformats.org/officeDocument/2006/relationships" xmlns:p="http://schemas.openxmlformats.org/presentationml/2006/main">
+  <p:cSld>
+    <p:spTree>
+      <p:nvGrpSpPr>
+        <p:cNvPr id="1" name=""/>
+        <p:cNvGrpSpPr/>
+        <p:nvPr/>
+      </p:nvGrpSpPr>
+      <p:grpSpPr>
+        <a:xfrm>
+          <a:off x="0" y="0"/>
+          <a:ext cx="0" cy="0"/>
+          <a:chOff x="0" y="0"/>
+          <a:chExt cx="0" cy="0"/>
+        </a:xfrm>
+      </p:grpSpPr>
+      <p:sp>
+        <p:nvSpPr>
+          <p:cNvPr id="2" name="Title 1"/>
+          <p:cNvSpPr>
+            <a:spLocks noGrp="1"/>
+          </p:cNvSpPr>
+          <p:nvPr>
+            <p:ph type="title"/>
+          </p:nvPr>
+        </p:nvSpPr>
+        <p:spPr>
+          <a:xfrm>
+            <a:off x="374984" y="0"/>
+            <a:ext cx="10515600" cy="1325563"/>
+          </a:xfrm>
+        </p:spPr>
+        <p:txBody>
+          <a:bodyPr/>
+          <a:lstStyle/>
+          <a:p>
+            <a:r>
+              <a:rPr lang="en-US" dirty="0" smtClean="0"/>
+              <a:t>Help – Site Management</a:t>
+            </a:r>
+            <a:endParaRPr lang="ru-RU" dirty="0"/>
+          </a:p>
+        </p:txBody>
+      </p:sp>
+      <p:sp>
+        <p:nvSpPr>
+          <p:cNvPr id="4" name="Rectangle 3"/>
+          <p:cNvSpPr/>
+          <p:nvPr/>
+        </p:nvSpPr>
+        <p:spPr>
+          <a:xfrm>
+            <a:off x="306805" y="1052763"/>
+            <a:ext cx="2497810" cy="5654842"/>
+          </a:xfrm>
+          <a:prstGeom prst="rect">
+            <a:avLst/>
+          </a:prstGeom>
+          <a:noFill/>
+        </p:spPr>
+        <p:style>
+          <a:lnRef idx="2">
+            <a:schemeClr val="accent1">
+              <a:shade val="50000"/>
+            </a:schemeClr>
+          </a:lnRef>
+          <a:fillRef idx="1">
+            <a:schemeClr val="accent1"/>
+          </a:fillRef>
+          <a:effectRef idx="0">
+            <a:schemeClr val="accent1"/>
+          </a:effectRef>
+          <a:fontRef idx="minor">
+            <a:schemeClr val="lt1"/>
+          </a:fontRef>
+        </p:style>
+        <p:txBody>
+          <a:bodyPr rtlCol="0" anchor="ctr"/>
+          <a:lstStyle/>
+          <a:p>
+            <a:pPr algn="ctr"/>
+            <a:endParaRPr lang="ru-RU"/>
+          </a:p>
+        </p:txBody>
+      </p:sp>
+      <p:sp>
+        <p:nvSpPr>
+          <p:cNvPr id="5" name="TextBox 4"/>
+          <p:cNvSpPr txBox="1"/>
+          <p:nvPr/>
+        </p:nvSpPr>
+        <p:spPr>
+          <a:xfrm>
+            <a:off x="374984" y="1189085"/>
+            <a:ext cx="2313296" cy="369332"/>
+          </a:xfrm>
+          <a:prstGeom prst="rect">
+            <a:avLst/>
+          </a:prstGeom>
+          <a:noFill/>
+        </p:spPr>
+        <p:txBody>
+          <a:bodyPr wrap="square" rtlCol="0">
+            <a:spAutoFit/>
+          </a:bodyPr>
+          <a:lstStyle/>
+          <a:p>
+            <a:r>
+              <a:rPr lang="en-US" dirty="0" smtClean="0"/>
+              <a:t>General</a:t>
+            </a:r>
+            <a:endParaRPr lang="ru-RU" dirty="0"/>
+          </a:p>
+        </p:txBody>
+      </p:sp>
+      <p:sp>
+        <p:nvSpPr>
+          <p:cNvPr id="6" name="TextBox 5"/>
+          <p:cNvSpPr txBox="1"/>
+          <p:nvPr/>
+        </p:nvSpPr>
+        <p:spPr>
+          <a:xfrm>
+            <a:off x="729766" y="1554010"/>
+            <a:ext cx="2026693" cy="1200329"/>
+          </a:xfrm>
+          <a:prstGeom prst="rect">
+            <a:avLst/>
+          </a:prstGeom>
+          <a:noFill/>
+        </p:spPr>
+        <p:txBody>
+          <a:bodyPr wrap="square" rtlCol="0">
+            <a:spAutoFit/>
+          </a:bodyPr>
+          <a:lstStyle/>
+          <a:p>
+            <a:r>
+              <a:rPr lang="en-US" dirty="0" smtClean="0"/>
+              <a:t>Getting started</a:t>
+            </a:r>
+          </a:p>
+          <a:p>
+            <a:r>
+              <a:rPr lang="en-US" dirty="0" smtClean="0"/>
+              <a:t>Dashboard</a:t>
+            </a:r>
+          </a:p>
+          <a:p>
+            <a:r>
+              <a:rPr lang="en-US" dirty="0" smtClean="0"/>
+              <a:t>Create site</a:t>
+            </a:r>
+          </a:p>
+          <a:p>
+            <a:r>
+              <a:rPr lang="en-US" b="1" dirty="0" smtClean="0"/>
+              <a:t>Site management</a:t>
+            </a:r>
+            <a:endParaRPr lang="ru-RU" b="1" dirty="0"/>
+          </a:p>
+        </p:txBody>
+      </p:sp>
+      <p:sp>
+        <p:nvSpPr>
+          <p:cNvPr id="7" name="Rectangle 6"/>
+          <p:cNvSpPr/>
+          <p:nvPr/>
+        </p:nvSpPr>
+        <p:spPr>
+          <a:xfrm>
+            <a:off x="2954740" y="1052763"/>
+            <a:ext cx="9096233" cy="5654842"/>
+          </a:xfrm>
+          <a:prstGeom prst="rect">
+            <a:avLst/>
+          </a:prstGeom>
+          <a:noFill/>
+        </p:spPr>
+        <p:style>
+          <a:lnRef idx="2">
+            <a:schemeClr val="accent1">
+              <a:shade val="50000"/>
+            </a:schemeClr>
+          </a:lnRef>
+          <a:fillRef idx="1">
+            <a:schemeClr val="accent1"/>
+          </a:fillRef>
+          <a:effectRef idx="0">
+            <a:schemeClr val="accent1"/>
+          </a:effectRef>
+          <a:fontRef idx="minor">
+            <a:schemeClr val="lt1"/>
+          </a:fontRef>
+        </p:style>
+        <p:txBody>
+          <a:bodyPr rtlCol="0" anchor="ctr"/>
+          <a:lstStyle/>
+          <a:p>
+            <a:pPr algn="ctr"/>
+            <a:endParaRPr lang="ru-RU"/>
+          </a:p>
+        </p:txBody>
+      </p:sp>
+      <p:sp>
+        <p:nvSpPr>
+          <p:cNvPr id="3" name="TextBox 2"/>
+          <p:cNvSpPr txBox="1"/>
+          <p:nvPr/>
+        </p:nvSpPr>
+        <p:spPr>
+          <a:xfrm>
+            <a:off x="3043062" y="1119962"/>
+            <a:ext cx="8692816" cy="646331"/>
+          </a:xfrm>
+          <a:prstGeom prst="rect">
+            <a:avLst/>
+          </a:prstGeom>
+          <a:noFill/>
+        </p:spPr>
+        <p:txBody>
+          <a:bodyPr wrap="square" rtlCol="0">
+            <a:spAutoFit/>
+          </a:bodyPr>
+          <a:lstStyle/>
+          <a:p>
+            <a:r>
+              <a:rPr lang="en-US" dirty="0" smtClean="0"/>
+              <a:t>Use </a:t>
+            </a:r>
+            <a:r>
+              <a:rPr lang="en-US" b="1" dirty="0" smtClean="0"/>
+              <a:t>Update </a:t>
+            </a:r>
+            <a:r>
+              <a:rPr lang="en-US" dirty="0" smtClean="0"/>
+              <a:t>link in the dashboard page to start editing the site selected. The user interface used for site editing is the same that you saw when creating a new site.</a:t>
+            </a:r>
+            <a:endParaRPr lang="ru-RU" dirty="0"/>
+          </a:p>
+        </p:txBody>
+      </p:sp>
+      <p:sp>
+        <p:nvSpPr>
+          <p:cNvPr id="8" name="TextBox 7"/>
+          <p:cNvSpPr txBox="1"/>
+          <p:nvPr/>
+        </p:nvSpPr>
+        <p:spPr>
+          <a:xfrm>
+            <a:off x="3043062" y="1864371"/>
+            <a:ext cx="8091237" cy="923330"/>
+          </a:xfrm>
+          <a:prstGeom prst="rect">
+            <a:avLst/>
+          </a:prstGeom>
+          <a:noFill/>
+        </p:spPr>
+        <p:txBody>
+          <a:bodyPr wrap="square" rtlCol="0">
+            <a:spAutoFit/>
+          </a:bodyPr>
+          <a:lstStyle/>
+          <a:p>
+            <a:r>
+              <a:rPr lang="en-US" dirty="0" smtClean="0"/>
+              <a:t>During editing, you can change site name, description, landing page and resource mappings. You can also make your site active or inactive. Also there is possibility to upload new files for the site content using </a:t>
+            </a:r>
+            <a:r>
+              <a:rPr lang="en-US" b="1" dirty="0" smtClean="0"/>
+              <a:t>Upload Files</a:t>
+            </a:r>
+            <a:r>
+              <a:rPr lang="en-US" dirty="0" smtClean="0"/>
+              <a:t> section.</a:t>
+            </a:r>
+            <a:endParaRPr lang="ru-RU" dirty="0"/>
+          </a:p>
+        </p:txBody>
+      </p:sp>
+      <p:sp>
+        <p:nvSpPr>
+          <p:cNvPr id="9" name="TextBox 8"/>
+          <p:cNvSpPr txBox="1"/>
+          <p:nvPr/>
+        </p:nvSpPr>
+        <p:spPr>
+          <a:xfrm>
+            <a:off x="3043062" y="2947159"/>
+            <a:ext cx="8625565" cy="2031325"/>
+          </a:xfrm>
+          <a:prstGeom prst="rect">
+            <a:avLst/>
+          </a:prstGeom>
+          <a:noFill/>
+        </p:spPr>
+        <p:txBody>
+          <a:bodyPr wrap="square" rtlCol="0">
+            <a:spAutoFit/>
+          </a:bodyPr>
+          <a:lstStyle/>
+          <a:p>
+            <a:r>
+              <a:rPr lang="en-US" dirty="0" smtClean="0"/>
+              <a:t>Please note that the new site name you have entered is validated against the names of all existing sites. So, if you enter a name that is already in use by other user or site, you will be warned and you will have to change the site name. It </a:t>
+            </a:r>
+            <a:r>
+              <a:rPr lang="en-US" b="1" dirty="0" smtClean="0"/>
+              <a:t>must be unique</a:t>
+            </a:r>
+            <a:r>
+              <a:rPr lang="en-US" dirty="0" smtClean="0"/>
+              <a:t> among all users/sites to provide correct site routing.</a:t>
+            </a:r>
+          </a:p>
+          <a:p>
+            <a:endParaRPr lang="en-US" dirty="0"/>
+          </a:p>
+          <a:p>
+            <a:r>
+              <a:rPr lang="en-US" dirty="0" smtClean="0"/>
+              <a:t>Also if you try to upload a file that has already been uploaded with the site content, it just will be replaced.</a:t>
+            </a:r>
+            <a:endParaRPr lang="ru-RU" dirty="0"/>
+          </a:p>
+        </p:txBody>
+      </p:sp>
+    </p:spTree>
+    <p:extLst>
+      <p:ext uri="{BB962C8B-B14F-4D97-AF65-F5344CB8AC3E}">
+        <p14:creationId xmlns:p14="http://schemas.microsoft.com/office/powerpoint/2010/main" val="3932845466"/>
+      </p:ext>
+    </p:extLst>
+  </p:cSld>
+  <p:clrMapOvr>
+    <a:masterClrMapping/>
+  </p:clrMapOvr>
+</p:sld>
+</file>
+
 <file path=ppt/slides/slide2.xml><?xml version="1.0" encoding="utf-8"?>
 <p:sld xmlns:a="http://schemas.openxmlformats.org/drawingml/2006/main" xmlns:r="http://schemas.openxmlformats.org/officeDocument/2006/relationships" xmlns:p="http://schemas.openxmlformats.org/presentationml/2006/main">
   <p:cSld>
@@ -9770,4 +12193,265 @@
     </a:ext>
   </a:extLst>
 </a:theme>
+</file>
+
+<file path=ppt/theme/theme2.xml><?xml version="1.0" encoding="utf-8"?>
+<a:theme xmlns:a="http://schemas.openxmlformats.org/drawingml/2006/main" name="Office Theme">
+  <a:themeElements>
+    <a:clrScheme name="Office">
+      <a:dk1>
+        <a:sysClr val="windowText" lastClr="000000"/>
+      </a:dk1>
+      <a:lt1>
+        <a:sysClr val="window" lastClr="FFFFFF"/>
+      </a:lt1>
+      <a:dk2>
+        <a:srgbClr val="44546A"/>
+      </a:dk2>
+      <a:lt2>
+        <a:srgbClr val="E7E6E6"/>
+      </a:lt2>
+      <a:accent1>
+        <a:srgbClr val="5B9BD5"/>
+      </a:accent1>
+      <a:accent2>
+        <a:srgbClr val="ED7D31"/>
+      </a:accent2>
+      <a:accent3>
+        <a:srgbClr val="A5A5A5"/>
+      </a:accent3>
+      <a:accent4>
+        <a:srgbClr val="FFC000"/>
+      </a:accent4>
+      <a:accent5>
+        <a:srgbClr val="4472C4"/>
+      </a:accent5>
+      <a:accent6>
+        <a:srgbClr val="70AD47"/>
+      </a:accent6>
+      <a:hlink>
+        <a:srgbClr val="0563C1"/>
+      </a:hlink>
+      <a:folHlink>
+        <a:srgbClr val="954F72"/>
+      </a:folHlink>
+    </a:clrScheme>
+    <a:fontScheme name="Office">
+      <a:majorFont>
+        <a:latin typeface="Calibri Light" panose="020F0302020204030204"/>
+        <a:ea typeface=""/>
+        <a:cs typeface=""/>
+        <a:font script="Jpan" typeface="游ゴシック Light"/>
+        <a:font script="Hang" typeface="맑은 고딕"/>
+        <a:font script="Hans" typeface="等线 Light"/>
+        <a:font script="Hant" typeface="新細明體"/>
+        <a:font script="Arab" typeface="Times New Roman"/>
+        <a:font script="Hebr" typeface="Times New Roman"/>
+        <a:font script="Thai" typeface="Angsana New"/>
+        <a:font script="Ethi" typeface="Nyala"/>
+        <a:font script="Beng" typeface="Vrinda"/>
+        <a:font script="Gujr" typeface="Shruti"/>
+        <a:font script="Khmr" typeface="MoolBoran"/>
+        <a:font script="Knda" typeface="Tunga"/>
+        <a:font script="Guru" typeface="Raavi"/>
+        <a:font script="Cans" typeface="Euphemia"/>
+        <a:font script="Cher" typeface="Plantagenet Cherokee"/>
+        <a:font script="Yiii" typeface="Microsoft Yi Baiti"/>
+        <a:font script="Tibt" typeface="Microsoft Himalaya"/>
+        <a:font script="Thaa" typeface="MV Boli"/>
+        <a:font script="Deva" typeface="Mangal"/>
+        <a:font script="Telu" typeface="Gautami"/>
+        <a:font script="Taml" typeface="Latha"/>
+        <a:font script="Syrc" typeface="Estrangelo Edessa"/>
+        <a:font script="Orya" typeface="Kalinga"/>
+        <a:font script="Mlym" typeface="Kartika"/>
+        <a:font script="Laoo" typeface="DokChampa"/>
+        <a:font script="Sinh" typeface="Iskoola Pota"/>
+        <a:font script="Mong" typeface="Mongolian Baiti"/>
+        <a:font script="Viet" typeface="Times New Roman"/>
+        <a:font script="Uigh" typeface="Microsoft Uighur"/>
+        <a:font script="Geor" typeface="Sylfaen"/>
+      </a:majorFont>
+      <a:minorFont>
+        <a:latin typeface="Calibri" panose="020F0502020204030204"/>
+        <a:ea typeface=""/>
+        <a:cs typeface=""/>
+        <a:font script="Jpan" typeface="游ゴシック"/>
+        <a:font script="Hang" typeface="맑은 고딕"/>
+        <a:font script="Hans" typeface="等线"/>
+        <a:font script="Hant" typeface="新細明體"/>
+        <a:font script="Arab" typeface="Arial"/>
+        <a:font script="Hebr" typeface="Arial"/>
+        <a:font script="Thai" typeface="Cordia New"/>
+        <a:font script="Ethi" typeface="Nyala"/>
+        <a:font script="Beng" typeface="Vrinda"/>
+        <a:font script="Gujr" typeface="Shruti"/>
+        <a:font script="Khmr" typeface="DaunPenh"/>
+        <a:font script="Knda" typeface="Tunga"/>
+        <a:font script="Guru" typeface="Raavi"/>
+        <a:font script="Cans" typeface="Euphemia"/>
+        <a:font script="Cher" typeface="Plantagenet Cherokee"/>
+        <a:font script="Yiii" typeface="Microsoft Yi Baiti"/>
+        <a:font script="Tibt" typeface="Microsoft Himalaya"/>
+        <a:font script="Thaa" typeface="MV Boli"/>
+        <a:font script="Deva" typeface="Mangal"/>
+        <a:font script="Telu" typeface="Gautami"/>
+        <a:font script="Taml" typeface="Latha"/>
+        <a:font script="Syrc" typeface="Estrangelo Edessa"/>
+        <a:font script="Orya" typeface="Kalinga"/>
+        <a:font script="Mlym" typeface="Kartika"/>
+        <a:font script="Laoo" typeface="DokChampa"/>
+        <a:font script="Sinh" typeface="Iskoola Pota"/>
+        <a:font script="Mong" typeface="Mongolian Baiti"/>
+        <a:font script="Viet" typeface="Arial"/>
+        <a:font script="Uigh" typeface="Microsoft Uighur"/>
+        <a:font script="Geor" typeface="Sylfaen"/>
+      </a:minorFont>
+    </a:fontScheme>
+    <a:fmtScheme name="Office">
+      <a:fillStyleLst>
+        <a:solidFill>
+          <a:schemeClr val="phClr"/>
+        </a:solidFill>
+        <a:gradFill rotWithShape="1">
+          <a:gsLst>
+            <a:gs pos="0">
+              <a:schemeClr val="phClr">
+                <a:lumMod val="110000"/>
+                <a:satMod val="105000"/>
+                <a:tint val="67000"/>
+              </a:schemeClr>
+            </a:gs>
+            <a:gs pos="50000">
+              <a:schemeClr val="phClr">
+                <a:lumMod val="105000"/>
+                <a:satMod val="103000"/>
+                <a:tint val="73000"/>
+              </a:schemeClr>
+            </a:gs>
+            <a:gs pos="100000">
+              <a:schemeClr val="phClr">
+                <a:lumMod val="105000"/>
+                <a:satMod val="109000"/>
+                <a:tint val="81000"/>
+              </a:schemeClr>
+            </a:gs>
+          </a:gsLst>
+          <a:lin ang="5400000" scaled="0"/>
+        </a:gradFill>
+        <a:gradFill rotWithShape="1">
+          <a:gsLst>
+            <a:gs pos="0">
+              <a:schemeClr val="phClr">
+                <a:satMod val="103000"/>
+                <a:lumMod val="102000"/>
+                <a:tint val="94000"/>
+              </a:schemeClr>
+            </a:gs>
+            <a:gs pos="50000">
+              <a:schemeClr val="phClr">
+                <a:satMod val="110000"/>
+                <a:lumMod val="100000"/>
+                <a:shade val="100000"/>
+              </a:schemeClr>
+            </a:gs>
+            <a:gs pos="100000">
+              <a:schemeClr val="phClr">
+                <a:lumMod val="99000"/>
+                <a:satMod val="120000"/>
+                <a:shade val="78000"/>
+              </a:schemeClr>
+            </a:gs>
+          </a:gsLst>
+          <a:lin ang="5400000" scaled="0"/>
+        </a:gradFill>
+      </a:fillStyleLst>
+      <a:lnStyleLst>
+        <a:ln w="6350" cap="flat" cmpd="sng" algn="ctr">
+          <a:solidFill>
+            <a:schemeClr val="phClr"/>
+          </a:solidFill>
+          <a:prstDash val="solid"/>
+          <a:miter lim="800000"/>
+        </a:ln>
+        <a:ln w="12700" cap="flat" cmpd="sng" algn="ctr">
+          <a:solidFill>
+            <a:schemeClr val="phClr"/>
+          </a:solidFill>
+          <a:prstDash val="solid"/>
+          <a:miter lim="800000"/>
+        </a:ln>
+        <a:ln w="19050" cap="flat" cmpd="sng" algn="ctr">
+          <a:solidFill>
+            <a:schemeClr val="phClr"/>
+          </a:solidFill>
+          <a:prstDash val="solid"/>
+          <a:miter lim="800000"/>
+        </a:ln>
+      </a:lnStyleLst>
+      <a:effectStyleLst>
+        <a:effectStyle>
+          <a:effectLst/>
+        </a:effectStyle>
+        <a:effectStyle>
+          <a:effectLst/>
+        </a:effectStyle>
+        <a:effectStyle>
+          <a:effectLst>
+            <a:outerShdw blurRad="57150" dist="19050" dir="5400000" algn="ctr" rotWithShape="0">
+              <a:srgbClr val="000000">
+                <a:alpha val="63000"/>
+              </a:srgbClr>
+            </a:outerShdw>
+          </a:effectLst>
+        </a:effectStyle>
+      </a:effectStyleLst>
+      <a:bgFillStyleLst>
+        <a:solidFill>
+          <a:schemeClr val="phClr"/>
+        </a:solidFill>
+        <a:solidFill>
+          <a:schemeClr val="phClr">
+            <a:tint val="95000"/>
+            <a:satMod val="170000"/>
+          </a:schemeClr>
+        </a:solidFill>
+        <a:gradFill rotWithShape="1">
+          <a:gsLst>
+            <a:gs pos="0">
+              <a:schemeClr val="phClr">
+                <a:tint val="93000"/>
+                <a:satMod val="150000"/>
+                <a:shade val="98000"/>
+                <a:lumMod val="102000"/>
+              </a:schemeClr>
+            </a:gs>
+            <a:gs pos="50000">
+              <a:schemeClr val="phClr">
+                <a:tint val="98000"/>
+                <a:satMod val="130000"/>
+                <a:shade val="90000"/>
+                <a:lumMod val="103000"/>
+              </a:schemeClr>
+            </a:gs>
+            <a:gs pos="100000">
+              <a:schemeClr val="phClr">
+                <a:shade val="63000"/>
+                <a:satMod val="120000"/>
+              </a:schemeClr>
+            </a:gs>
+          </a:gsLst>
+          <a:lin ang="5400000" scaled="0"/>
+        </a:gradFill>
+      </a:bgFillStyleLst>
+    </a:fmtScheme>
+  </a:themeElements>
+  <a:objectDefaults/>
+  <a:extraClrSchemeLst/>
+  <a:extLst>
+    <a:ext uri="{05A4C25C-085E-4340-85A3-A5531E510DB2}">
+      <thm15:themeFamily xmlns:thm15="http://schemas.microsoft.com/office/thememl/2012/main" name="Office Theme" id="{62F939B6-93AF-4DB8-9C6B-D6C7DFDC589F}" vid="{4A3C46E8-61CC-4603-A589-7422A47A8E4A}"/>
+    </a:ext>
+  </a:extLst>
+</a:theme>
 </file>
</xml_diff>

<commit_message>
Content item feature changes
</commit_message>
<xml_diff>
--- a/Specs.pptx
+++ b/Specs.pptx
@@ -211,7 +211,7 @@
           <a:p>
             <a:fld id="{5A49B920-2512-410B-B58F-4F9F15F8D3A5}" type="datetimeFigureOut">
               <a:rPr lang="ru-RU" smtClean="0"/>
-              <a:t>29.09.2020</a:t>
+              <a:t>17.10.2020</a:t>
             </a:fld>
             <a:endParaRPr lang="ru-RU"/>
           </a:p>
@@ -610,7 +610,7 @@
           <a:p>
             <a:fld id="{A2EC0EAC-ECEF-44E1-B933-C13F370113F6}" type="datetimeFigureOut">
               <a:rPr lang="ru-RU" smtClean="0"/>
-              <a:t>29.09.2020</a:t>
+              <a:t>17.10.2020</a:t>
             </a:fld>
             <a:endParaRPr lang="ru-RU"/>
           </a:p>
@@ -780,7 +780,7 @@
           <a:p>
             <a:fld id="{A2EC0EAC-ECEF-44E1-B933-C13F370113F6}" type="datetimeFigureOut">
               <a:rPr lang="ru-RU" smtClean="0"/>
-              <a:t>29.09.2020</a:t>
+              <a:t>17.10.2020</a:t>
             </a:fld>
             <a:endParaRPr lang="ru-RU"/>
           </a:p>
@@ -960,7 +960,7 @@
           <a:p>
             <a:fld id="{A2EC0EAC-ECEF-44E1-B933-C13F370113F6}" type="datetimeFigureOut">
               <a:rPr lang="ru-RU" smtClean="0"/>
-              <a:t>29.09.2020</a:t>
+              <a:t>17.10.2020</a:t>
             </a:fld>
             <a:endParaRPr lang="ru-RU"/>
           </a:p>
@@ -1130,7 +1130,7 @@
           <a:p>
             <a:fld id="{A2EC0EAC-ECEF-44E1-B933-C13F370113F6}" type="datetimeFigureOut">
               <a:rPr lang="ru-RU" smtClean="0"/>
-              <a:t>29.09.2020</a:t>
+              <a:t>17.10.2020</a:t>
             </a:fld>
             <a:endParaRPr lang="ru-RU"/>
           </a:p>
@@ -1376,7 +1376,7 @@
           <a:p>
             <a:fld id="{A2EC0EAC-ECEF-44E1-B933-C13F370113F6}" type="datetimeFigureOut">
               <a:rPr lang="ru-RU" smtClean="0"/>
-              <a:t>29.09.2020</a:t>
+              <a:t>17.10.2020</a:t>
             </a:fld>
             <a:endParaRPr lang="ru-RU"/>
           </a:p>
@@ -1608,7 +1608,7 @@
           <a:p>
             <a:fld id="{A2EC0EAC-ECEF-44E1-B933-C13F370113F6}" type="datetimeFigureOut">
               <a:rPr lang="ru-RU" smtClean="0"/>
-              <a:t>29.09.2020</a:t>
+              <a:t>17.10.2020</a:t>
             </a:fld>
             <a:endParaRPr lang="ru-RU"/>
           </a:p>
@@ -1975,7 +1975,7 @@
           <a:p>
             <a:fld id="{A2EC0EAC-ECEF-44E1-B933-C13F370113F6}" type="datetimeFigureOut">
               <a:rPr lang="ru-RU" smtClean="0"/>
-              <a:t>29.09.2020</a:t>
+              <a:t>17.10.2020</a:t>
             </a:fld>
             <a:endParaRPr lang="ru-RU"/>
           </a:p>
@@ -2093,7 +2093,7 @@
           <a:p>
             <a:fld id="{A2EC0EAC-ECEF-44E1-B933-C13F370113F6}" type="datetimeFigureOut">
               <a:rPr lang="ru-RU" smtClean="0"/>
-              <a:t>29.09.2020</a:t>
+              <a:t>17.10.2020</a:t>
             </a:fld>
             <a:endParaRPr lang="ru-RU"/>
           </a:p>
@@ -2188,7 +2188,7 @@
           <a:p>
             <a:fld id="{A2EC0EAC-ECEF-44E1-B933-C13F370113F6}" type="datetimeFigureOut">
               <a:rPr lang="ru-RU" smtClean="0"/>
-              <a:t>29.09.2020</a:t>
+              <a:t>17.10.2020</a:t>
             </a:fld>
             <a:endParaRPr lang="ru-RU"/>
           </a:p>
@@ -2465,7 +2465,7 @@
           <a:p>
             <a:fld id="{A2EC0EAC-ECEF-44E1-B933-C13F370113F6}" type="datetimeFigureOut">
               <a:rPr lang="ru-RU" smtClean="0"/>
-              <a:t>29.09.2020</a:t>
+              <a:t>17.10.2020</a:t>
             </a:fld>
             <a:endParaRPr lang="ru-RU"/>
           </a:p>
@@ -2718,7 +2718,7 @@
           <a:p>
             <a:fld id="{A2EC0EAC-ECEF-44E1-B933-C13F370113F6}" type="datetimeFigureOut">
               <a:rPr lang="ru-RU" smtClean="0"/>
-              <a:t>29.09.2020</a:t>
+              <a:t>17.10.2020</a:t>
             </a:fld>
             <a:endParaRPr lang="ru-RU"/>
           </a:p>
@@ -2931,7 +2931,7 @@
           <a:p>
             <a:fld id="{A2EC0EAC-ECEF-44E1-B933-C13F370113F6}" type="datetimeFigureOut">
               <a:rPr lang="ru-RU" smtClean="0"/>
-              <a:t>29.09.2020</a:t>
+              <a:t>17.10.2020</a:t>
             </a:fld>
             <a:endParaRPr lang="ru-RU"/>
           </a:p>
@@ -5743,98 +5743,6 @@
       </p:sp>
       <p:sp>
         <p:nvSpPr>
-          <p:cNvPr id="24" name="TextBox 23"/>
-          <p:cNvSpPr txBox="1"/>
-          <p:nvPr/>
-        </p:nvSpPr>
-        <p:spPr>
-          <a:xfrm>
-            <a:off x="7844589" y="3134952"/>
-            <a:ext cx="3380874" cy="1754326"/>
-          </a:xfrm>
-          <a:prstGeom prst="rect">
-            <a:avLst/>
-          </a:prstGeom>
-          <a:noFill/>
-        </p:spPr>
-        <p:txBody>
-          <a:bodyPr wrap="square" rtlCol="0">
-            <a:spAutoFit/>
-          </a:bodyPr>
-          <a:lstStyle/>
-          <a:p>
-            <a:pPr marL="285750" indent="-285750" algn="just">
-              <a:buFont typeface="Arial" panose="020B0604020202020204" pitchFamily="34" charset="0"/>
-              <a:buChar char="•"/>
-            </a:pPr>
-            <a:r>
-              <a:rPr lang="en-US" dirty="0" smtClean="0"/>
-              <a:t>styles/global.css                        X</a:t>
-            </a:r>
-          </a:p>
-          <a:p>
-            <a:pPr marL="285750" indent="-285750" algn="just">
-              <a:buFont typeface="Arial" panose="020B0604020202020204" pitchFamily="34" charset="0"/>
-              <a:buChar char="•"/>
-            </a:pPr>
-            <a:r>
-              <a:rPr lang="en-US" dirty="0" err="1" smtClean="0"/>
-              <a:t>js</a:t>
-            </a:r>
-            <a:r>
-              <a:rPr lang="en-US" dirty="0" smtClean="0"/>
-              <a:t>/main.min.js                           X  </a:t>
-            </a:r>
-          </a:p>
-          <a:p>
-            <a:pPr marL="285750" indent="-285750" algn="just">
-              <a:buFont typeface="Arial" panose="020B0604020202020204" pitchFamily="34" charset="0"/>
-              <a:buChar char="•"/>
-            </a:pPr>
-            <a:r>
-              <a:rPr lang="en-US" dirty="0" err="1" smtClean="0"/>
-              <a:t>js</a:t>
-            </a:r>
-            <a:r>
-              <a:rPr lang="en-US" dirty="0" smtClean="0"/>
-              <a:t>/jquery.3.4.1.min.js               X</a:t>
-            </a:r>
-          </a:p>
-          <a:p>
-            <a:pPr marL="285750" indent="-285750" algn="just">
-              <a:buFont typeface="Arial" panose="020B0604020202020204" pitchFamily="34" charset="0"/>
-              <a:buChar char="•"/>
-            </a:pPr>
-            <a:r>
-              <a:rPr lang="en-US" dirty="0" smtClean="0"/>
-              <a:t>Index.html                                 X</a:t>
-            </a:r>
-          </a:p>
-          <a:p>
-            <a:pPr marL="285750" indent="-285750" algn="just">
-              <a:buFont typeface="Arial" panose="020B0604020202020204" pitchFamily="34" charset="0"/>
-              <a:buChar char="•"/>
-            </a:pPr>
-            <a:r>
-              <a:rPr lang="en-US" dirty="0" smtClean="0"/>
-              <a:t>about.html                                X   </a:t>
-            </a:r>
-          </a:p>
-          <a:p>
-            <a:pPr marL="285750" indent="-285750" algn="just">
-              <a:buFont typeface="Arial" panose="020B0604020202020204" pitchFamily="34" charset="0"/>
-              <a:buChar char="•"/>
-            </a:pPr>
-            <a:r>
-              <a:rPr lang="en-US" dirty="0" smtClean="0"/>
-              <a:t>dashboard.html                        X</a:t>
-            </a:r>
-            <a:endParaRPr lang="ru-RU" dirty="0"/>
-          </a:p>
-        </p:txBody>
-      </p:sp>
-      <p:sp>
-        <p:nvSpPr>
           <p:cNvPr id="33" name="Прямоугольник 32"/>
           <p:cNvSpPr/>
           <p:nvPr/>
@@ -6053,6 +5961,312 @@
           </a:p>
         </p:txBody>
       </p:sp>
+      <p:graphicFrame>
+        <p:nvGraphicFramePr>
+          <p:cNvPr id="36" name="Table 35"/>
+          <p:cNvGraphicFramePr>
+            <a:graphicFrameLocks noGrp="1"/>
+          </p:cNvGraphicFramePr>
+          <p:nvPr>
+            <p:extLst>
+              <p:ext uri="{D42A27DB-BD31-4B8C-83A1-F6EECF244321}">
+                <p14:modId xmlns:p14="http://schemas.microsoft.com/office/powerpoint/2010/main" val="4216403534"/>
+              </p:ext>
+            </p:extLst>
+          </p:nvPr>
+        </p:nvGraphicFramePr>
+        <p:xfrm>
+          <a:off x="7459575" y="2994095"/>
+          <a:ext cx="4366209" cy="1445724"/>
+        </p:xfrm>
+        <a:graphic>
+          <a:graphicData uri="http://schemas.openxmlformats.org/drawingml/2006/table">
+            <a:tbl>
+              <a:tblPr firstRow="1" bandRow="1">
+                <a:tableStyleId>{5C22544A-7EE6-4342-B048-85BDC9FD1C3A}</a:tableStyleId>
+              </a:tblPr>
+              <a:tblGrid>
+                <a:gridCol w="1084414">
+                  <a:extLst>
+                    <a:ext uri="{9D8B030D-6E8A-4147-A177-3AD203B41FA5}">
+                      <a16:colId xmlns:a16="http://schemas.microsoft.com/office/drawing/2014/main" val="252522295"/>
+                    </a:ext>
+                  </a:extLst>
+                </a:gridCol>
+                <a:gridCol w="546313">
+                  <a:extLst>
+                    <a:ext uri="{9D8B030D-6E8A-4147-A177-3AD203B41FA5}">
+                      <a16:colId xmlns:a16="http://schemas.microsoft.com/office/drawing/2014/main" val="4229825248"/>
+                    </a:ext>
+                  </a:extLst>
+                </a:gridCol>
+                <a:gridCol w="936537">
+                  <a:extLst>
+                    <a:ext uri="{9D8B030D-6E8A-4147-A177-3AD203B41FA5}">
+                      <a16:colId xmlns:a16="http://schemas.microsoft.com/office/drawing/2014/main" val="158349433"/>
+                    </a:ext>
+                  </a:extLst>
+                </a:gridCol>
+                <a:gridCol w="1798945">
+                  <a:extLst>
+                    <a:ext uri="{9D8B030D-6E8A-4147-A177-3AD203B41FA5}">
+                      <a16:colId xmlns:a16="http://schemas.microsoft.com/office/drawing/2014/main" val="3294192685"/>
+                    </a:ext>
+                  </a:extLst>
+                </a:gridCol>
+              </a:tblGrid>
+              <a:tr h="329508">
+                <a:tc>
+                  <a:txBody>
+                    <a:bodyPr/>
+                    <a:lstStyle/>
+                    <a:p>
+                      <a:r>
+                        <a:rPr lang="en-US" sz="1200" dirty="0" smtClean="0"/>
+                        <a:t>Name</a:t>
+                      </a:r>
+                      <a:endParaRPr lang="ru-RU" sz="1200" dirty="0"/>
+                    </a:p>
+                  </a:txBody>
+                  <a:tcPr/>
+                </a:tc>
+                <a:tc>
+                  <a:txBody>
+                    <a:bodyPr/>
+                    <a:lstStyle/>
+                    <a:p>
+                      <a:r>
+                        <a:rPr lang="en-US" sz="1200" dirty="0" smtClean="0"/>
+                        <a:t>Size, kB</a:t>
+                      </a:r>
+                      <a:endParaRPr lang="ru-RU" sz="1200" dirty="0"/>
+                    </a:p>
+                  </a:txBody>
+                  <a:tcPr/>
+                </a:tc>
+                <a:tc>
+                  <a:txBody>
+                    <a:bodyPr/>
+                    <a:lstStyle/>
+                    <a:p>
+                      <a:r>
+                        <a:rPr lang="en-US" sz="1200" dirty="0" smtClean="0"/>
+                        <a:t>Uploaded Date</a:t>
+                      </a:r>
+                      <a:endParaRPr lang="ru-RU" sz="1200" dirty="0"/>
+                    </a:p>
+                  </a:txBody>
+                  <a:tcPr/>
+                </a:tc>
+                <a:tc>
+                  <a:txBody>
+                    <a:bodyPr/>
+                    <a:lstStyle/>
+                    <a:p>
+                      <a:endParaRPr lang="ru-RU" sz="1200" dirty="0"/>
+                    </a:p>
+                  </a:txBody>
+                  <a:tcPr/>
+                </a:tc>
+                <a:extLst>
+                  <a:ext uri="{0D108BD9-81ED-4DB2-BD59-A6C34878D82A}">
+                    <a16:rowId xmlns:a16="http://schemas.microsoft.com/office/drawing/2014/main" val="882773260"/>
+                  </a:ext>
+                </a:extLst>
+              </a:tr>
+              <a:tr h="329508">
+                <a:tc>
+                  <a:txBody>
+                    <a:bodyPr/>
+                    <a:lstStyle/>
+                    <a:p>
+                      <a:r>
+                        <a:rPr lang="en-US" sz="1200" dirty="0" smtClean="0"/>
+                        <a:t>Index.html</a:t>
+                      </a:r>
+                      <a:endParaRPr lang="ru-RU" sz="1200" dirty="0"/>
+                    </a:p>
+                  </a:txBody>
+                  <a:tcPr/>
+                </a:tc>
+                <a:tc>
+                  <a:txBody>
+                    <a:bodyPr/>
+                    <a:lstStyle/>
+                    <a:p>
+                      <a:r>
+                        <a:rPr lang="en-US" sz="1200" dirty="0" smtClean="0"/>
+                        <a:t>23.2</a:t>
+                      </a:r>
+                      <a:endParaRPr lang="ru-RU" sz="1200" dirty="0"/>
+                    </a:p>
+                  </a:txBody>
+                  <a:tcPr/>
+                </a:tc>
+                <a:tc>
+                  <a:txBody>
+                    <a:bodyPr/>
+                    <a:lstStyle/>
+                    <a:p>
+                      <a:r>
+                        <a:rPr lang="en-US" sz="1200" dirty="0" smtClean="0"/>
+                        <a:t>10/17/2020</a:t>
+                      </a:r>
+                      <a:endParaRPr lang="ru-RU" sz="1200" dirty="0"/>
+                    </a:p>
+                  </a:txBody>
+                  <a:tcPr/>
+                </a:tc>
+                <a:tc>
+                  <a:txBody>
+                    <a:bodyPr/>
+                    <a:lstStyle/>
+                    <a:p>
+                      <a:r>
+                        <a:rPr lang="en-US" sz="1200" dirty="0" err="1" smtClean="0"/>
+                        <a:t>Download|Edit|Remove</a:t>
+                      </a:r>
+                      <a:endParaRPr lang="ru-RU" sz="1200" dirty="0"/>
+                    </a:p>
+                  </a:txBody>
+                  <a:tcPr/>
+                </a:tc>
+                <a:extLst>
+                  <a:ext uri="{0D108BD9-81ED-4DB2-BD59-A6C34878D82A}">
+                    <a16:rowId xmlns:a16="http://schemas.microsoft.com/office/drawing/2014/main" val="3520922758"/>
+                  </a:ext>
+                </a:extLst>
+              </a:tr>
+              <a:tr h="329508">
+                <a:tc>
+                  <a:txBody>
+                    <a:bodyPr/>
+                    <a:lstStyle/>
+                    <a:p>
+                      <a:r>
+                        <a:rPr lang="en-US" sz="1200" dirty="0" smtClean="0"/>
+                        <a:t>Myimage.png</a:t>
+                      </a:r>
+                      <a:endParaRPr lang="ru-RU" sz="1200" dirty="0"/>
+                    </a:p>
+                  </a:txBody>
+                  <a:tcPr/>
+                </a:tc>
+                <a:tc>
+                  <a:txBody>
+                    <a:bodyPr/>
+                    <a:lstStyle/>
+                    <a:p>
+                      <a:r>
+                        <a:rPr lang="en-US" sz="1200" dirty="0" smtClean="0"/>
+                        <a:t>14</a:t>
+                      </a:r>
+                      <a:endParaRPr lang="ru-RU" sz="1200" dirty="0"/>
+                    </a:p>
+                  </a:txBody>
+                  <a:tcPr/>
+                </a:tc>
+                <a:tc>
+                  <a:txBody>
+                    <a:bodyPr/>
+                    <a:lstStyle/>
+                    <a:p>
+                      <a:r>
+                        <a:rPr lang="en-US" sz="1200" dirty="0" smtClean="0"/>
+                        <a:t>10/17/2020</a:t>
+                      </a:r>
+                      <a:endParaRPr lang="ru-RU" sz="1200" dirty="0"/>
+                    </a:p>
+                  </a:txBody>
+                  <a:tcPr/>
+                </a:tc>
+                <a:tc>
+                  <a:txBody>
+                    <a:bodyPr/>
+                    <a:lstStyle/>
+                    <a:p>
+                      <a:r>
+                        <a:rPr lang="en-US" sz="1200" dirty="0" err="1" smtClean="0"/>
+                        <a:t>Download|View|Remove</a:t>
+                      </a:r>
+                      <a:endParaRPr lang="ru-RU" sz="1200" dirty="0"/>
+                    </a:p>
+                  </a:txBody>
+                  <a:tcPr/>
+                </a:tc>
+                <a:extLst>
+                  <a:ext uri="{0D108BD9-81ED-4DB2-BD59-A6C34878D82A}">
+                    <a16:rowId xmlns:a16="http://schemas.microsoft.com/office/drawing/2014/main" val="3707490074"/>
+                  </a:ext>
+                </a:extLst>
+              </a:tr>
+              <a:tr h="329508">
+                <a:tc>
+                  <a:txBody>
+                    <a:bodyPr/>
+                    <a:lstStyle/>
+                    <a:p>
+                      <a:r>
+                        <a:rPr lang="en-US" sz="1200" dirty="0" smtClean="0"/>
+                        <a:t>Site.css</a:t>
+                      </a:r>
+                      <a:endParaRPr lang="ru-RU" sz="1200" dirty="0"/>
+                    </a:p>
+                  </a:txBody>
+                  <a:tcPr/>
+                </a:tc>
+                <a:tc>
+                  <a:txBody>
+                    <a:bodyPr/>
+                    <a:lstStyle/>
+                    <a:p>
+                      <a:r>
+                        <a:rPr lang="en-US" sz="1200" dirty="0" smtClean="0"/>
+                        <a:t>5.2</a:t>
+                      </a:r>
+                      <a:endParaRPr lang="ru-RU" sz="1200" dirty="0"/>
+                    </a:p>
+                  </a:txBody>
+                  <a:tcPr/>
+                </a:tc>
+                <a:tc>
+                  <a:txBody>
+                    <a:bodyPr/>
+                    <a:lstStyle/>
+                    <a:p>
+                      <a:r>
+                        <a:rPr lang="en-US" sz="1200" dirty="0" smtClean="0"/>
+                        <a:t>10/16/2020</a:t>
+                      </a:r>
+                      <a:endParaRPr lang="ru-RU" sz="1200" dirty="0"/>
+                    </a:p>
+                  </a:txBody>
+                  <a:tcPr/>
+                </a:tc>
+                <a:tc>
+                  <a:txBody>
+                    <a:bodyPr/>
+                    <a:lstStyle/>
+                    <a:p>
+                      <a:r>
+                        <a:rPr lang="en-US" sz="1200" dirty="0" err="1" smtClean="0"/>
+                        <a:t>Download|Edit|Remove</a:t>
+                      </a:r>
+                      <a:endParaRPr lang="ru-RU" sz="1200" dirty="0"/>
+                    </a:p>
+                  </a:txBody>
+                  <a:tcPr/>
+                </a:tc>
+                <a:extLst>
+                  <a:ext uri="{0D108BD9-81ED-4DB2-BD59-A6C34878D82A}">
+                    <a16:rowId xmlns:a16="http://schemas.microsoft.com/office/drawing/2014/main" val="1655202766"/>
+                  </a:ext>
+                </a:extLst>
+              </a:tr>
+            </a:tbl>
+          </a:graphicData>
+        </a:graphic>
+      </p:graphicFrame>
     </p:spTree>
     <p:extLst>
       <p:ext uri="{BB962C8B-B14F-4D97-AF65-F5344CB8AC3E}">

</xml_diff>

<commit_message>
UI changes + Migration to .NET5
</commit_message>
<xml_diff>
--- a/Specs.pptx
+++ b/Specs.pptx
@@ -5,7 +5,7 @@
     <p:sldMasterId id="2147483648" r:id="rId1"/>
   </p:sldMasterIdLst>
   <p:notesMasterIdLst>
-    <p:notesMasterId r:id="rId17"/>
+    <p:notesMasterId r:id="rId19"/>
   </p:notesMasterIdLst>
   <p:sldIdLst>
     <p:sldId id="256" r:id="rId2"/>
@@ -23,6 +23,8 @@
     <p:sldId id="267" r:id="rId14"/>
     <p:sldId id="268" r:id="rId15"/>
     <p:sldId id="269" r:id="rId16"/>
+    <p:sldId id="271" r:id="rId17"/>
+    <p:sldId id="272" r:id="rId18"/>
   </p:sldIdLst>
   <p:sldSz cx="12192000" cy="6858000"/>
   <p:notesSz cx="6858000" cy="9144000"/>
@@ -211,7 +213,7 @@
           <a:p>
             <a:fld id="{5A49B920-2512-410B-B58F-4F9F15F8D3A5}" type="datetimeFigureOut">
               <a:rPr lang="ru-RU" smtClean="0"/>
-              <a:t>17.10.2020</a:t>
+              <a:t>27.10.2020</a:t>
             </a:fld>
             <a:endParaRPr lang="ru-RU"/>
           </a:p>
@@ -610,7 +612,7 @@
           <a:p>
             <a:fld id="{A2EC0EAC-ECEF-44E1-B933-C13F370113F6}" type="datetimeFigureOut">
               <a:rPr lang="ru-RU" smtClean="0"/>
-              <a:t>17.10.2020</a:t>
+              <a:t>27.10.2020</a:t>
             </a:fld>
             <a:endParaRPr lang="ru-RU"/>
           </a:p>
@@ -780,7 +782,7 @@
           <a:p>
             <a:fld id="{A2EC0EAC-ECEF-44E1-B933-C13F370113F6}" type="datetimeFigureOut">
               <a:rPr lang="ru-RU" smtClean="0"/>
-              <a:t>17.10.2020</a:t>
+              <a:t>27.10.2020</a:t>
             </a:fld>
             <a:endParaRPr lang="ru-RU"/>
           </a:p>
@@ -960,7 +962,7 @@
           <a:p>
             <a:fld id="{A2EC0EAC-ECEF-44E1-B933-C13F370113F6}" type="datetimeFigureOut">
               <a:rPr lang="ru-RU" smtClean="0"/>
-              <a:t>17.10.2020</a:t>
+              <a:t>27.10.2020</a:t>
             </a:fld>
             <a:endParaRPr lang="ru-RU"/>
           </a:p>
@@ -1130,7 +1132,7 @@
           <a:p>
             <a:fld id="{A2EC0EAC-ECEF-44E1-B933-C13F370113F6}" type="datetimeFigureOut">
               <a:rPr lang="ru-RU" smtClean="0"/>
-              <a:t>17.10.2020</a:t>
+              <a:t>27.10.2020</a:t>
             </a:fld>
             <a:endParaRPr lang="ru-RU"/>
           </a:p>
@@ -1376,7 +1378,7 @@
           <a:p>
             <a:fld id="{A2EC0EAC-ECEF-44E1-B933-C13F370113F6}" type="datetimeFigureOut">
               <a:rPr lang="ru-RU" smtClean="0"/>
-              <a:t>17.10.2020</a:t>
+              <a:t>27.10.2020</a:t>
             </a:fld>
             <a:endParaRPr lang="ru-RU"/>
           </a:p>
@@ -1608,7 +1610,7 @@
           <a:p>
             <a:fld id="{A2EC0EAC-ECEF-44E1-B933-C13F370113F6}" type="datetimeFigureOut">
               <a:rPr lang="ru-RU" smtClean="0"/>
-              <a:t>17.10.2020</a:t>
+              <a:t>27.10.2020</a:t>
             </a:fld>
             <a:endParaRPr lang="ru-RU"/>
           </a:p>
@@ -1975,7 +1977,7 @@
           <a:p>
             <a:fld id="{A2EC0EAC-ECEF-44E1-B933-C13F370113F6}" type="datetimeFigureOut">
               <a:rPr lang="ru-RU" smtClean="0"/>
-              <a:t>17.10.2020</a:t>
+              <a:t>27.10.2020</a:t>
             </a:fld>
             <a:endParaRPr lang="ru-RU"/>
           </a:p>
@@ -2093,7 +2095,7 @@
           <a:p>
             <a:fld id="{A2EC0EAC-ECEF-44E1-B933-C13F370113F6}" type="datetimeFigureOut">
               <a:rPr lang="ru-RU" smtClean="0"/>
-              <a:t>17.10.2020</a:t>
+              <a:t>27.10.2020</a:t>
             </a:fld>
             <a:endParaRPr lang="ru-RU"/>
           </a:p>
@@ -2188,7 +2190,7 @@
           <a:p>
             <a:fld id="{A2EC0EAC-ECEF-44E1-B933-C13F370113F6}" type="datetimeFigureOut">
               <a:rPr lang="ru-RU" smtClean="0"/>
-              <a:t>17.10.2020</a:t>
+              <a:t>27.10.2020</a:t>
             </a:fld>
             <a:endParaRPr lang="ru-RU"/>
           </a:p>
@@ -2465,7 +2467,7 @@
           <a:p>
             <a:fld id="{A2EC0EAC-ECEF-44E1-B933-C13F370113F6}" type="datetimeFigureOut">
               <a:rPr lang="ru-RU" smtClean="0"/>
-              <a:t>17.10.2020</a:t>
+              <a:t>27.10.2020</a:t>
             </a:fld>
             <a:endParaRPr lang="ru-RU"/>
           </a:p>
@@ -2718,7 +2720,7 @@
           <a:p>
             <a:fld id="{A2EC0EAC-ECEF-44E1-B933-C13F370113F6}" type="datetimeFigureOut">
               <a:rPr lang="ru-RU" smtClean="0"/>
-              <a:t>17.10.2020</a:t>
+              <a:t>27.10.2020</a:t>
             </a:fld>
             <a:endParaRPr lang="ru-RU"/>
           </a:p>
@@ -2931,7 +2933,7 @@
           <a:p>
             <a:fld id="{A2EC0EAC-ECEF-44E1-B933-C13F370113F6}" type="datetimeFigureOut">
               <a:rPr lang="ru-RU" smtClean="0"/>
-              <a:t>17.10.2020</a:t>
+              <a:t>27.10.2020</a:t>
             </a:fld>
             <a:endParaRPr lang="ru-RU"/>
           </a:p>
@@ -8336,6 +8338,678 @@
     <p:extLst>
       <p:ext uri="{BB962C8B-B14F-4D97-AF65-F5344CB8AC3E}">
         <p14:creationId xmlns:p14="http://schemas.microsoft.com/office/powerpoint/2010/main" val="3932845466"/>
+      </p:ext>
+    </p:extLst>
+  </p:cSld>
+  <p:clrMapOvr>
+    <a:masterClrMapping/>
+  </p:clrMapOvr>
+</p:sld>
+</file>
+
+<file path=ppt/slides/slide16.xml><?xml version="1.0" encoding="utf-8"?>
+<p:sld xmlns:a="http://schemas.openxmlformats.org/drawingml/2006/main" xmlns:r="http://schemas.openxmlformats.org/officeDocument/2006/relationships" xmlns:p="http://schemas.openxmlformats.org/presentationml/2006/main">
+  <p:cSld>
+    <p:spTree>
+      <p:nvGrpSpPr>
+        <p:cNvPr id="1" name=""/>
+        <p:cNvGrpSpPr/>
+        <p:nvPr/>
+      </p:nvGrpSpPr>
+      <p:grpSpPr>
+        <a:xfrm>
+          <a:off x="0" y="0"/>
+          <a:ext cx="0" cy="0"/>
+          <a:chOff x="0" y="0"/>
+          <a:chExt cx="0" cy="0"/>
+        </a:xfrm>
+      </p:grpSpPr>
+      <p:sp>
+        <p:nvSpPr>
+          <p:cNvPr id="2" name="Title 1"/>
+          <p:cNvSpPr>
+            <a:spLocks noGrp="1"/>
+          </p:cNvSpPr>
+          <p:nvPr>
+            <p:ph type="title"/>
+          </p:nvPr>
+        </p:nvSpPr>
+        <p:spPr/>
+        <p:txBody>
+          <a:bodyPr/>
+          <a:lstStyle/>
+          <a:p>
+            <a:r>
+              <a:rPr lang="en-US" dirty="0" smtClean="0"/>
+              <a:t>Admin Dashboard</a:t>
+            </a:r>
+            <a:endParaRPr lang="ru-RU" dirty="0"/>
+          </a:p>
+        </p:txBody>
+      </p:sp>
+    </p:spTree>
+    <p:extLst>
+      <p:ext uri="{BB962C8B-B14F-4D97-AF65-F5344CB8AC3E}">
+        <p14:creationId xmlns:p14="http://schemas.microsoft.com/office/powerpoint/2010/main" val="1654730702"/>
+      </p:ext>
+    </p:extLst>
+  </p:cSld>
+  <p:clrMapOvr>
+    <a:masterClrMapping/>
+  </p:clrMapOvr>
+</p:sld>
+</file>
+
+<file path=ppt/slides/slide17.xml><?xml version="1.0" encoding="utf-8"?>
+<p:sld xmlns:a="http://schemas.openxmlformats.org/drawingml/2006/main" xmlns:r="http://schemas.openxmlformats.org/officeDocument/2006/relationships" xmlns:p="http://schemas.openxmlformats.org/presentationml/2006/main">
+  <p:cSld>
+    <p:spTree>
+      <p:nvGrpSpPr>
+        <p:cNvPr id="1" name=""/>
+        <p:cNvGrpSpPr/>
+        <p:nvPr/>
+      </p:nvGrpSpPr>
+      <p:grpSpPr>
+        <a:xfrm>
+          <a:off x="0" y="0"/>
+          <a:ext cx="0" cy="0"/>
+          <a:chOff x="0" y="0"/>
+          <a:chExt cx="0" cy="0"/>
+        </a:xfrm>
+      </p:grpSpPr>
+      <p:sp>
+        <p:nvSpPr>
+          <p:cNvPr id="4" name="TextBox 3"/>
+          <p:cNvSpPr txBox="1"/>
+          <p:nvPr/>
+        </p:nvSpPr>
+        <p:spPr>
+          <a:xfrm>
+            <a:off x="264695" y="222584"/>
+            <a:ext cx="7321216" cy="369332"/>
+          </a:xfrm>
+          <a:prstGeom prst="rect">
+            <a:avLst/>
+          </a:prstGeom>
+          <a:noFill/>
+        </p:spPr>
+        <p:txBody>
+          <a:bodyPr wrap="square" rtlCol="0">
+            <a:spAutoFit/>
+          </a:bodyPr>
+          <a:lstStyle/>
+          <a:p>
+            <a:r>
+              <a:rPr lang="en-US" dirty="0" smtClean="0"/>
+              <a:t>User Profile</a:t>
+            </a:r>
+            <a:endParaRPr lang="ru-RU" dirty="0"/>
+          </a:p>
+        </p:txBody>
+      </p:sp>
+      <p:sp>
+        <p:nvSpPr>
+          <p:cNvPr id="5" name="TextBox 4"/>
+          <p:cNvSpPr txBox="1"/>
+          <p:nvPr/>
+        </p:nvSpPr>
+        <p:spPr>
+          <a:xfrm>
+            <a:off x="9581587" y="591916"/>
+            <a:ext cx="2449992" cy="307777"/>
+          </a:xfrm>
+          <a:prstGeom prst="rect">
+            <a:avLst/>
+          </a:prstGeom>
+          <a:noFill/>
+        </p:spPr>
+        <p:txBody>
+          <a:bodyPr wrap="square" rtlCol="0">
+            <a:spAutoFit/>
+          </a:bodyPr>
+          <a:lstStyle/>
+          <a:p>
+            <a:r>
+              <a:rPr lang="en-US" sz="1400" dirty="0" smtClean="0">
+                <a:solidFill>
+                  <a:schemeClr val="accent5"/>
+                </a:solidFill>
+              </a:rPr>
+              <a:t>Welcome, </a:t>
+            </a:r>
+            <a:r>
+              <a:rPr lang="en-US" sz="1400" dirty="0" smtClean="0">
+                <a:solidFill>
+                  <a:schemeClr val="accent5"/>
+                </a:solidFill>
+              </a:rPr>
+              <a:t>Admin! </a:t>
+            </a:r>
+            <a:r>
+              <a:rPr lang="en-US" sz="1400" dirty="0" smtClean="0">
+                <a:solidFill>
+                  <a:schemeClr val="accent5"/>
+                </a:solidFill>
+              </a:rPr>
+              <a:t>| Sign out…</a:t>
+            </a:r>
+            <a:endParaRPr lang="ru-RU" sz="1400" dirty="0">
+              <a:solidFill>
+                <a:schemeClr val="accent5"/>
+              </a:solidFill>
+            </a:endParaRPr>
+          </a:p>
+        </p:txBody>
+      </p:sp>
+      <p:sp>
+        <p:nvSpPr>
+          <p:cNvPr id="6" name="Rectangle 5"/>
+          <p:cNvSpPr/>
+          <p:nvPr/>
+        </p:nvSpPr>
+        <p:spPr>
+          <a:xfrm>
+            <a:off x="264696" y="899692"/>
+            <a:ext cx="11833058" cy="5892133"/>
+          </a:xfrm>
+          <a:prstGeom prst="rect">
+            <a:avLst/>
+          </a:prstGeom>
+          <a:noFill/>
+        </p:spPr>
+        <p:style>
+          <a:lnRef idx="2">
+            <a:schemeClr val="accent1">
+              <a:shade val="50000"/>
+            </a:schemeClr>
+          </a:lnRef>
+          <a:fillRef idx="1">
+            <a:schemeClr val="accent1"/>
+          </a:fillRef>
+          <a:effectRef idx="0">
+            <a:schemeClr val="accent1"/>
+          </a:effectRef>
+          <a:fontRef idx="minor">
+            <a:schemeClr val="lt1"/>
+          </a:fontRef>
+        </p:style>
+        <p:txBody>
+          <a:bodyPr rtlCol="0" anchor="ctr"/>
+          <a:lstStyle/>
+          <a:p>
+            <a:pPr algn="ctr"/>
+            <a:endParaRPr lang="ru-RU"/>
+          </a:p>
+        </p:txBody>
+      </p:sp>
+      <p:sp>
+        <p:nvSpPr>
+          <p:cNvPr id="7" name="TextBox 6"/>
+          <p:cNvSpPr txBox="1"/>
+          <p:nvPr/>
+        </p:nvSpPr>
+        <p:spPr>
+          <a:xfrm>
+            <a:off x="525439" y="1153236"/>
+            <a:ext cx="3671248" cy="369332"/>
+          </a:xfrm>
+          <a:prstGeom prst="rect">
+            <a:avLst/>
+          </a:prstGeom>
+          <a:noFill/>
+        </p:spPr>
+        <p:txBody>
+          <a:bodyPr wrap="square" rtlCol="0">
+            <a:spAutoFit/>
+          </a:bodyPr>
+          <a:lstStyle/>
+          <a:p>
+            <a:r>
+              <a:rPr lang="en-US" dirty="0" smtClean="0"/>
+              <a:t>Name:</a:t>
+            </a:r>
+            <a:endParaRPr lang="ru-RU" dirty="0"/>
+          </a:p>
+        </p:txBody>
+      </p:sp>
+      <p:sp>
+        <p:nvSpPr>
+          <p:cNvPr id="9" name="TextBox 8"/>
+          <p:cNvSpPr txBox="1"/>
+          <p:nvPr/>
+        </p:nvSpPr>
+        <p:spPr>
+          <a:xfrm>
+            <a:off x="525439" y="1621340"/>
+            <a:ext cx="7206018" cy="369332"/>
+          </a:xfrm>
+          <a:prstGeom prst="rect">
+            <a:avLst/>
+          </a:prstGeom>
+          <a:noFill/>
+        </p:spPr>
+        <p:txBody>
+          <a:bodyPr wrap="square" rtlCol="0">
+            <a:spAutoFit/>
+          </a:bodyPr>
+          <a:lstStyle/>
+          <a:p>
+            <a:r>
+              <a:rPr lang="en-US" dirty="0" smtClean="0"/>
+              <a:t>Email:    alex.svs.fl@gmail.com</a:t>
+            </a:r>
+            <a:endParaRPr lang="ru-RU" dirty="0"/>
+          </a:p>
+        </p:txBody>
+      </p:sp>
+      <p:sp>
+        <p:nvSpPr>
+          <p:cNvPr id="12" name="TextBox 11"/>
+          <p:cNvSpPr txBox="1"/>
+          <p:nvPr/>
+        </p:nvSpPr>
+        <p:spPr>
+          <a:xfrm>
+            <a:off x="525439" y="2090852"/>
+            <a:ext cx="2019869" cy="369332"/>
+          </a:xfrm>
+          <a:prstGeom prst="rect">
+            <a:avLst/>
+          </a:prstGeom>
+          <a:noFill/>
+        </p:spPr>
+        <p:txBody>
+          <a:bodyPr wrap="square" rtlCol="0">
+            <a:spAutoFit/>
+          </a:bodyPr>
+          <a:lstStyle/>
+          <a:p>
+            <a:r>
+              <a:rPr lang="en-US" dirty="0" smtClean="0"/>
+              <a:t>Status:</a:t>
+            </a:r>
+            <a:endParaRPr lang="ru-RU" dirty="0"/>
+          </a:p>
+        </p:txBody>
+      </p:sp>
+      <p:sp>
+        <p:nvSpPr>
+          <p:cNvPr id="13" name="TextBox 12"/>
+          <p:cNvSpPr txBox="1"/>
+          <p:nvPr/>
+        </p:nvSpPr>
+        <p:spPr>
+          <a:xfrm>
+            <a:off x="1308345" y="2090852"/>
+            <a:ext cx="2616958" cy="369332"/>
+          </a:xfrm>
+          <a:prstGeom prst="rect">
+            <a:avLst/>
+          </a:prstGeom>
+          <a:noFill/>
+        </p:spPr>
+        <p:txBody>
+          <a:bodyPr wrap="square" rtlCol="0">
+            <a:spAutoFit/>
+          </a:bodyPr>
+          <a:lstStyle/>
+          <a:p>
+            <a:r>
+              <a:rPr lang="en-US" dirty="0" smtClean="0"/>
+              <a:t>Active</a:t>
+            </a:r>
+            <a:endParaRPr lang="ru-RU" dirty="0"/>
+          </a:p>
+        </p:txBody>
+      </p:sp>
+      <p:sp>
+        <p:nvSpPr>
+          <p:cNvPr id="14" name="Rectangle 13"/>
+          <p:cNvSpPr/>
+          <p:nvPr/>
+        </p:nvSpPr>
+        <p:spPr>
+          <a:xfrm>
+            <a:off x="1361364" y="2090852"/>
+            <a:ext cx="945108" cy="369332"/>
+          </a:xfrm>
+          <a:prstGeom prst="rect">
+            <a:avLst/>
+          </a:prstGeom>
+          <a:noFill/>
+        </p:spPr>
+        <p:style>
+          <a:lnRef idx="2">
+            <a:schemeClr val="accent1">
+              <a:shade val="50000"/>
+            </a:schemeClr>
+          </a:lnRef>
+          <a:fillRef idx="1">
+            <a:schemeClr val="accent1"/>
+          </a:fillRef>
+          <a:effectRef idx="0">
+            <a:schemeClr val="accent1"/>
+          </a:effectRef>
+          <a:fontRef idx="minor">
+            <a:schemeClr val="lt1"/>
+          </a:fontRef>
+        </p:style>
+        <p:txBody>
+          <a:bodyPr rtlCol="0" anchor="ctr"/>
+          <a:lstStyle/>
+          <a:p>
+            <a:pPr algn="ctr"/>
+            <a:endParaRPr lang="ru-RU"/>
+          </a:p>
+        </p:txBody>
+      </p:sp>
+      <p:sp>
+        <p:nvSpPr>
+          <p:cNvPr id="15" name="Прямоугольник 26"/>
+          <p:cNvSpPr/>
+          <p:nvPr/>
+        </p:nvSpPr>
+        <p:spPr>
+          <a:xfrm>
+            <a:off x="2042651" y="2088107"/>
+            <a:ext cx="255493" cy="365527"/>
+          </a:xfrm>
+          <a:prstGeom prst="rect">
+            <a:avLst/>
+          </a:prstGeom>
+          <a:noFill/>
+        </p:spPr>
+        <p:style>
+          <a:lnRef idx="2">
+            <a:schemeClr val="accent1">
+              <a:shade val="50000"/>
+            </a:schemeClr>
+          </a:lnRef>
+          <a:fillRef idx="1">
+            <a:schemeClr val="accent1"/>
+          </a:fillRef>
+          <a:effectRef idx="0">
+            <a:schemeClr val="accent1"/>
+          </a:effectRef>
+          <a:fontRef idx="minor">
+            <a:schemeClr val="lt1"/>
+          </a:fontRef>
+        </p:style>
+        <p:txBody>
+          <a:bodyPr rtlCol="0" anchor="ctr"/>
+          <a:lstStyle/>
+          <a:p>
+            <a:pPr algn="ctr"/>
+            <a:endParaRPr lang="ru-RU"/>
+          </a:p>
+        </p:txBody>
+      </p:sp>
+      <p:sp>
+        <p:nvSpPr>
+          <p:cNvPr id="16" name="Блок-схема: объединение 27"/>
+          <p:cNvSpPr/>
+          <p:nvPr/>
+        </p:nvSpPr>
+        <p:spPr>
+          <a:xfrm>
+            <a:off x="2096436" y="2189624"/>
+            <a:ext cx="156913" cy="209875"/>
+          </a:xfrm>
+          <a:prstGeom prst="flowChartMerge">
+            <a:avLst/>
+          </a:prstGeom>
+        </p:spPr>
+        <p:style>
+          <a:lnRef idx="2">
+            <a:schemeClr val="accent1">
+              <a:shade val="50000"/>
+            </a:schemeClr>
+          </a:lnRef>
+          <a:fillRef idx="1">
+            <a:schemeClr val="accent1"/>
+          </a:fillRef>
+          <a:effectRef idx="0">
+            <a:schemeClr val="accent1"/>
+          </a:effectRef>
+          <a:fontRef idx="minor">
+            <a:schemeClr val="lt1"/>
+          </a:fontRef>
+        </p:style>
+        <p:txBody>
+          <a:bodyPr rtlCol="0" anchor="ctr"/>
+          <a:lstStyle/>
+          <a:p>
+            <a:pPr algn="ctr"/>
+            <a:endParaRPr lang="ru-RU"/>
+          </a:p>
+        </p:txBody>
+      </p:sp>
+      <p:sp>
+        <p:nvSpPr>
+          <p:cNvPr id="17" name="Rectangle 16"/>
+          <p:cNvSpPr/>
+          <p:nvPr/>
+        </p:nvSpPr>
+        <p:spPr>
+          <a:xfrm>
+            <a:off x="627797" y="3074187"/>
+            <a:ext cx="9287302" cy="2050548"/>
+          </a:xfrm>
+          <a:prstGeom prst="rect">
+            <a:avLst/>
+          </a:prstGeom>
+          <a:noFill/>
+        </p:spPr>
+        <p:style>
+          <a:lnRef idx="2">
+            <a:schemeClr val="accent1">
+              <a:shade val="50000"/>
+            </a:schemeClr>
+          </a:lnRef>
+          <a:fillRef idx="1">
+            <a:schemeClr val="accent1"/>
+          </a:fillRef>
+          <a:effectRef idx="0">
+            <a:schemeClr val="accent1"/>
+          </a:effectRef>
+          <a:fontRef idx="minor">
+            <a:schemeClr val="lt1"/>
+          </a:fontRef>
+        </p:style>
+        <p:txBody>
+          <a:bodyPr rtlCol="0" anchor="ctr"/>
+          <a:lstStyle/>
+          <a:p>
+            <a:pPr algn="ctr"/>
+            <a:endParaRPr lang="ru-RU"/>
+          </a:p>
+        </p:txBody>
+      </p:sp>
+      <p:sp>
+        <p:nvSpPr>
+          <p:cNvPr id="18" name="TextBox 17"/>
+          <p:cNvSpPr txBox="1"/>
+          <p:nvPr/>
+        </p:nvSpPr>
+        <p:spPr>
+          <a:xfrm>
+            <a:off x="525439" y="2644169"/>
+            <a:ext cx="2579427" cy="369332"/>
+          </a:xfrm>
+          <a:prstGeom prst="rect">
+            <a:avLst/>
+          </a:prstGeom>
+          <a:noFill/>
+        </p:spPr>
+        <p:txBody>
+          <a:bodyPr wrap="square" rtlCol="0">
+            <a:spAutoFit/>
+          </a:bodyPr>
+          <a:lstStyle/>
+          <a:p>
+            <a:r>
+              <a:rPr lang="en-US" dirty="0" smtClean="0"/>
+              <a:t>Comment:</a:t>
+            </a:r>
+            <a:endParaRPr lang="ru-RU" dirty="0"/>
+          </a:p>
+        </p:txBody>
+      </p:sp>
+      <p:sp>
+        <p:nvSpPr>
+          <p:cNvPr id="19" name="TextBox 18"/>
+          <p:cNvSpPr txBox="1"/>
+          <p:nvPr/>
+        </p:nvSpPr>
+        <p:spPr>
+          <a:xfrm>
+            <a:off x="1308345" y="1153236"/>
+            <a:ext cx="4455994" cy="369332"/>
+          </a:xfrm>
+          <a:prstGeom prst="rect">
+            <a:avLst/>
+          </a:prstGeom>
+          <a:noFill/>
+        </p:spPr>
+        <p:txBody>
+          <a:bodyPr wrap="square" rtlCol="0">
+            <a:spAutoFit/>
+          </a:bodyPr>
+          <a:lstStyle/>
+          <a:p>
+            <a:r>
+              <a:rPr lang="en-US" dirty="0" smtClean="0"/>
+              <a:t>Alex</a:t>
+            </a:r>
+            <a:endParaRPr lang="ru-RU" dirty="0"/>
+          </a:p>
+        </p:txBody>
+      </p:sp>
+      <p:sp>
+        <p:nvSpPr>
+          <p:cNvPr id="20" name="Прямоугольник 31"/>
+          <p:cNvSpPr/>
+          <p:nvPr/>
+        </p:nvSpPr>
+        <p:spPr>
+          <a:xfrm>
+            <a:off x="9117022" y="5298577"/>
+            <a:ext cx="832194" cy="420226"/>
+          </a:xfrm>
+          <a:prstGeom prst="rect">
+            <a:avLst/>
+          </a:prstGeom>
+        </p:spPr>
+        <p:style>
+          <a:lnRef idx="2">
+            <a:schemeClr val="accent1">
+              <a:shade val="50000"/>
+            </a:schemeClr>
+          </a:lnRef>
+          <a:fillRef idx="1">
+            <a:schemeClr val="accent1"/>
+          </a:fillRef>
+          <a:effectRef idx="0">
+            <a:schemeClr val="accent1"/>
+          </a:effectRef>
+          <a:fontRef idx="minor">
+            <a:schemeClr val="lt1"/>
+          </a:fontRef>
+        </p:style>
+        <p:txBody>
+          <a:bodyPr rtlCol="0" anchor="ctr"/>
+          <a:lstStyle/>
+          <a:p>
+            <a:pPr algn="ctr"/>
+            <a:endParaRPr lang="ru-RU"/>
+          </a:p>
+        </p:txBody>
+      </p:sp>
+      <p:sp>
+        <p:nvSpPr>
+          <p:cNvPr id="21" name="TextBox 20"/>
+          <p:cNvSpPr txBox="1"/>
+          <p:nvPr/>
+        </p:nvSpPr>
+        <p:spPr>
+          <a:xfrm>
+            <a:off x="9204430" y="5303622"/>
+            <a:ext cx="676548" cy="369332"/>
+          </a:xfrm>
+          <a:prstGeom prst="rect">
+            <a:avLst/>
+          </a:prstGeom>
+          <a:noFill/>
+        </p:spPr>
+        <p:txBody>
+          <a:bodyPr wrap="square" rtlCol="0">
+            <a:spAutoFit/>
+          </a:bodyPr>
+          <a:lstStyle/>
+          <a:p>
+            <a:r>
+              <a:rPr lang="en-US" dirty="0" smtClean="0">
+                <a:solidFill>
+                  <a:schemeClr val="bg1"/>
+                </a:solidFill>
+              </a:rPr>
+              <a:t>Save</a:t>
+            </a:r>
+            <a:endParaRPr lang="ru-RU" dirty="0">
+              <a:solidFill>
+                <a:schemeClr val="bg1"/>
+              </a:solidFill>
+            </a:endParaRPr>
+          </a:p>
+        </p:txBody>
+      </p:sp>
+      <p:sp>
+        <p:nvSpPr>
+          <p:cNvPr id="22" name="TextBox 21"/>
+          <p:cNvSpPr txBox="1"/>
+          <p:nvPr/>
+        </p:nvSpPr>
+        <p:spPr>
+          <a:xfrm>
+            <a:off x="4844954" y="1105469"/>
+            <a:ext cx="4981433" cy="923330"/>
+          </a:xfrm>
+          <a:prstGeom prst="rect">
+            <a:avLst/>
+          </a:prstGeom>
+          <a:noFill/>
+        </p:spPr>
+        <p:txBody>
+          <a:bodyPr wrap="square" rtlCol="0">
+            <a:spAutoFit/>
+          </a:bodyPr>
+          <a:lstStyle/>
+          <a:p>
+            <a:r>
+              <a:rPr lang="en-US" dirty="0" smtClean="0"/>
+              <a:t>Date joined:  05/21/2020</a:t>
+            </a:r>
+          </a:p>
+          <a:p>
+            <a:endParaRPr lang="en-US" dirty="0"/>
+          </a:p>
+          <a:p>
+            <a:r>
+              <a:rPr lang="en-US" dirty="0" smtClean="0"/>
+              <a:t>Last locked</a:t>
+            </a:r>
+            <a:r>
+              <a:rPr lang="en-US" smtClean="0"/>
+              <a:t>:   -</a:t>
+            </a:r>
+            <a:endParaRPr lang="en-US" dirty="0"/>
+          </a:p>
+        </p:txBody>
+      </p:sp>
+    </p:spTree>
+    <p:extLst>
+      <p:ext uri="{BB962C8B-B14F-4D97-AF65-F5344CB8AC3E}">
+        <p14:creationId xmlns:p14="http://schemas.microsoft.com/office/powerpoint/2010/main" val="58588882"/>
       </p:ext>
     </p:extLst>
   </p:cSld>

</xml_diff>

<commit_message>
User-Admin conversation: part 1
</commit_message>
<xml_diff>
--- a/Specs.pptx
+++ b/Specs.pptx
@@ -5,7 +5,7 @@
     <p:sldMasterId id="2147483648" r:id="rId1"/>
   </p:sldMasterIdLst>
   <p:notesMasterIdLst>
-    <p:notesMasterId r:id="rId19"/>
+    <p:notesMasterId r:id="rId22"/>
   </p:notesMasterIdLst>
   <p:sldIdLst>
     <p:sldId id="256" r:id="rId2"/>
@@ -23,8 +23,11 @@
     <p:sldId id="267" r:id="rId14"/>
     <p:sldId id="268" r:id="rId15"/>
     <p:sldId id="269" r:id="rId16"/>
-    <p:sldId id="271" r:id="rId17"/>
-    <p:sldId id="272" r:id="rId18"/>
+    <p:sldId id="273" r:id="rId17"/>
+    <p:sldId id="271" r:id="rId18"/>
+    <p:sldId id="275" r:id="rId19"/>
+    <p:sldId id="274" r:id="rId20"/>
+    <p:sldId id="272" r:id="rId21"/>
   </p:sldIdLst>
   <p:sldSz cx="12192000" cy="6858000"/>
   <p:notesSz cx="6858000" cy="9144000"/>
@@ -213,7 +216,7 @@
           <a:p>
             <a:fld id="{5A49B920-2512-410B-B58F-4F9F15F8D3A5}" type="datetimeFigureOut">
               <a:rPr lang="ru-RU" smtClean="0"/>
-              <a:t>27.10.2020</a:t>
+              <a:t>23.01.2021</a:t>
             </a:fld>
             <a:endParaRPr lang="ru-RU"/>
           </a:p>
@@ -612,7 +615,7 @@
           <a:p>
             <a:fld id="{A2EC0EAC-ECEF-44E1-B933-C13F370113F6}" type="datetimeFigureOut">
               <a:rPr lang="ru-RU" smtClean="0"/>
-              <a:t>27.10.2020</a:t>
+              <a:t>23.01.2021</a:t>
             </a:fld>
             <a:endParaRPr lang="ru-RU"/>
           </a:p>
@@ -782,7 +785,7 @@
           <a:p>
             <a:fld id="{A2EC0EAC-ECEF-44E1-B933-C13F370113F6}" type="datetimeFigureOut">
               <a:rPr lang="ru-RU" smtClean="0"/>
-              <a:t>27.10.2020</a:t>
+              <a:t>23.01.2021</a:t>
             </a:fld>
             <a:endParaRPr lang="ru-RU"/>
           </a:p>
@@ -962,7 +965,7 @@
           <a:p>
             <a:fld id="{A2EC0EAC-ECEF-44E1-B933-C13F370113F6}" type="datetimeFigureOut">
               <a:rPr lang="ru-RU" smtClean="0"/>
-              <a:t>27.10.2020</a:t>
+              <a:t>23.01.2021</a:t>
             </a:fld>
             <a:endParaRPr lang="ru-RU"/>
           </a:p>
@@ -1132,7 +1135,7 @@
           <a:p>
             <a:fld id="{A2EC0EAC-ECEF-44E1-B933-C13F370113F6}" type="datetimeFigureOut">
               <a:rPr lang="ru-RU" smtClean="0"/>
-              <a:t>27.10.2020</a:t>
+              <a:t>23.01.2021</a:t>
             </a:fld>
             <a:endParaRPr lang="ru-RU"/>
           </a:p>
@@ -1378,7 +1381,7 @@
           <a:p>
             <a:fld id="{A2EC0EAC-ECEF-44E1-B933-C13F370113F6}" type="datetimeFigureOut">
               <a:rPr lang="ru-RU" smtClean="0"/>
-              <a:t>27.10.2020</a:t>
+              <a:t>23.01.2021</a:t>
             </a:fld>
             <a:endParaRPr lang="ru-RU"/>
           </a:p>
@@ -1610,7 +1613,7 @@
           <a:p>
             <a:fld id="{A2EC0EAC-ECEF-44E1-B933-C13F370113F6}" type="datetimeFigureOut">
               <a:rPr lang="ru-RU" smtClean="0"/>
-              <a:t>27.10.2020</a:t>
+              <a:t>23.01.2021</a:t>
             </a:fld>
             <a:endParaRPr lang="ru-RU"/>
           </a:p>
@@ -1977,7 +1980,7 @@
           <a:p>
             <a:fld id="{A2EC0EAC-ECEF-44E1-B933-C13F370113F6}" type="datetimeFigureOut">
               <a:rPr lang="ru-RU" smtClean="0"/>
-              <a:t>27.10.2020</a:t>
+              <a:t>23.01.2021</a:t>
             </a:fld>
             <a:endParaRPr lang="ru-RU"/>
           </a:p>
@@ -2095,7 +2098,7 @@
           <a:p>
             <a:fld id="{A2EC0EAC-ECEF-44E1-B933-C13F370113F6}" type="datetimeFigureOut">
               <a:rPr lang="ru-RU" smtClean="0"/>
-              <a:t>27.10.2020</a:t>
+              <a:t>23.01.2021</a:t>
             </a:fld>
             <a:endParaRPr lang="ru-RU"/>
           </a:p>
@@ -2190,7 +2193,7 @@
           <a:p>
             <a:fld id="{A2EC0EAC-ECEF-44E1-B933-C13F370113F6}" type="datetimeFigureOut">
               <a:rPr lang="ru-RU" smtClean="0"/>
-              <a:t>27.10.2020</a:t>
+              <a:t>23.01.2021</a:t>
             </a:fld>
             <a:endParaRPr lang="ru-RU"/>
           </a:p>
@@ -2467,7 +2470,7 @@
           <a:p>
             <a:fld id="{A2EC0EAC-ECEF-44E1-B933-C13F370113F6}" type="datetimeFigureOut">
               <a:rPr lang="ru-RU" smtClean="0"/>
-              <a:t>27.10.2020</a:t>
+              <a:t>23.01.2021</a:t>
             </a:fld>
             <a:endParaRPr lang="ru-RU"/>
           </a:p>
@@ -2720,7 +2723,7 @@
           <a:p>
             <a:fld id="{A2EC0EAC-ECEF-44E1-B933-C13F370113F6}" type="datetimeFigureOut">
               <a:rPr lang="ru-RU" smtClean="0"/>
-              <a:t>27.10.2020</a:t>
+              <a:t>23.01.2021</a:t>
             </a:fld>
             <a:endParaRPr lang="ru-RU"/>
           </a:p>
@@ -2933,7 +2936,7 @@
           <a:p>
             <a:fld id="{A2EC0EAC-ECEF-44E1-B933-C13F370113F6}" type="datetimeFigureOut">
               <a:rPr lang="ru-RU" smtClean="0"/>
-              <a:t>27.10.2020</a:t>
+              <a:t>23.01.2021</a:t>
             </a:fld>
             <a:endParaRPr lang="ru-RU"/>
           </a:p>
@@ -8366,31 +8369,140 @@
       </p:grpSpPr>
       <p:sp>
         <p:nvSpPr>
-          <p:cNvPr id="2" name="Title 1"/>
-          <p:cNvSpPr>
-            <a:spLocks noGrp="1"/>
-          </p:cNvSpPr>
-          <p:nvPr>
-            <p:ph type="title"/>
-          </p:nvPr>
-        </p:nvSpPr>
-        <p:spPr/>
-        <p:txBody>
-          <a:bodyPr/>
-          <a:lstStyle/>
-          <a:p>
-            <a:r>
-              <a:rPr lang="en-US" dirty="0" smtClean="0"/>
-              <a:t>Admin Dashboard</a:t>
+          <p:cNvPr id="4" name="TextBox 3"/>
+          <p:cNvSpPr txBox="1"/>
+          <p:nvPr/>
+        </p:nvSpPr>
+        <p:spPr>
+          <a:xfrm>
+            <a:off x="427121" y="84221"/>
+            <a:ext cx="10750216" cy="369332"/>
+          </a:xfrm>
+          <a:prstGeom prst="rect">
+            <a:avLst/>
+          </a:prstGeom>
+          <a:noFill/>
+        </p:spPr>
+        <p:txBody>
+          <a:bodyPr wrap="square" rtlCol="0">
+            <a:spAutoFit/>
+          </a:bodyPr>
+          <a:lstStyle/>
+          <a:p>
+            <a:r>
+              <a:rPr lang="en-US" dirty="0" smtClean="0"/>
+              <a:t>My Profile page</a:t>
             </a:r>
             <a:endParaRPr lang="ru-RU" dirty="0"/>
+          </a:p>
+        </p:txBody>
+      </p:sp>
+      <p:pic>
+        <p:nvPicPr>
+          <p:cNvPr id="5" name="Picture 4"/>
+          <p:cNvPicPr>
+            <a:picLocks noChangeAspect="1"/>
+          </p:cNvPicPr>
+          <p:nvPr/>
+        </p:nvPicPr>
+        <p:blipFill>
+          <a:blip r:embed="rId2"/>
+          <a:stretch>
+            <a:fillRect/>
+          </a:stretch>
+        </p:blipFill>
+        <p:spPr>
+          <a:xfrm>
+            <a:off x="174458" y="375347"/>
+            <a:ext cx="10961638" cy="6344290"/>
+          </a:xfrm>
+          <a:prstGeom prst="rect">
+            <a:avLst/>
+          </a:prstGeom>
+        </p:spPr>
+      </p:pic>
+      <p:sp>
+        <p:nvSpPr>
+          <p:cNvPr id="2" name="Rectangle 1"/>
+          <p:cNvSpPr/>
+          <p:nvPr/>
+        </p:nvSpPr>
+        <p:spPr>
+          <a:xfrm>
+            <a:off x="7271951" y="3398108"/>
+            <a:ext cx="753763" cy="216243"/>
+          </a:xfrm>
+          <a:prstGeom prst="rect">
+            <a:avLst/>
+          </a:prstGeom>
+        </p:spPr>
+        <p:style>
+          <a:lnRef idx="2">
+            <a:schemeClr val="accent1">
+              <a:shade val="50000"/>
+            </a:schemeClr>
+          </a:lnRef>
+          <a:fillRef idx="1">
+            <a:schemeClr val="accent1"/>
+          </a:fillRef>
+          <a:effectRef idx="0">
+            <a:schemeClr val="accent1"/>
+          </a:effectRef>
+          <a:fontRef idx="minor">
+            <a:schemeClr val="lt1"/>
+          </a:fontRef>
+        </p:style>
+        <p:txBody>
+          <a:bodyPr rtlCol="0" anchor="ctr"/>
+          <a:lstStyle/>
+          <a:p>
+            <a:pPr algn="ctr"/>
+            <a:endParaRPr lang="ru-RU"/>
+          </a:p>
+        </p:txBody>
+      </p:sp>
+      <p:sp>
+        <p:nvSpPr>
+          <p:cNvPr id="3" name="TextBox 2"/>
+          <p:cNvSpPr txBox="1"/>
+          <p:nvPr/>
+        </p:nvSpPr>
+        <p:spPr>
+          <a:xfrm>
+            <a:off x="7386251" y="3355887"/>
+            <a:ext cx="525162" cy="276999"/>
+          </a:xfrm>
+          <a:prstGeom prst="rect">
+            <a:avLst/>
+          </a:prstGeom>
+          <a:noFill/>
+        </p:spPr>
+        <p:txBody>
+          <a:bodyPr wrap="square" rtlCol="0">
+            <a:spAutoFit/>
+          </a:bodyPr>
+          <a:lstStyle/>
+          <a:p>
+            <a:r>
+              <a:rPr lang="en-US" sz="1200" dirty="0" smtClean="0">
+                <a:solidFill>
+                  <a:schemeClr val="bg1"/>
+                </a:solidFill>
+              </a:rPr>
+              <a:t>Send</a:t>
+            </a:r>
+            <a:endParaRPr lang="ru-RU" sz="1200" dirty="0">
+              <a:solidFill>
+                <a:schemeClr val="bg1"/>
+              </a:solidFill>
+            </a:endParaRPr>
           </a:p>
         </p:txBody>
       </p:sp>
     </p:spTree>
     <p:extLst>
       <p:ext uri="{BB962C8B-B14F-4D97-AF65-F5344CB8AC3E}">
-        <p14:creationId xmlns:p14="http://schemas.microsoft.com/office/powerpoint/2010/main" val="1654730702"/>
+        <p14:creationId xmlns:p14="http://schemas.microsoft.com/office/powerpoint/2010/main" val="196864395"/>
       </p:ext>
     </p:extLst>
   </p:cSld>
@@ -8419,14 +8531,67 @@
       </p:grpSpPr>
       <p:sp>
         <p:nvSpPr>
+          <p:cNvPr id="2" name="Title 1"/>
+          <p:cNvSpPr>
+            <a:spLocks noGrp="1"/>
+          </p:cNvSpPr>
+          <p:nvPr>
+            <p:ph type="title"/>
+          </p:nvPr>
+        </p:nvSpPr>
+        <p:spPr/>
+        <p:txBody>
+          <a:bodyPr/>
+          <a:lstStyle/>
+          <a:p>
+            <a:r>
+              <a:rPr lang="en-US" dirty="0" smtClean="0"/>
+              <a:t>Admin Dashboard</a:t>
+            </a:r>
+            <a:endParaRPr lang="ru-RU" dirty="0"/>
+          </a:p>
+        </p:txBody>
+      </p:sp>
+    </p:spTree>
+    <p:extLst>
+      <p:ext uri="{BB962C8B-B14F-4D97-AF65-F5344CB8AC3E}">
+        <p14:creationId xmlns:p14="http://schemas.microsoft.com/office/powerpoint/2010/main" val="1654730702"/>
+      </p:ext>
+    </p:extLst>
+  </p:cSld>
+  <p:clrMapOvr>
+    <a:masterClrMapping/>
+  </p:clrMapOvr>
+</p:sld>
+</file>
+
+<file path=ppt/slides/slide18.xml><?xml version="1.0" encoding="utf-8"?>
+<p:sld xmlns:a="http://schemas.openxmlformats.org/drawingml/2006/main" xmlns:r="http://schemas.openxmlformats.org/officeDocument/2006/relationships" xmlns:p="http://schemas.openxmlformats.org/presentationml/2006/main">
+  <p:cSld>
+    <p:spTree>
+      <p:nvGrpSpPr>
+        <p:cNvPr id="1" name=""/>
+        <p:cNvGrpSpPr/>
+        <p:nvPr/>
+      </p:nvGrpSpPr>
+      <p:grpSpPr>
+        <a:xfrm>
+          <a:off x="0" y="0"/>
+          <a:ext cx="0" cy="0"/>
+          <a:chOff x="0" y="0"/>
+          <a:chExt cx="0" cy="0"/>
+        </a:xfrm>
+      </p:grpSpPr>
+      <p:sp>
+        <p:nvSpPr>
           <p:cNvPr id="4" name="TextBox 3"/>
           <p:cNvSpPr txBox="1"/>
           <p:nvPr/>
         </p:nvSpPr>
         <p:spPr>
           <a:xfrm>
-            <a:off x="264695" y="222584"/>
-            <a:ext cx="7321216" cy="369332"/>
+            <a:off x="427121" y="279380"/>
+            <a:ext cx="4614111" cy="369332"/>
           </a:xfrm>
           <a:prstGeom prst="rect">
             <a:avLst/>
@@ -8441,7 +8606,7 @@
           <a:p>
             <a:r>
               <a:rPr lang="en-US" dirty="0" smtClean="0"/>
-              <a:t>User Profile</a:t>
+              <a:t>Conversation Message entity</a:t>
             </a:r>
             <a:endParaRPr lang="ru-RU" dirty="0"/>
           </a:p>
@@ -8449,70 +8614,16 @@
       </p:sp>
       <p:sp>
         <p:nvSpPr>
-          <p:cNvPr id="5" name="TextBox 4"/>
-          <p:cNvSpPr txBox="1"/>
-          <p:nvPr/>
-        </p:nvSpPr>
-        <p:spPr>
-          <a:xfrm>
-            <a:off x="9581587" y="591916"/>
-            <a:ext cx="2449992" cy="307777"/>
-          </a:xfrm>
-          <a:prstGeom prst="rect">
-            <a:avLst/>
-          </a:prstGeom>
-          <a:noFill/>
-        </p:spPr>
-        <p:txBody>
-          <a:bodyPr wrap="square" rtlCol="0">
-            <a:spAutoFit/>
-          </a:bodyPr>
-          <a:lstStyle/>
-          <a:p>
-            <a:r>
-              <a:rPr lang="en-US" sz="1400" dirty="0" smtClean="0">
-                <a:solidFill>
-                  <a:schemeClr val="accent5"/>
-                </a:solidFill>
-              </a:rPr>
-              <a:t>Welcome, </a:t>
-            </a:r>
-            <a:r>
-              <a:rPr lang="en-US" sz="1400" dirty="0" smtClean="0">
-                <a:solidFill>
-                  <a:schemeClr val="accent5"/>
-                </a:solidFill>
-              </a:rPr>
-              <a:t>Admin! </a:t>
-            </a:r>
-            <a:r>
-              <a:rPr lang="en-US" sz="1400" dirty="0" smtClean="0">
-                <a:solidFill>
-                  <a:schemeClr val="accent5"/>
-                </a:solidFill>
-              </a:rPr>
-              <a:t>| Sign out…</a:t>
-            </a:r>
-            <a:endParaRPr lang="ru-RU" sz="1400" dirty="0">
-              <a:solidFill>
-                <a:schemeClr val="accent5"/>
-              </a:solidFill>
-            </a:endParaRPr>
-          </a:p>
-        </p:txBody>
-      </p:sp>
-      <p:sp>
-        <p:nvSpPr>
-          <p:cNvPr id="6" name="Rectangle 5"/>
+          <p:cNvPr id="5" name="Rounded Rectangle 4"/>
           <p:cNvSpPr/>
           <p:nvPr/>
         </p:nvSpPr>
         <p:spPr>
           <a:xfrm>
-            <a:off x="264696" y="899692"/>
-            <a:ext cx="11833058" cy="5892133"/>
-          </a:xfrm>
-          <a:prstGeom prst="rect">
+            <a:off x="427121" y="794085"/>
+            <a:ext cx="3653560" cy="2051474"/>
+          </a:xfrm>
+          <a:prstGeom prst="roundRect">
             <a:avLst/>
           </a:prstGeom>
           <a:noFill/>
@@ -8544,14 +8655,14 @@
       </p:sp>
       <p:sp>
         <p:nvSpPr>
-          <p:cNvPr id="7" name="TextBox 6"/>
+          <p:cNvPr id="6" name="TextBox 5"/>
           <p:cNvSpPr txBox="1"/>
           <p:nvPr/>
         </p:nvSpPr>
         <p:spPr>
           <a:xfrm>
-            <a:off x="525439" y="1153236"/>
-            <a:ext cx="3671248" cy="369332"/>
+            <a:off x="716507" y="942659"/>
+            <a:ext cx="2777319" cy="1754326"/>
           </a:xfrm>
           <a:prstGeom prst="rect">
             <a:avLst/>
@@ -8566,7 +8677,54 @@
           <a:p>
             <a:r>
               <a:rPr lang="en-US" dirty="0" smtClean="0"/>
-              <a:t>Name:</a:t>
+              <a:t>Id (String)</a:t>
+            </a:r>
+          </a:p>
+          <a:p>
+            <a:r>
+              <a:rPr lang="en-US" dirty="0" err="1" smtClean="0"/>
+              <a:t>ConversationID</a:t>
+            </a:r>
+            <a:endParaRPr lang="en-US" dirty="0"/>
+          </a:p>
+          <a:p>
+            <a:r>
+              <a:rPr lang="en-US" dirty="0" err="1" smtClean="0"/>
+              <a:t>UserID</a:t>
+            </a:r>
+            <a:r>
+              <a:rPr lang="en-US" dirty="0" smtClean="0"/>
+              <a:t> (String)</a:t>
+            </a:r>
+          </a:p>
+          <a:p>
+            <a:r>
+              <a:rPr lang="en-US" dirty="0" err="1" smtClean="0"/>
+              <a:t>DateAdded</a:t>
+            </a:r>
+            <a:r>
+              <a:rPr lang="en-US" dirty="0" smtClean="0"/>
+              <a:t> (</a:t>
+            </a:r>
+            <a:r>
+              <a:rPr lang="en-US" dirty="0" err="1" smtClean="0"/>
+              <a:t>DateTime</a:t>
+            </a:r>
+            <a:r>
+              <a:rPr lang="en-US" dirty="0" smtClean="0"/>
+              <a:t>)</a:t>
+            </a:r>
+          </a:p>
+          <a:p>
+            <a:r>
+              <a:rPr lang="en-US" dirty="0" smtClean="0"/>
+              <a:t>Viewed (Boolean)</a:t>
+            </a:r>
+          </a:p>
+          <a:p>
+            <a:r>
+              <a:rPr lang="en-US" dirty="0" smtClean="0"/>
+              <a:t>Content (String)</a:t>
             </a:r>
             <a:endParaRPr lang="ru-RU" dirty="0"/>
           </a:p>
@@ -8574,106 +8732,16 @@
       </p:sp>
       <p:sp>
         <p:nvSpPr>
-          <p:cNvPr id="9" name="TextBox 8"/>
-          <p:cNvSpPr txBox="1"/>
-          <p:nvPr/>
-        </p:nvSpPr>
-        <p:spPr>
-          <a:xfrm>
-            <a:off x="525439" y="1621340"/>
-            <a:ext cx="7206018" cy="369332"/>
-          </a:xfrm>
-          <a:prstGeom prst="rect">
-            <a:avLst/>
-          </a:prstGeom>
-          <a:noFill/>
-        </p:spPr>
-        <p:txBody>
-          <a:bodyPr wrap="square" rtlCol="0">
-            <a:spAutoFit/>
-          </a:bodyPr>
-          <a:lstStyle/>
-          <a:p>
-            <a:r>
-              <a:rPr lang="en-US" dirty="0" smtClean="0"/>
-              <a:t>Email:    alex.svs.fl@gmail.com</a:t>
-            </a:r>
-            <a:endParaRPr lang="ru-RU" dirty="0"/>
-          </a:p>
-        </p:txBody>
-      </p:sp>
-      <p:sp>
-        <p:nvSpPr>
-          <p:cNvPr id="12" name="TextBox 11"/>
-          <p:cNvSpPr txBox="1"/>
-          <p:nvPr/>
-        </p:nvSpPr>
-        <p:spPr>
-          <a:xfrm>
-            <a:off x="525439" y="2090852"/>
-            <a:ext cx="2019869" cy="369332"/>
-          </a:xfrm>
-          <a:prstGeom prst="rect">
-            <a:avLst/>
-          </a:prstGeom>
-          <a:noFill/>
-        </p:spPr>
-        <p:txBody>
-          <a:bodyPr wrap="square" rtlCol="0">
-            <a:spAutoFit/>
-          </a:bodyPr>
-          <a:lstStyle/>
-          <a:p>
-            <a:r>
-              <a:rPr lang="en-US" dirty="0" smtClean="0"/>
-              <a:t>Status:</a:t>
-            </a:r>
-            <a:endParaRPr lang="ru-RU" dirty="0"/>
-          </a:p>
-        </p:txBody>
-      </p:sp>
-      <p:sp>
-        <p:nvSpPr>
-          <p:cNvPr id="13" name="TextBox 12"/>
-          <p:cNvSpPr txBox="1"/>
-          <p:nvPr/>
-        </p:nvSpPr>
-        <p:spPr>
-          <a:xfrm>
-            <a:off x="1308345" y="2090852"/>
-            <a:ext cx="2616958" cy="369332"/>
-          </a:xfrm>
-          <a:prstGeom prst="rect">
-            <a:avLst/>
-          </a:prstGeom>
-          <a:noFill/>
-        </p:spPr>
-        <p:txBody>
-          <a:bodyPr wrap="square" rtlCol="0">
-            <a:spAutoFit/>
-          </a:bodyPr>
-          <a:lstStyle/>
-          <a:p>
-            <a:r>
-              <a:rPr lang="en-US" dirty="0" smtClean="0"/>
-              <a:t>Active</a:t>
-            </a:r>
-            <a:endParaRPr lang="ru-RU" dirty="0"/>
-          </a:p>
-        </p:txBody>
-      </p:sp>
-      <p:sp>
-        <p:nvSpPr>
-          <p:cNvPr id="14" name="Rectangle 13"/>
+          <p:cNvPr id="7" name="Rounded Rectangle 6"/>
           <p:cNvSpPr/>
           <p:nvPr/>
         </p:nvSpPr>
         <p:spPr>
           <a:xfrm>
-            <a:off x="1361364" y="2090852"/>
-            <a:ext cx="945108" cy="369332"/>
-          </a:xfrm>
-          <a:prstGeom prst="rect">
+            <a:off x="4981433" y="700200"/>
+            <a:ext cx="2437979" cy="1169543"/>
+          </a:xfrm>
+          <a:prstGeom prst="roundRect">
             <a:avLst/>
           </a:prstGeom>
           <a:noFill/>
@@ -8705,19 +8773,136 @@
       </p:sp>
       <p:sp>
         <p:nvSpPr>
-          <p:cNvPr id="15" name="Прямоугольник 26"/>
+          <p:cNvPr id="8" name="TextBox 7"/>
+          <p:cNvSpPr txBox="1"/>
+          <p:nvPr/>
+        </p:nvSpPr>
+        <p:spPr>
+          <a:xfrm>
+            <a:off x="4902374" y="260039"/>
+            <a:ext cx="4614111" cy="369332"/>
+          </a:xfrm>
+          <a:prstGeom prst="rect">
+            <a:avLst/>
+          </a:prstGeom>
+          <a:noFill/>
+        </p:spPr>
+        <p:txBody>
+          <a:bodyPr wrap="square" rtlCol="0">
+            <a:spAutoFit/>
+          </a:bodyPr>
+          <a:lstStyle/>
+          <a:p>
+            <a:r>
+              <a:rPr lang="en-US" dirty="0" smtClean="0"/>
+              <a:t>Conversation entity</a:t>
+            </a:r>
+            <a:endParaRPr lang="ru-RU" dirty="0"/>
+          </a:p>
+        </p:txBody>
+      </p:sp>
+      <p:sp>
+        <p:nvSpPr>
+          <p:cNvPr id="9" name="Rectangle 8"/>
           <p:cNvSpPr/>
           <p:nvPr/>
         </p:nvSpPr>
         <p:spPr>
           <a:xfrm>
-            <a:off x="2042651" y="2088107"/>
-            <a:ext cx="255493" cy="365527"/>
-          </a:xfrm>
-          <a:prstGeom prst="rect">
-            <a:avLst/>
-          </a:prstGeom>
-          <a:noFill/>
+            <a:off x="5181940" y="794085"/>
+            <a:ext cx="2237472" cy="923330"/>
+          </a:xfrm>
+          <a:prstGeom prst="rect">
+            <a:avLst/>
+          </a:prstGeom>
+        </p:spPr>
+        <p:txBody>
+          <a:bodyPr wrap="none">
+            <a:spAutoFit/>
+          </a:bodyPr>
+          <a:lstStyle/>
+          <a:p>
+            <a:r>
+              <a:rPr lang="en-US" dirty="0"/>
+              <a:t>Id (String</a:t>
+            </a:r>
+            <a:r>
+              <a:rPr lang="en-US" dirty="0" smtClean="0"/>
+              <a:t>)	 </a:t>
+            </a:r>
+          </a:p>
+          <a:p>
+            <a:r>
+              <a:rPr lang="en-US" dirty="0" smtClean="0"/>
+              <a:t>Name (String)</a:t>
+            </a:r>
+            <a:endParaRPr lang="en-US" dirty="0"/>
+          </a:p>
+          <a:p>
+            <a:r>
+              <a:rPr lang="en-US" dirty="0" err="1" smtClean="0"/>
+              <a:t>UnreadMessages</a:t>
+            </a:r>
+            <a:r>
+              <a:rPr lang="en-US" dirty="0" smtClean="0"/>
+              <a:t> (</a:t>
+            </a:r>
+            <a:r>
+              <a:rPr lang="en-US" dirty="0" err="1" smtClean="0"/>
+              <a:t>int</a:t>
+            </a:r>
+            <a:r>
+              <a:rPr lang="en-US" dirty="0" smtClean="0"/>
+              <a:t>)</a:t>
+            </a:r>
+            <a:endParaRPr lang="en-US" dirty="0"/>
+          </a:p>
+        </p:txBody>
+      </p:sp>
+    </p:spTree>
+    <p:extLst>
+      <p:ext uri="{BB962C8B-B14F-4D97-AF65-F5344CB8AC3E}">
+        <p14:creationId xmlns:p14="http://schemas.microsoft.com/office/powerpoint/2010/main" val="2347573165"/>
+      </p:ext>
+    </p:extLst>
+  </p:cSld>
+  <p:clrMapOvr>
+    <a:masterClrMapping/>
+  </p:clrMapOvr>
+</p:sld>
+</file>
+
+<file path=ppt/slides/slide19.xml><?xml version="1.0" encoding="utf-8"?>
+<p:sld xmlns:a="http://schemas.openxmlformats.org/drawingml/2006/main" xmlns:r="http://schemas.openxmlformats.org/officeDocument/2006/relationships" xmlns:p="http://schemas.openxmlformats.org/presentationml/2006/main">
+  <p:cSld>
+    <p:spTree>
+      <p:nvGrpSpPr>
+        <p:cNvPr id="1" name=""/>
+        <p:cNvGrpSpPr/>
+        <p:nvPr/>
+      </p:nvGrpSpPr>
+      <p:grpSpPr>
+        <a:xfrm>
+          <a:off x="0" y="0"/>
+          <a:ext cx="0" cy="0"/>
+          <a:chOff x="0" y="0"/>
+          <a:chExt cx="0" cy="0"/>
+        </a:xfrm>
+      </p:grpSpPr>
+      <p:sp>
+        <p:nvSpPr>
+          <p:cNvPr id="16" name="Rectangle 15"/>
+          <p:cNvSpPr/>
+          <p:nvPr/>
+        </p:nvSpPr>
+        <p:spPr>
+          <a:xfrm>
+            <a:off x="11197988" y="6220623"/>
+            <a:ext cx="709684" cy="369332"/>
+          </a:xfrm>
+          <a:prstGeom prst="rect">
+            <a:avLst/>
+          </a:prstGeom>
         </p:spPr>
         <p:style>
           <a:lnRef idx="2">
@@ -8746,16 +8931,16 @@
       </p:sp>
       <p:sp>
         <p:nvSpPr>
-          <p:cNvPr id="16" name="Блок-схема: объединение 27"/>
+          <p:cNvPr id="15" name="Rectangle 14"/>
           <p:cNvSpPr/>
           <p:nvPr/>
         </p:nvSpPr>
         <p:spPr>
           <a:xfrm>
-            <a:off x="2096436" y="2189624"/>
-            <a:ext cx="156913" cy="209875"/>
-          </a:xfrm>
-          <a:prstGeom prst="flowChartMerge">
+            <a:off x="10324531" y="6220623"/>
+            <a:ext cx="750628" cy="369332"/>
+          </a:xfrm>
+          <a:prstGeom prst="rect">
             <a:avLst/>
           </a:prstGeom>
         </p:spPr>
@@ -8786,19 +8971,48 @@
       </p:sp>
       <p:sp>
         <p:nvSpPr>
-          <p:cNvPr id="17" name="Rectangle 16"/>
+          <p:cNvPr id="4" name="TextBox 3"/>
+          <p:cNvSpPr txBox="1"/>
+          <p:nvPr/>
+        </p:nvSpPr>
+        <p:spPr>
+          <a:xfrm>
+            <a:off x="108284" y="132347"/>
+            <a:ext cx="1502976" cy="369332"/>
+          </a:xfrm>
+          <a:prstGeom prst="rect">
+            <a:avLst/>
+          </a:prstGeom>
+          <a:noFill/>
+        </p:spPr>
+        <p:txBody>
+          <a:bodyPr wrap="none" rtlCol="0">
+            <a:spAutoFit/>
+          </a:bodyPr>
+          <a:lstStyle/>
+          <a:p>
+            <a:r>
+              <a:rPr lang="en-US" dirty="0" smtClean="0"/>
+              <a:t>Conversations</a:t>
+            </a:r>
+            <a:endParaRPr lang="ru-RU" dirty="0"/>
+          </a:p>
+        </p:txBody>
+      </p:sp>
+      <p:sp>
+        <p:nvSpPr>
+          <p:cNvPr id="5" name="Rectangle 4"/>
           <p:cNvSpPr/>
           <p:nvPr/>
         </p:nvSpPr>
         <p:spPr>
           <a:xfrm>
-            <a:off x="627797" y="3074187"/>
-            <a:ext cx="9287302" cy="2050548"/>
-          </a:xfrm>
-          <a:prstGeom prst="rect">
-            <a:avLst/>
-          </a:prstGeom>
-          <a:noFill/>
+            <a:off x="121529" y="501679"/>
+            <a:ext cx="2737185" cy="6187879"/>
+          </a:xfrm>
+          <a:prstGeom prst="rect">
+            <a:avLst/>
+          </a:prstGeom>
         </p:spPr>
         <p:style>
           <a:lnRef idx="2">
@@ -8827,14 +9041,14 @@
       </p:sp>
       <p:sp>
         <p:nvSpPr>
-          <p:cNvPr id="18" name="TextBox 17"/>
+          <p:cNvPr id="6" name="TextBox 5"/>
           <p:cNvSpPr txBox="1"/>
           <p:nvPr/>
         </p:nvSpPr>
         <p:spPr>
           <a:xfrm>
-            <a:off x="525439" y="2644169"/>
-            <a:ext cx="2579427" cy="369332"/>
+            <a:off x="258679" y="613611"/>
+            <a:ext cx="2273968" cy="1200329"/>
           </a:xfrm>
           <a:prstGeom prst="rect">
             <a:avLst/>
@@ -8848,57 +9062,74 @@
           <a:lstStyle/>
           <a:p>
             <a:r>
-              <a:rPr lang="en-US" dirty="0" smtClean="0"/>
-              <a:t>Comment:</a:t>
-            </a:r>
-            <a:endParaRPr lang="ru-RU" dirty="0"/>
-          </a:p>
-        </p:txBody>
-      </p:sp>
-      <p:sp>
-        <p:nvSpPr>
-          <p:cNvPr id="19" name="TextBox 18"/>
-          <p:cNvSpPr txBox="1"/>
-          <p:nvPr/>
-        </p:nvSpPr>
-        <p:spPr>
-          <a:xfrm>
-            <a:off x="1308345" y="1153236"/>
-            <a:ext cx="4455994" cy="369332"/>
-          </a:xfrm>
-          <a:prstGeom prst="rect">
-            <a:avLst/>
-          </a:prstGeom>
-          <a:noFill/>
-        </p:spPr>
-        <p:txBody>
-          <a:bodyPr wrap="square" rtlCol="0">
-            <a:spAutoFit/>
-          </a:bodyPr>
-          <a:lstStyle/>
-          <a:p>
-            <a:r>
-              <a:rPr lang="en-US" dirty="0" smtClean="0"/>
+              <a:rPr lang="en-US" dirty="0" smtClean="0">
+                <a:solidFill>
+                  <a:srgbClr val="FF0000"/>
+                </a:solidFill>
+              </a:rPr>
               <a:t>Alex</a:t>
             </a:r>
-            <a:endParaRPr lang="ru-RU" dirty="0"/>
-          </a:p>
-        </p:txBody>
-      </p:sp>
-      <p:sp>
-        <p:nvSpPr>
-          <p:cNvPr id="20" name="Прямоугольник 31"/>
+            <a:r>
+              <a:rPr lang="en-US" baseline="30000" dirty="0" smtClean="0">
+                <a:solidFill>
+                  <a:srgbClr val="FF0000"/>
+                </a:solidFill>
+              </a:rPr>
+              <a:t>(1)</a:t>
+            </a:r>
+          </a:p>
+          <a:p>
+            <a:r>
+              <a:rPr lang="en-US" dirty="0" smtClean="0">
+                <a:solidFill>
+                  <a:schemeClr val="bg1"/>
+                </a:solidFill>
+              </a:rPr>
+              <a:t>User1</a:t>
+            </a:r>
+          </a:p>
+          <a:p>
+            <a:r>
+              <a:rPr lang="en-US" dirty="0" smtClean="0">
+                <a:solidFill>
+                  <a:schemeClr val="bg1"/>
+                </a:solidFill>
+              </a:rPr>
+              <a:t>User2</a:t>
+            </a:r>
+          </a:p>
+          <a:p>
+            <a:r>
+              <a:rPr lang="en-US" dirty="0" smtClean="0">
+                <a:solidFill>
+                  <a:schemeClr val="bg1"/>
+                </a:solidFill>
+              </a:rPr>
+              <a:t>User3</a:t>
+            </a:r>
+            <a:endParaRPr lang="ru-RU" dirty="0">
+              <a:solidFill>
+                <a:schemeClr val="bg1"/>
+              </a:solidFill>
+            </a:endParaRPr>
+          </a:p>
+        </p:txBody>
+      </p:sp>
+      <p:sp>
+        <p:nvSpPr>
+          <p:cNvPr id="7" name="Rectangle 6"/>
           <p:cNvSpPr/>
           <p:nvPr/>
         </p:nvSpPr>
         <p:spPr>
           <a:xfrm>
-            <a:off x="9117022" y="5298577"/>
-            <a:ext cx="832194" cy="420226"/>
-          </a:xfrm>
-          <a:prstGeom prst="rect">
-            <a:avLst/>
-          </a:prstGeom>
+            <a:off x="2983832" y="501679"/>
+            <a:ext cx="9005636" cy="6187879"/>
+          </a:xfrm>
+          <a:prstGeom prst="rect">
+            <a:avLst/>
+          </a:prstGeom>
+          <a:noFill/>
         </p:spPr>
         <p:style>
           <a:lnRef idx="2">
@@ -8927,14 +9158,193 @@
       </p:sp>
       <p:sp>
         <p:nvSpPr>
-          <p:cNvPr id="21" name="TextBox 20"/>
+          <p:cNvPr id="8" name="TextBox 7"/>
           <p:cNvSpPr txBox="1"/>
           <p:nvPr/>
         </p:nvSpPr>
         <p:spPr>
           <a:xfrm>
-            <a:off x="9204430" y="5303622"/>
-            <a:ext cx="676548" cy="369332"/>
+            <a:off x="3159457" y="613611"/>
+            <a:ext cx="8652680" cy="646331"/>
+          </a:xfrm>
+          <a:prstGeom prst="rect">
+            <a:avLst/>
+          </a:prstGeom>
+          <a:noFill/>
+        </p:spPr>
+        <p:txBody>
+          <a:bodyPr wrap="square" rtlCol="0">
+            <a:spAutoFit/>
+          </a:bodyPr>
+          <a:lstStyle/>
+          <a:p>
+            <a:r>
+              <a:rPr lang="en-US" dirty="0" smtClean="0"/>
+              <a:t>1/16/2021</a:t>
+            </a:r>
+          </a:p>
+          <a:p>
+            <a:r>
+              <a:rPr lang="en-US" dirty="0" smtClean="0"/>
+              <a:t>Message content</a:t>
+            </a:r>
+            <a:endParaRPr lang="ru-RU" dirty="0"/>
+          </a:p>
+        </p:txBody>
+      </p:sp>
+      <p:sp>
+        <p:nvSpPr>
+          <p:cNvPr id="9" name="TextBox 8"/>
+          <p:cNvSpPr txBox="1"/>
+          <p:nvPr/>
+        </p:nvSpPr>
+        <p:spPr>
+          <a:xfrm>
+            <a:off x="3159457" y="1490774"/>
+            <a:ext cx="8652680" cy="646331"/>
+          </a:xfrm>
+          <a:prstGeom prst="rect">
+            <a:avLst/>
+          </a:prstGeom>
+          <a:noFill/>
+        </p:spPr>
+        <p:txBody>
+          <a:bodyPr wrap="square" rtlCol="0">
+            <a:spAutoFit/>
+          </a:bodyPr>
+          <a:lstStyle/>
+          <a:p>
+            <a:r>
+              <a:rPr lang="en-US" dirty="0" smtClean="0"/>
+              <a:t>1/15/2021</a:t>
+            </a:r>
+          </a:p>
+          <a:p>
+            <a:r>
+              <a:rPr lang="en-US" dirty="0" smtClean="0"/>
+              <a:t>Message content</a:t>
+            </a:r>
+            <a:endParaRPr lang="ru-RU" dirty="0"/>
+          </a:p>
+        </p:txBody>
+      </p:sp>
+      <p:sp>
+        <p:nvSpPr>
+          <p:cNvPr id="10" name="TextBox 9"/>
+          <p:cNvSpPr txBox="1"/>
+          <p:nvPr/>
+        </p:nvSpPr>
+        <p:spPr>
+          <a:xfrm>
+            <a:off x="3159457" y="2327268"/>
+            <a:ext cx="8652680" cy="646331"/>
+          </a:xfrm>
+          <a:prstGeom prst="rect">
+            <a:avLst/>
+          </a:prstGeom>
+          <a:noFill/>
+        </p:spPr>
+        <p:txBody>
+          <a:bodyPr wrap="square" rtlCol="0">
+            <a:spAutoFit/>
+          </a:bodyPr>
+          <a:lstStyle/>
+          <a:p>
+            <a:r>
+              <a:rPr lang="en-US" dirty="0" smtClean="0"/>
+              <a:t>1/14/2021</a:t>
+            </a:r>
+          </a:p>
+          <a:p>
+            <a:r>
+              <a:rPr lang="en-US" dirty="0" smtClean="0"/>
+              <a:t>Message content</a:t>
+            </a:r>
+            <a:endParaRPr lang="ru-RU" dirty="0"/>
+          </a:p>
+        </p:txBody>
+      </p:sp>
+      <p:sp>
+        <p:nvSpPr>
+          <p:cNvPr id="11" name="Rectangle 10"/>
+          <p:cNvSpPr/>
+          <p:nvPr/>
+        </p:nvSpPr>
+        <p:spPr>
+          <a:xfrm>
+            <a:off x="3057099" y="4892722"/>
+            <a:ext cx="8850573" cy="1228299"/>
+          </a:xfrm>
+          <a:prstGeom prst="rect">
+            <a:avLst/>
+          </a:prstGeom>
+          <a:noFill/>
+        </p:spPr>
+        <p:style>
+          <a:lnRef idx="2">
+            <a:schemeClr val="accent1">
+              <a:shade val="50000"/>
+            </a:schemeClr>
+          </a:lnRef>
+          <a:fillRef idx="1">
+            <a:schemeClr val="accent1"/>
+          </a:fillRef>
+          <a:effectRef idx="0">
+            <a:schemeClr val="accent1"/>
+          </a:effectRef>
+          <a:fontRef idx="minor">
+            <a:schemeClr val="lt1"/>
+          </a:fontRef>
+        </p:style>
+        <p:txBody>
+          <a:bodyPr rtlCol="0" anchor="ctr"/>
+          <a:lstStyle/>
+          <a:p>
+            <a:pPr algn="ctr"/>
+            <a:endParaRPr lang="ru-RU"/>
+          </a:p>
+        </p:txBody>
+      </p:sp>
+      <p:sp>
+        <p:nvSpPr>
+          <p:cNvPr id="12" name="TextBox 11"/>
+          <p:cNvSpPr txBox="1"/>
+          <p:nvPr/>
+        </p:nvSpPr>
+        <p:spPr>
+          <a:xfrm>
+            <a:off x="3159457" y="4956651"/>
+            <a:ext cx="7096835" cy="369332"/>
+          </a:xfrm>
+          <a:prstGeom prst="rect">
+            <a:avLst/>
+          </a:prstGeom>
+          <a:noFill/>
+        </p:spPr>
+        <p:txBody>
+          <a:bodyPr wrap="square" rtlCol="0">
+            <a:spAutoFit/>
+          </a:bodyPr>
+          <a:lstStyle/>
+          <a:p>
+            <a:r>
+              <a:rPr lang="en-US" dirty="0" smtClean="0"/>
+              <a:t>This is a response from administrator</a:t>
+            </a:r>
+            <a:endParaRPr lang="ru-RU" dirty="0"/>
+          </a:p>
+        </p:txBody>
+      </p:sp>
+      <p:sp>
+        <p:nvSpPr>
+          <p:cNvPr id="13" name="TextBox 12"/>
+          <p:cNvSpPr txBox="1"/>
+          <p:nvPr/>
+        </p:nvSpPr>
+        <p:spPr>
+          <a:xfrm>
+            <a:off x="10406419" y="6220623"/>
+            <a:ext cx="668740" cy="369332"/>
           </a:xfrm>
           <a:prstGeom prst="rect">
             <a:avLst/>
@@ -8953,7 +9363,7 @@
                   <a:schemeClr val="bg1"/>
                 </a:solidFill>
               </a:rPr>
-              <a:t>Save</a:t>
+              <a:t>Send</a:t>
             </a:r>
             <a:endParaRPr lang="ru-RU" dirty="0">
               <a:solidFill>
@@ -8965,14 +9375,14 @@
       </p:sp>
       <p:sp>
         <p:nvSpPr>
-          <p:cNvPr id="22" name="TextBox 21"/>
+          <p:cNvPr id="14" name="TextBox 13"/>
           <p:cNvSpPr txBox="1"/>
           <p:nvPr/>
         </p:nvSpPr>
         <p:spPr>
           <a:xfrm>
-            <a:off x="4844954" y="1105469"/>
-            <a:ext cx="4981433" cy="923330"/>
+            <a:off x="11279740" y="6220623"/>
+            <a:ext cx="787933" cy="369332"/>
           </a:xfrm>
           <a:prstGeom prst="rect">
             <a:avLst/>
@@ -8986,36 +9396,38 @@
           <a:lstStyle/>
           <a:p>
             <a:r>
-              <a:rPr lang="en-US" dirty="0" smtClean="0"/>
-              <a:t>Date joined:  05/21/2020</a:t>
-            </a:r>
-          </a:p>
-          <a:p>
-            <a:endParaRPr lang="en-US" dirty="0"/>
-          </a:p>
-          <a:p>
-            <a:r>
-              <a:rPr lang="en-US" dirty="0" smtClean="0"/>
-              <a:t>Last locked</a:t>
-            </a:r>
-            <a:r>
-              <a:rPr lang="en-US" smtClean="0"/>
-              <a:t>:   -</a:t>
-            </a:r>
-            <a:endParaRPr lang="en-US" dirty="0"/>
+              <a:rPr lang="en-US" dirty="0" smtClean="0">
+                <a:solidFill>
+                  <a:schemeClr val="bg1"/>
+                </a:solidFill>
+              </a:rPr>
+              <a:t>Clear</a:t>
+            </a:r>
+            <a:endParaRPr lang="ru-RU" dirty="0">
+              <a:solidFill>
+                <a:schemeClr val="bg1"/>
+              </a:solidFill>
+            </a:endParaRPr>
           </a:p>
         </p:txBody>
       </p:sp>
     </p:spTree>
     <p:extLst>
       <p:ext uri="{BB962C8B-B14F-4D97-AF65-F5344CB8AC3E}">
-        <p14:creationId xmlns:p14="http://schemas.microsoft.com/office/powerpoint/2010/main" val="58588882"/>
+        <p14:creationId xmlns:p14="http://schemas.microsoft.com/office/powerpoint/2010/main" val="107874797"/>
       </p:ext>
     </p:extLst>
   </p:cSld>
   <p:clrMapOvr>
     <a:masterClrMapping/>
   </p:clrMapOvr>
+  <p:timing>
+    <p:tnLst>
+      <p:par>
+        <p:cTn id="1" dur="indefinite" restart="never" nodeType="tmRoot"/>
+      </p:par>
+    </p:tnLst>
+  </p:timing>
 </p:sld>
 </file>
 
@@ -9310,6 +9722,609 @@
       </p:par>
     </p:tnLst>
   </p:timing>
+</p:sld>
+</file>
+
+<file path=ppt/slides/slide20.xml><?xml version="1.0" encoding="utf-8"?>
+<p:sld xmlns:a="http://schemas.openxmlformats.org/drawingml/2006/main" xmlns:r="http://schemas.openxmlformats.org/officeDocument/2006/relationships" xmlns:p="http://schemas.openxmlformats.org/presentationml/2006/main">
+  <p:cSld>
+    <p:spTree>
+      <p:nvGrpSpPr>
+        <p:cNvPr id="1" name=""/>
+        <p:cNvGrpSpPr/>
+        <p:nvPr/>
+      </p:nvGrpSpPr>
+      <p:grpSpPr>
+        <a:xfrm>
+          <a:off x="0" y="0"/>
+          <a:ext cx="0" cy="0"/>
+          <a:chOff x="0" y="0"/>
+          <a:chExt cx="0" cy="0"/>
+        </a:xfrm>
+      </p:grpSpPr>
+      <p:sp>
+        <p:nvSpPr>
+          <p:cNvPr id="4" name="TextBox 3"/>
+          <p:cNvSpPr txBox="1"/>
+          <p:nvPr/>
+        </p:nvSpPr>
+        <p:spPr>
+          <a:xfrm>
+            <a:off x="264695" y="222584"/>
+            <a:ext cx="7321216" cy="369332"/>
+          </a:xfrm>
+          <a:prstGeom prst="rect">
+            <a:avLst/>
+          </a:prstGeom>
+          <a:noFill/>
+        </p:spPr>
+        <p:txBody>
+          <a:bodyPr wrap="square" rtlCol="0">
+            <a:spAutoFit/>
+          </a:bodyPr>
+          <a:lstStyle/>
+          <a:p>
+            <a:r>
+              <a:rPr lang="en-US" dirty="0" smtClean="0"/>
+              <a:t>User Profile</a:t>
+            </a:r>
+            <a:endParaRPr lang="ru-RU" dirty="0"/>
+          </a:p>
+        </p:txBody>
+      </p:sp>
+      <p:sp>
+        <p:nvSpPr>
+          <p:cNvPr id="5" name="TextBox 4"/>
+          <p:cNvSpPr txBox="1"/>
+          <p:nvPr/>
+        </p:nvSpPr>
+        <p:spPr>
+          <a:xfrm>
+            <a:off x="9581587" y="591916"/>
+            <a:ext cx="2449992" cy="307777"/>
+          </a:xfrm>
+          <a:prstGeom prst="rect">
+            <a:avLst/>
+          </a:prstGeom>
+          <a:noFill/>
+        </p:spPr>
+        <p:txBody>
+          <a:bodyPr wrap="square" rtlCol="0">
+            <a:spAutoFit/>
+          </a:bodyPr>
+          <a:lstStyle/>
+          <a:p>
+            <a:r>
+              <a:rPr lang="en-US" sz="1400" dirty="0" smtClean="0">
+                <a:solidFill>
+                  <a:schemeClr val="accent5"/>
+                </a:solidFill>
+              </a:rPr>
+              <a:t>Welcome, Admin! | Sign out…</a:t>
+            </a:r>
+            <a:endParaRPr lang="ru-RU" sz="1400" dirty="0">
+              <a:solidFill>
+                <a:schemeClr val="accent5"/>
+              </a:solidFill>
+            </a:endParaRPr>
+          </a:p>
+        </p:txBody>
+      </p:sp>
+      <p:sp>
+        <p:nvSpPr>
+          <p:cNvPr id="6" name="Rectangle 5"/>
+          <p:cNvSpPr/>
+          <p:nvPr/>
+        </p:nvSpPr>
+        <p:spPr>
+          <a:xfrm>
+            <a:off x="264696" y="899692"/>
+            <a:ext cx="11833058" cy="5892133"/>
+          </a:xfrm>
+          <a:prstGeom prst="rect">
+            <a:avLst/>
+          </a:prstGeom>
+          <a:noFill/>
+        </p:spPr>
+        <p:style>
+          <a:lnRef idx="2">
+            <a:schemeClr val="accent1">
+              <a:shade val="50000"/>
+            </a:schemeClr>
+          </a:lnRef>
+          <a:fillRef idx="1">
+            <a:schemeClr val="accent1"/>
+          </a:fillRef>
+          <a:effectRef idx="0">
+            <a:schemeClr val="accent1"/>
+          </a:effectRef>
+          <a:fontRef idx="minor">
+            <a:schemeClr val="lt1"/>
+          </a:fontRef>
+        </p:style>
+        <p:txBody>
+          <a:bodyPr rtlCol="0" anchor="ctr"/>
+          <a:lstStyle/>
+          <a:p>
+            <a:pPr algn="ctr"/>
+            <a:endParaRPr lang="ru-RU"/>
+          </a:p>
+        </p:txBody>
+      </p:sp>
+      <p:sp>
+        <p:nvSpPr>
+          <p:cNvPr id="7" name="TextBox 6"/>
+          <p:cNvSpPr txBox="1"/>
+          <p:nvPr/>
+        </p:nvSpPr>
+        <p:spPr>
+          <a:xfrm>
+            <a:off x="525439" y="1153236"/>
+            <a:ext cx="3671248" cy="369332"/>
+          </a:xfrm>
+          <a:prstGeom prst="rect">
+            <a:avLst/>
+          </a:prstGeom>
+          <a:noFill/>
+        </p:spPr>
+        <p:txBody>
+          <a:bodyPr wrap="square" rtlCol="0">
+            <a:spAutoFit/>
+          </a:bodyPr>
+          <a:lstStyle/>
+          <a:p>
+            <a:r>
+              <a:rPr lang="en-US" dirty="0" smtClean="0"/>
+              <a:t>Name:</a:t>
+            </a:r>
+            <a:endParaRPr lang="ru-RU" dirty="0"/>
+          </a:p>
+        </p:txBody>
+      </p:sp>
+      <p:sp>
+        <p:nvSpPr>
+          <p:cNvPr id="9" name="TextBox 8"/>
+          <p:cNvSpPr txBox="1"/>
+          <p:nvPr/>
+        </p:nvSpPr>
+        <p:spPr>
+          <a:xfrm>
+            <a:off x="525439" y="1621340"/>
+            <a:ext cx="7206018" cy="369332"/>
+          </a:xfrm>
+          <a:prstGeom prst="rect">
+            <a:avLst/>
+          </a:prstGeom>
+          <a:noFill/>
+        </p:spPr>
+        <p:txBody>
+          <a:bodyPr wrap="square" rtlCol="0">
+            <a:spAutoFit/>
+          </a:bodyPr>
+          <a:lstStyle/>
+          <a:p>
+            <a:r>
+              <a:rPr lang="en-US" dirty="0" smtClean="0"/>
+              <a:t>Email:    alex.svs.fl@gmail.com</a:t>
+            </a:r>
+            <a:endParaRPr lang="ru-RU" dirty="0"/>
+          </a:p>
+        </p:txBody>
+      </p:sp>
+      <p:sp>
+        <p:nvSpPr>
+          <p:cNvPr id="12" name="TextBox 11"/>
+          <p:cNvSpPr txBox="1"/>
+          <p:nvPr/>
+        </p:nvSpPr>
+        <p:spPr>
+          <a:xfrm>
+            <a:off x="525439" y="2090852"/>
+            <a:ext cx="2019869" cy="369332"/>
+          </a:xfrm>
+          <a:prstGeom prst="rect">
+            <a:avLst/>
+          </a:prstGeom>
+          <a:noFill/>
+        </p:spPr>
+        <p:txBody>
+          <a:bodyPr wrap="square" rtlCol="0">
+            <a:spAutoFit/>
+          </a:bodyPr>
+          <a:lstStyle/>
+          <a:p>
+            <a:r>
+              <a:rPr lang="en-US" dirty="0" smtClean="0"/>
+              <a:t>Status:</a:t>
+            </a:r>
+            <a:endParaRPr lang="ru-RU" dirty="0"/>
+          </a:p>
+        </p:txBody>
+      </p:sp>
+      <p:sp>
+        <p:nvSpPr>
+          <p:cNvPr id="13" name="TextBox 12"/>
+          <p:cNvSpPr txBox="1"/>
+          <p:nvPr/>
+        </p:nvSpPr>
+        <p:spPr>
+          <a:xfrm>
+            <a:off x="1308345" y="2090852"/>
+            <a:ext cx="2616958" cy="369332"/>
+          </a:xfrm>
+          <a:prstGeom prst="rect">
+            <a:avLst/>
+          </a:prstGeom>
+          <a:noFill/>
+        </p:spPr>
+        <p:txBody>
+          <a:bodyPr wrap="square" rtlCol="0">
+            <a:spAutoFit/>
+          </a:bodyPr>
+          <a:lstStyle/>
+          <a:p>
+            <a:r>
+              <a:rPr lang="en-US" dirty="0" smtClean="0"/>
+              <a:t>Active</a:t>
+            </a:r>
+            <a:endParaRPr lang="ru-RU" dirty="0"/>
+          </a:p>
+        </p:txBody>
+      </p:sp>
+      <p:sp>
+        <p:nvSpPr>
+          <p:cNvPr id="14" name="Rectangle 13"/>
+          <p:cNvSpPr/>
+          <p:nvPr/>
+        </p:nvSpPr>
+        <p:spPr>
+          <a:xfrm>
+            <a:off x="1361364" y="2090852"/>
+            <a:ext cx="945108" cy="369332"/>
+          </a:xfrm>
+          <a:prstGeom prst="rect">
+            <a:avLst/>
+          </a:prstGeom>
+          <a:noFill/>
+        </p:spPr>
+        <p:style>
+          <a:lnRef idx="2">
+            <a:schemeClr val="accent1">
+              <a:shade val="50000"/>
+            </a:schemeClr>
+          </a:lnRef>
+          <a:fillRef idx="1">
+            <a:schemeClr val="accent1"/>
+          </a:fillRef>
+          <a:effectRef idx="0">
+            <a:schemeClr val="accent1"/>
+          </a:effectRef>
+          <a:fontRef idx="minor">
+            <a:schemeClr val="lt1"/>
+          </a:fontRef>
+        </p:style>
+        <p:txBody>
+          <a:bodyPr rtlCol="0" anchor="ctr"/>
+          <a:lstStyle/>
+          <a:p>
+            <a:pPr algn="ctr"/>
+            <a:endParaRPr lang="ru-RU"/>
+          </a:p>
+        </p:txBody>
+      </p:sp>
+      <p:sp>
+        <p:nvSpPr>
+          <p:cNvPr id="15" name="Прямоугольник 26"/>
+          <p:cNvSpPr/>
+          <p:nvPr/>
+        </p:nvSpPr>
+        <p:spPr>
+          <a:xfrm>
+            <a:off x="2042651" y="2088107"/>
+            <a:ext cx="255493" cy="365527"/>
+          </a:xfrm>
+          <a:prstGeom prst="rect">
+            <a:avLst/>
+          </a:prstGeom>
+          <a:noFill/>
+        </p:spPr>
+        <p:style>
+          <a:lnRef idx="2">
+            <a:schemeClr val="accent1">
+              <a:shade val="50000"/>
+            </a:schemeClr>
+          </a:lnRef>
+          <a:fillRef idx="1">
+            <a:schemeClr val="accent1"/>
+          </a:fillRef>
+          <a:effectRef idx="0">
+            <a:schemeClr val="accent1"/>
+          </a:effectRef>
+          <a:fontRef idx="minor">
+            <a:schemeClr val="lt1"/>
+          </a:fontRef>
+        </p:style>
+        <p:txBody>
+          <a:bodyPr rtlCol="0" anchor="ctr"/>
+          <a:lstStyle/>
+          <a:p>
+            <a:pPr algn="ctr"/>
+            <a:endParaRPr lang="ru-RU"/>
+          </a:p>
+        </p:txBody>
+      </p:sp>
+      <p:sp>
+        <p:nvSpPr>
+          <p:cNvPr id="16" name="Блок-схема: объединение 27"/>
+          <p:cNvSpPr/>
+          <p:nvPr/>
+        </p:nvSpPr>
+        <p:spPr>
+          <a:xfrm>
+            <a:off x="2096436" y="2189624"/>
+            <a:ext cx="156913" cy="209875"/>
+          </a:xfrm>
+          <a:prstGeom prst="flowChartMerge">
+            <a:avLst/>
+          </a:prstGeom>
+        </p:spPr>
+        <p:style>
+          <a:lnRef idx="2">
+            <a:schemeClr val="accent1">
+              <a:shade val="50000"/>
+            </a:schemeClr>
+          </a:lnRef>
+          <a:fillRef idx="1">
+            <a:schemeClr val="accent1"/>
+          </a:fillRef>
+          <a:effectRef idx="0">
+            <a:schemeClr val="accent1"/>
+          </a:effectRef>
+          <a:fontRef idx="minor">
+            <a:schemeClr val="lt1"/>
+          </a:fontRef>
+        </p:style>
+        <p:txBody>
+          <a:bodyPr rtlCol="0" anchor="ctr"/>
+          <a:lstStyle/>
+          <a:p>
+            <a:pPr algn="ctr"/>
+            <a:endParaRPr lang="ru-RU"/>
+          </a:p>
+        </p:txBody>
+      </p:sp>
+      <p:sp>
+        <p:nvSpPr>
+          <p:cNvPr id="17" name="Rectangle 16"/>
+          <p:cNvSpPr/>
+          <p:nvPr/>
+        </p:nvSpPr>
+        <p:spPr>
+          <a:xfrm>
+            <a:off x="627797" y="3074187"/>
+            <a:ext cx="9287302" cy="2050548"/>
+          </a:xfrm>
+          <a:prstGeom prst="rect">
+            <a:avLst/>
+          </a:prstGeom>
+          <a:noFill/>
+        </p:spPr>
+        <p:style>
+          <a:lnRef idx="2">
+            <a:schemeClr val="accent1">
+              <a:shade val="50000"/>
+            </a:schemeClr>
+          </a:lnRef>
+          <a:fillRef idx="1">
+            <a:schemeClr val="accent1"/>
+          </a:fillRef>
+          <a:effectRef idx="0">
+            <a:schemeClr val="accent1"/>
+          </a:effectRef>
+          <a:fontRef idx="minor">
+            <a:schemeClr val="lt1"/>
+          </a:fontRef>
+        </p:style>
+        <p:txBody>
+          <a:bodyPr rtlCol="0" anchor="ctr"/>
+          <a:lstStyle/>
+          <a:p>
+            <a:pPr algn="ctr"/>
+            <a:endParaRPr lang="ru-RU"/>
+          </a:p>
+        </p:txBody>
+      </p:sp>
+      <p:sp>
+        <p:nvSpPr>
+          <p:cNvPr id="18" name="TextBox 17"/>
+          <p:cNvSpPr txBox="1"/>
+          <p:nvPr/>
+        </p:nvSpPr>
+        <p:spPr>
+          <a:xfrm>
+            <a:off x="525439" y="2644169"/>
+            <a:ext cx="2579427" cy="369332"/>
+          </a:xfrm>
+          <a:prstGeom prst="rect">
+            <a:avLst/>
+          </a:prstGeom>
+          <a:noFill/>
+        </p:spPr>
+        <p:txBody>
+          <a:bodyPr wrap="square" rtlCol="0">
+            <a:spAutoFit/>
+          </a:bodyPr>
+          <a:lstStyle/>
+          <a:p>
+            <a:r>
+              <a:rPr lang="en-US" dirty="0" smtClean="0"/>
+              <a:t>Comment:</a:t>
+            </a:r>
+            <a:endParaRPr lang="ru-RU" dirty="0"/>
+          </a:p>
+        </p:txBody>
+      </p:sp>
+      <p:sp>
+        <p:nvSpPr>
+          <p:cNvPr id="19" name="TextBox 18"/>
+          <p:cNvSpPr txBox="1"/>
+          <p:nvPr/>
+        </p:nvSpPr>
+        <p:spPr>
+          <a:xfrm>
+            <a:off x="1308345" y="1153236"/>
+            <a:ext cx="4455994" cy="369332"/>
+          </a:xfrm>
+          <a:prstGeom prst="rect">
+            <a:avLst/>
+          </a:prstGeom>
+          <a:noFill/>
+        </p:spPr>
+        <p:txBody>
+          <a:bodyPr wrap="square" rtlCol="0">
+            <a:spAutoFit/>
+          </a:bodyPr>
+          <a:lstStyle/>
+          <a:p>
+            <a:r>
+              <a:rPr lang="en-US" dirty="0" smtClean="0"/>
+              <a:t>Alex</a:t>
+            </a:r>
+            <a:endParaRPr lang="ru-RU" dirty="0"/>
+          </a:p>
+        </p:txBody>
+      </p:sp>
+      <p:sp>
+        <p:nvSpPr>
+          <p:cNvPr id="20" name="Прямоугольник 31"/>
+          <p:cNvSpPr/>
+          <p:nvPr/>
+        </p:nvSpPr>
+        <p:spPr>
+          <a:xfrm>
+            <a:off x="9117022" y="5298577"/>
+            <a:ext cx="832194" cy="420226"/>
+          </a:xfrm>
+          <a:prstGeom prst="rect">
+            <a:avLst/>
+          </a:prstGeom>
+        </p:spPr>
+        <p:style>
+          <a:lnRef idx="2">
+            <a:schemeClr val="accent1">
+              <a:shade val="50000"/>
+            </a:schemeClr>
+          </a:lnRef>
+          <a:fillRef idx="1">
+            <a:schemeClr val="accent1"/>
+          </a:fillRef>
+          <a:effectRef idx="0">
+            <a:schemeClr val="accent1"/>
+          </a:effectRef>
+          <a:fontRef idx="minor">
+            <a:schemeClr val="lt1"/>
+          </a:fontRef>
+        </p:style>
+        <p:txBody>
+          <a:bodyPr rtlCol="0" anchor="ctr"/>
+          <a:lstStyle/>
+          <a:p>
+            <a:pPr algn="ctr"/>
+            <a:endParaRPr lang="ru-RU"/>
+          </a:p>
+        </p:txBody>
+      </p:sp>
+      <p:sp>
+        <p:nvSpPr>
+          <p:cNvPr id="21" name="TextBox 20"/>
+          <p:cNvSpPr txBox="1"/>
+          <p:nvPr/>
+        </p:nvSpPr>
+        <p:spPr>
+          <a:xfrm>
+            <a:off x="9204430" y="5303622"/>
+            <a:ext cx="676548" cy="369332"/>
+          </a:xfrm>
+          <a:prstGeom prst="rect">
+            <a:avLst/>
+          </a:prstGeom>
+          <a:noFill/>
+        </p:spPr>
+        <p:txBody>
+          <a:bodyPr wrap="square" rtlCol="0">
+            <a:spAutoFit/>
+          </a:bodyPr>
+          <a:lstStyle/>
+          <a:p>
+            <a:r>
+              <a:rPr lang="en-US" dirty="0" smtClean="0">
+                <a:solidFill>
+                  <a:schemeClr val="bg1"/>
+                </a:solidFill>
+              </a:rPr>
+              <a:t>Save</a:t>
+            </a:r>
+            <a:endParaRPr lang="ru-RU" dirty="0">
+              <a:solidFill>
+                <a:schemeClr val="bg1"/>
+              </a:solidFill>
+            </a:endParaRPr>
+          </a:p>
+        </p:txBody>
+      </p:sp>
+      <p:sp>
+        <p:nvSpPr>
+          <p:cNvPr id="22" name="TextBox 21"/>
+          <p:cNvSpPr txBox="1"/>
+          <p:nvPr/>
+        </p:nvSpPr>
+        <p:spPr>
+          <a:xfrm>
+            <a:off x="4844954" y="1105469"/>
+            <a:ext cx="4981433" cy="923330"/>
+          </a:xfrm>
+          <a:prstGeom prst="rect">
+            <a:avLst/>
+          </a:prstGeom>
+          <a:noFill/>
+        </p:spPr>
+        <p:txBody>
+          <a:bodyPr wrap="square" rtlCol="0">
+            <a:spAutoFit/>
+          </a:bodyPr>
+          <a:lstStyle/>
+          <a:p>
+            <a:r>
+              <a:rPr lang="en-US" dirty="0" smtClean="0"/>
+              <a:t>Date joined:  05/21/2020</a:t>
+            </a:r>
+          </a:p>
+          <a:p>
+            <a:endParaRPr lang="en-US" dirty="0"/>
+          </a:p>
+          <a:p>
+            <a:r>
+              <a:rPr lang="en-US" dirty="0" smtClean="0"/>
+              <a:t>Last locked</a:t>
+            </a:r>
+            <a:r>
+              <a:rPr lang="en-US" smtClean="0"/>
+              <a:t>:   -</a:t>
+            </a:r>
+            <a:endParaRPr lang="en-US" dirty="0"/>
+          </a:p>
+        </p:txBody>
+      </p:sp>
+    </p:spTree>
+    <p:extLst>
+      <p:ext uri="{BB962C8B-B14F-4D97-AF65-F5344CB8AC3E}">
+        <p14:creationId xmlns:p14="http://schemas.microsoft.com/office/powerpoint/2010/main" val="58588882"/>
+      </p:ext>
+    </p:extLst>
+  </p:cSld>
+  <p:clrMapOvr>
+    <a:masterClrMapping/>
+  </p:clrMapOvr>
 </p:sld>
 </file>
 

</xml_diff>